<commit_message>
figure scripts and results
</commit_message>
<xml_diff>
--- a/figures/manual figs.pptx
+++ b/figures/manual figs.pptx
@@ -5,12 +5,15 @@
     <p:sldMasterId id="2147483648" r:id="rId1"/>
   </p:sldMasterIdLst>
   <p:notesMasterIdLst>
-    <p:notesMasterId r:id="rId5"/>
+    <p:notesMasterId r:id="rId8"/>
   </p:notesMasterIdLst>
   <p:sldIdLst>
     <p:sldId id="256" r:id="rId2"/>
-    <p:sldId id="257" r:id="rId3"/>
-    <p:sldId id="258" r:id="rId4"/>
+    <p:sldId id="259" r:id="rId3"/>
+    <p:sldId id="257" r:id="rId4"/>
+    <p:sldId id="258" r:id="rId5"/>
+    <p:sldId id="260" r:id="rId6"/>
+    <p:sldId id="261" r:id="rId7"/>
   </p:sldIdLst>
   <p:sldSz cx="12192000" cy="6858000"/>
   <p:notesSz cx="6858000" cy="9144000"/>
@@ -199,7 +202,7 @@
           <a:p>
             <a:fld id="{E7CA70EE-0A76-034B-B3BD-8D77E208ED84}" type="datetimeFigureOut">
               <a:rPr lang="en-US" smtClean="0"/>
-              <a:t>9/8/24</a:t>
+              <a:t>10/23/24</a:t>
             </a:fld>
             <a:endParaRPr lang="en-US"/>
           </a:p>
@@ -697,7 +700,7 @@
           <a:p>
             <a:fld id="{A439EA33-ED7C-8340-AD6D-B4965999229A}" type="datetimeFigureOut">
               <a:rPr lang="en-US" smtClean="0"/>
-              <a:t>9/8/24</a:t>
+              <a:t>10/23/24</a:t>
             </a:fld>
             <a:endParaRPr lang="en-US"/>
           </a:p>
@@ -895,7 +898,7 @@
           <a:p>
             <a:fld id="{A439EA33-ED7C-8340-AD6D-B4965999229A}" type="datetimeFigureOut">
               <a:rPr lang="en-US" smtClean="0"/>
-              <a:t>9/8/24</a:t>
+              <a:t>10/23/24</a:t>
             </a:fld>
             <a:endParaRPr lang="en-US"/>
           </a:p>
@@ -1103,7 +1106,7 @@
           <a:p>
             <a:fld id="{A439EA33-ED7C-8340-AD6D-B4965999229A}" type="datetimeFigureOut">
               <a:rPr lang="en-US" smtClean="0"/>
-              <a:t>9/8/24</a:t>
+              <a:t>10/23/24</a:t>
             </a:fld>
             <a:endParaRPr lang="en-US"/>
           </a:p>
@@ -1301,7 +1304,7 @@
           <a:p>
             <a:fld id="{A439EA33-ED7C-8340-AD6D-B4965999229A}" type="datetimeFigureOut">
               <a:rPr lang="en-US" smtClean="0"/>
-              <a:t>9/8/24</a:t>
+              <a:t>10/23/24</a:t>
             </a:fld>
             <a:endParaRPr lang="en-US"/>
           </a:p>
@@ -1576,7 +1579,7 @@
           <a:p>
             <a:fld id="{A439EA33-ED7C-8340-AD6D-B4965999229A}" type="datetimeFigureOut">
               <a:rPr lang="en-US" smtClean="0"/>
-              <a:t>9/8/24</a:t>
+              <a:t>10/23/24</a:t>
             </a:fld>
             <a:endParaRPr lang="en-US"/>
           </a:p>
@@ -1841,7 +1844,7 @@
           <a:p>
             <a:fld id="{A439EA33-ED7C-8340-AD6D-B4965999229A}" type="datetimeFigureOut">
               <a:rPr lang="en-US" smtClean="0"/>
-              <a:t>9/8/24</a:t>
+              <a:t>10/23/24</a:t>
             </a:fld>
             <a:endParaRPr lang="en-US"/>
           </a:p>
@@ -2253,7 +2256,7 @@
           <a:p>
             <a:fld id="{A439EA33-ED7C-8340-AD6D-B4965999229A}" type="datetimeFigureOut">
               <a:rPr lang="en-US" smtClean="0"/>
-              <a:t>9/8/24</a:t>
+              <a:t>10/23/24</a:t>
             </a:fld>
             <a:endParaRPr lang="en-US"/>
           </a:p>
@@ -2394,7 +2397,7 @@
           <a:p>
             <a:fld id="{A439EA33-ED7C-8340-AD6D-B4965999229A}" type="datetimeFigureOut">
               <a:rPr lang="en-US" smtClean="0"/>
-              <a:t>9/8/24</a:t>
+              <a:t>10/23/24</a:t>
             </a:fld>
             <a:endParaRPr lang="en-US"/>
           </a:p>
@@ -2507,7 +2510,7 @@
           <a:p>
             <a:fld id="{A439EA33-ED7C-8340-AD6D-B4965999229A}" type="datetimeFigureOut">
               <a:rPr lang="en-US" smtClean="0"/>
-              <a:t>9/8/24</a:t>
+              <a:t>10/23/24</a:t>
             </a:fld>
             <a:endParaRPr lang="en-US"/>
           </a:p>
@@ -2818,7 +2821,7 @@
           <a:p>
             <a:fld id="{A439EA33-ED7C-8340-AD6D-B4965999229A}" type="datetimeFigureOut">
               <a:rPr lang="en-US" smtClean="0"/>
-              <a:t>9/8/24</a:t>
+              <a:t>10/23/24</a:t>
             </a:fld>
             <a:endParaRPr lang="en-US"/>
           </a:p>
@@ -3106,7 +3109,7 @@
           <a:p>
             <a:fld id="{A439EA33-ED7C-8340-AD6D-B4965999229A}" type="datetimeFigureOut">
               <a:rPr lang="en-US" smtClean="0"/>
-              <a:t>9/8/24</a:t>
+              <a:t>10/23/24</a:t>
             </a:fld>
             <a:endParaRPr lang="en-US"/>
           </a:p>
@@ -3347,7 +3350,7 @@
           <a:p>
             <a:fld id="{A439EA33-ED7C-8340-AD6D-B4965999229A}" type="datetimeFigureOut">
               <a:rPr lang="en-US" smtClean="0"/>
-              <a:t>9/8/24</a:t>
+              <a:t>10/23/24</a:t>
             </a:fld>
             <a:endParaRPr lang="en-US"/>
           </a:p>
@@ -3778,7 +3781,7 @@
         </p:nvSpPr>
         <p:spPr>
           <a:xfrm>
-            <a:off x="377188" y="6195140"/>
+            <a:off x="182878" y="3380636"/>
             <a:ext cx="11424924" cy="720611"/>
           </a:xfrm>
           <a:prstGeom prst="rect">
@@ -3964,7 +3967,7 @@
         </p:nvSpPr>
         <p:spPr>
           <a:xfrm>
-            <a:off x="389888" y="372492"/>
+            <a:off x="58418" y="372492"/>
             <a:ext cx="3065263" cy="253916"/>
           </a:xfrm>
           <a:prstGeom prst="rect">
@@ -4004,13 +4007,13 @@
         </p:nvPicPr>
         <p:blipFill rotWithShape="1">
           <a:blip r:embed="rId3"/>
-          <a:srcRect r="12342"/>
+          <a:srcRect r="59573"/>
           <a:stretch/>
         </p:blipFill>
         <p:spPr>
           <a:xfrm>
-            <a:off x="389888" y="480114"/>
-            <a:ext cx="10902080" cy="2842773"/>
+            <a:off x="58418" y="480114"/>
+            <a:ext cx="5027932" cy="2842773"/>
           </a:xfrm>
           <a:prstGeom prst="rect">
             <a:avLst/>
@@ -4038,7 +4041,7 @@
         </p:blipFill>
         <p:spPr>
           <a:xfrm>
-            <a:off x="9169796" y="-126239"/>
+            <a:off x="9870440" y="43738"/>
             <a:ext cx="1931672" cy="1251378"/>
           </a:xfrm>
           <a:prstGeom prst="rect">
@@ -4060,8 +4063,8 @@
         </p:nvSpPr>
         <p:spPr>
           <a:xfrm>
-            <a:off x="377188" y="18603"/>
-            <a:ext cx="3412928" cy="369928"/>
+            <a:off x="45718" y="18603"/>
+            <a:ext cx="7863842" cy="396908"/>
           </a:xfrm>
           <a:prstGeom prst="rect">
             <a:avLst/>
@@ -4089,7 +4092,7 @@
                 <a:ea typeface="Times New Roman" panose="02020603050405020304" pitchFamily="18" charset="0"/>
                 <a:cs typeface="Times New Roman" panose="02020603050405020304" pitchFamily="18" charset="0"/>
               </a:rPr>
-              <a:t>Simulation results: percent bias </a:t>
+              <a:t>Simulation results: percent bias in exposure misclassification scenarios  </a:t>
             </a:r>
             <a:endParaRPr lang="en-CA" sz="2400" kern="100" dirty="0">
               <a:effectLst/>
@@ -4114,7 +4117,7 @@
         </p:nvSpPr>
         <p:spPr>
           <a:xfrm>
-            <a:off x="377188" y="3155719"/>
+            <a:off x="5456795" y="415511"/>
             <a:ext cx="2539478" cy="253916"/>
           </a:xfrm>
           <a:prstGeom prst="rect">
@@ -4154,13 +4157,13 @@
         </p:nvPicPr>
         <p:blipFill>
           <a:blip r:embed="rId5"/>
-          <a:srcRect r="12218"/>
+          <a:srcRect l="1" r="59515"/>
           <a:stretch/>
         </p:blipFill>
         <p:spPr>
           <a:xfrm>
-            <a:off x="389887" y="3448366"/>
-            <a:ext cx="10902080" cy="2838748"/>
+            <a:off x="5305758" y="541888"/>
+            <a:ext cx="5027932" cy="2838748"/>
           </a:xfrm>
           <a:prstGeom prst="rect">
             <a:avLst/>
@@ -4197,6 +4200,36 @@
           <a:chExt cx="0" cy="0"/>
         </a:xfrm>
       </p:grpSpPr>
+    </p:spTree>
+    <p:extLst>
+      <p:ext uri="{BB962C8B-B14F-4D97-AF65-F5344CB8AC3E}">
+        <p14:creationId xmlns:p14="http://schemas.microsoft.com/office/powerpoint/2010/main" val="3412536443"/>
+      </p:ext>
+    </p:extLst>
+  </p:cSld>
+  <p:clrMapOvr>
+    <a:masterClrMapping/>
+  </p:clrMapOvr>
+</p:sld>
+</file>
+
+<file path=ppt/slides/slide3.xml><?xml version="1.0" encoding="utf-8"?>
+<p:sld xmlns:a="http://schemas.openxmlformats.org/drawingml/2006/main" xmlns:r="http://schemas.openxmlformats.org/officeDocument/2006/relationships" xmlns:p="http://schemas.openxmlformats.org/presentationml/2006/main">
+  <p:cSld>
+    <p:spTree>
+      <p:nvGrpSpPr>
+        <p:cNvPr id="1" name=""/>
+        <p:cNvGrpSpPr/>
+        <p:nvPr/>
+      </p:nvGrpSpPr>
+      <p:grpSpPr>
+        <a:xfrm>
+          <a:off x="0" y="0"/>
+          <a:ext cx="0" cy="0"/>
+          <a:chOff x="0" y="0"/>
+          <a:chExt cx="0" cy="0"/>
+        </a:xfrm>
+      </p:grpSpPr>
       <p:sp>
         <p:nvSpPr>
           <p:cNvPr id="6" name="Text Box 2">
@@ -4211,8 +4244,8 @@
         </p:nvSpPr>
         <p:spPr>
           <a:xfrm>
-            <a:off x="377186" y="5879720"/>
-            <a:ext cx="11437627" cy="758190"/>
+            <a:off x="377187" y="5879720"/>
+            <a:ext cx="7669534" cy="758190"/>
           </a:xfrm>
           <a:prstGeom prst="rect">
             <a:avLst/>
@@ -4260,21 +4293,12 @@
               <a:t> in each simulation case. Coverage is calculated as the percentage of 95% confidence intervals including the true simulated effect estimate. </a:t>
             </a:r>
             <a:r>
-              <a:rPr lang="en-CA" sz="1050" kern="100">
+              <a:rPr lang="en-CA" sz="1050" kern="100" dirty="0">
                 <a:latin typeface="Arial" panose="020B0604020202020204" pitchFamily="34" charset="0"/>
                 <a:ea typeface="Times New Roman" panose="02020603050405020304" pitchFamily="18" charset="0"/>
                 <a:cs typeface="Times New Roman" panose="02020603050405020304" pitchFamily="18" charset="0"/>
               </a:rPr>
               <a:t>Figure</a:t>
-            </a:r>
-            <a:r>
-              <a:rPr lang="en-CA" sz="1050" kern="100">
-                <a:effectLst/>
-                <a:latin typeface="Arial" panose="020B0604020202020204" pitchFamily="34" charset="0"/>
-                <a:ea typeface="Times New Roman" panose="02020603050405020304" pitchFamily="18" charset="0"/>
-                <a:cs typeface="Times New Roman" panose="02020603050405020304" pitchFamily="18" charset="0"/>
-              </a:rPr>
-              <a:t> 2A </a:t>
             </a:r>
             <a:r>
               <a:rPr lang="en-CA" sz="1050" kern="100" dirty="0">
@@ -4283,24 +4307,15 @@
                 <a:ea typeface="Times New Roman" panose="02020603050405020304" pitchFamily="18" charset="0"/>
                 <a:cs typeface="Times New Roman" panose="02020603050405020304" pitchFamily="18" charset="0"/>
               </a:rPr>
-              <a:t>includes results from simulations using a difference-in-differences study design, while </a:t>
-            </a:r>
-            <a:r>
-              <a:rPr lang="en-CA" sz="1050" kern="100">
+              <a:t> 2A includes results from simulations using a difference-in-differences study design, while </a:t>
+            </a:r>
+            <a:r>
+              <a:rPr lang="en-CA" sz="1050" kern="100" dirty="0">
                 <a:latin typeface="Arial" panose="020B0604020202020204" pitchFamily="34" charset="0"/>
                 <a:ea typeface="Times New Roman" panose="02020603050405020304" pitchFamily="18" charset="0"/>
                 <a:cs typeface="Times New Roman" panose="02020603050405020304" pitchFamily="18" charset="0"/>
               </a:rPr>
               <a:t>Figure</a:t>
-            </a:r>
-            <a:r>
-              <a:rPr lang="en-CA" sz="1050" kern="100">
-                <a:effectLst/>
-                <a:latin typeface="Arial" panose="020B0604020202020204" pitchFamily="34" charset="0"/>
-                <a:ea typeface="Times New Roman" panose="02020603050405020304" pitchFamily="18" charset="0"/>
-                <a:cs typeface="Times New Roman" panose="02020603050405020304" pitchFamily="18" charset="0"/>
-              </a:rPr>
-              <a:t> 2B </a:t>
             </a:r>
             <a:r>
               <a:rPr lang="en-CA" sz="1050" kern="100" dirty="0">
@@ -4309,7 +4324,7 @@
                 <a:ea typeface="Times New Roman" panose="02020603050405020304" pitchFamily="18" charset="0"/>
                 <a:cs typeface="Times New Roman" panose="02020603050405020304" pitchFamily="18" charset="0"/>
               </a:rPr>
-              <a:t>includes results from the case-crossover design. Colors correspond to the true simulated effect size, and the x-axis titles describe each simulation case. There is a dashed line at 95</a:t>
+              <a:t> 2B includes results from the case-crossover design. Colors correspond to the true simulated effect size, and the x-axis titles describe each simulation case. There is a dashed line at 95</a:t>
             </a:r>
             <a:r>
               <a:rPr lang="en-CA" sz="1050" kern="100" dirty="0">
@@ -4353,13 +4368,13 @@
         </p:nvPicPr>
         <p:blipFill rotWithShape="1">
           <a:blip r:embed="rId2"/>
-          <a:srcRect r="12924"/>
+          <a:srcRect r="60884"/>
           <a:stretch/>
         </p:blipFill>
         <p:spPr>
           <a:xfrm>
             <a:off x="377187" y="1347050"/>
-            <a:ext cx="11259971" cy="2248893"/>
+            <a:ext cx="5058191" cy="2248893"/>
           </a:xfrm>
           <a:prstGeom prst="rect">
             <a:avLst/>
@@ -4387,7 +4402,7 @@
         </p:blipFill>
         <p:spPr>
           <a:xfrm>
-            <a:off x="10123319" y="787178"/>
+            <a:off x="5849946" y="704327"/>
             <a:ext cx="1691640" cy="514573"/>
           </a:xfrm>
           <a:prstGeom prst="rect">
@@ -4924,7 +4939,7 @@
         </p:blipFill>
         <p:spPr>
           <a:xfrm>
-            <a:off x="8430679" y="419101"/>
+            <a:off x="4157306" y="336250"/>
             <a:ext cx="1691640" cy="825500"/>
           </a:xfrm>
           <a:prstGeom prst="rect">
@@ -4948,13 +4963,13 @@
         </p:nvPicPr>
         <p:blipFill>
           <a:blip r:embed="rId5"/>
-          <a:srcRect r="12652"/>
+          <a:srcRect r="61356"/>
           <a:stretch/>
         </p:blipFill>
         <p:spPr>
           <a:xfrm>
             <a:off x="377041" y="3771707"/>
-            <a:ext cx="11304448" cy="2250755"/>
+            <a:ext cx="5001208" cy="2250755"/>
           </a:xfrm>
           <a:prstGeom prst="rect">
             <a:avLst/>
@@ -4974,7 +4989,7 @@
 </p:sld>
 </file>
 
-<file path=ppt/slides/slide3.xml><?xml version="1.0" encoding="utf-8"?>
+<file path=ppt/slides/slide4.xml><?xml version="1.0" encoding="utf-8"?>
 <p:sld xmlns:a="http://schemas.openxmlformats.org/drawingml/2006/main" xmlns:r="http://schemas.openxmlformats.org/officeDocument/2006/relationships" xmlns:p="http://schemas.openxmlformats.org/presentationml/2006/main">
   <p:cSld>
     <p:spTree>
@@ -5006,14 +5021,14 @@
           <p:nvPr>
             <p:extLst>
               <p:ext uri="{D42A27DB-BD31-4B8C-83A1-F6EECF244321}">
-                <p14:modId xmlns:p14="http://schemas.microsoft.com/office/powerpoint/2010/main" val="2636529052"/>
+                <p14:modId xmlns:p14="http://schemas.microsoft.com/office/powerpoint/2010/main" val="740754193"/>
               </p:ext>
             </p:extLst>
           </p:nvPr>
         </p:nvGraphicFramePr>
         <p:xfrm>
           <a:off x="525453" y="1524477"/>
-          <a:ext cx="10987861" cy="1965961"/>
+          <a:ext cx="5487596" cy="1965961"/>
         </p:xfrm>
         <a:graphic>
           <a:graphicData uri="http://schemas.openxmlformats.org/drawingml/2006/table">
@@ -5050,37 +5065,9 @@
                     </a:ext>
                   </a:extLst>
                 </a:gridCol>
-                <a:gridCol w="1371899">
-                  <a:extLst>
-                    <a:ext uri="{9D8B030D-6E8A-4147-A177-3AD203B41FA5}">
-                      <a16:colId xmlns:a16="http://schemas.microsoft.com/office/drawing/2014/main" val="3704949879"/>
-                    </a:ext>
-                  </a:extLst>
-                </a:gridCol>
-                <a:gridCol w="1371899">
-                  <a:extLst>
-                    <a:ext uri="{9D8B030D-6E8A-4147-A177-3AD203B41FA5}">
-                      <a16:colId xmlns:a16="http://schemas.microsoft.com/office/drawing/2014/main" val="1618664518"/>
-                    </a:ext>
-                  </a:extLst>
-                </a:gridCol>
-                <a:gridCol w="1371899">
-                  <a:extLst>
-                    <a:ext uri="{9D8B030D-6E8A-4147-A177-3AD203B41FA5}">
-                      <a16:colId xmlns:a16="http://schemas.microsoft.com/office/drawing/2014/main" val="893201345"/>
-                    </a:ext>
-                  </a:extLst>
-                </a:gridCol>
-                <a:gridCol w="1384568">
-                  <a:extLst>
-                    <a:ext uri="{9D8B030D-6E8A-4147-A177-3AD203B41FA5}">
-                      <a16:colId xmlns:a16="http://schemas.microsoft.com/office/drawing/2014/main" val="520936525"/>
-                    </a:ext>
-                  </a:extLst>
-                </a:gridCol>
               </a:tblGrid>
               <a:tr h="420620">
-                <a:tc gridSpan="8">
+                <a:tc gridSpan="4">
                   <a:txBody>
                     <a:bodyPr/>
                     <a:lstStyle/>
@@ -5166,50 +5153,6 @@
                   </a:txBody>
                   <a:tcPr marL="83680" marR="83680" marT="41840" marB="41840" anchor="ctr"/>
                 </a:tc>
-                <a:tc hMerge="1">
-                  <a:txBody>
-                    <a:bodyPr/>
-                    <a:lstStyle/>
-                    <a:p>
-                      <a:pPr algn="l"/>
-                      <a:endParaRPr lang="en-CA" sz="1400" b="1" dirty="0"/>
-                    </a:p>
-                  </a:txBody>
-                  <a:tcPr marL="83680" marR="83680" marT="41840" marB="41840" anchor="ctr"/>
-                </a:tc>
-                <a:tc hMerge="1">
-                  <a:txBody>
-                    <a:bodyPr/>
-                    <a:lstStyle/>
-                    <a:p>
-                      <a:pPr algn="l"/>
-                      <a:endParaRPr lang="en-CA" sz="1400" b="1" dirty="0"/>
-                    </a:p>
-                  </a:txBody>
-                  <a:tcPr marL="83680" marR="83680" marT="41840" marB="41840" anchor="ctr"/>
-                </a:tc>
-                <a:tc hMerge="1">
-                  <a:txBody>
-                    <a:bodyPr/>
-                    <a:lstStyle/>
-                    <a:p>
-                      <a:pPr algn="l"/>
-                      <a:endParaRPr lang="en-CA" sz="1400" b="1" dirty="0"/>
-                    </a:p>
-                  </a:txBody>
-                  <a:tcPr marL="83680" marR="83680" marT="41840" marB="41840" anchor="ctr"/>
-                </a:tc>
-                <a:tc hMerge="1">
-                  <a:txBody>
-                    <a:bodyPr/>
-                    <a:lstStyle/>
-                    <a:p>
-                      <a:pPr algn="l"/>
-                      <a:endParaRPr lang="en-CA" sz="1400" b="1" dirty="0"/>
-                    </a:p>
-                  </a:txBody>
-                  <a:tcPr marL="83680" marR="83680" marT="41840" marB="41840" anchor="ctr"/>
-                </a:tc>
                 <a:extLst>
                   <a:ext uri="{0D108BD9-81ED-4DB2-BD59-A6C34878D82A}">
                     <a16:rowId xmlns:a16="http://schemas.microsoft.com/office/drawing/2014/main" val="3943850057"/>
@@ -5245,7 +5188,7 @@
                     <a:p>
                       <a:pPr algn="l"/>
                       <a:r>
-                        <a:rPr lang="en-CA" sz="1100">
+                        <a:rPr lang="en-CA" sz="1100" dirty="0">
                           <a:latin typeface="Arial" panose="020B0604020202020204" pitchFamily="34" charset="0"/>
                           <a:cs typeface="Arial" panose="020B0604020202020204" pitchFamily="34" charset="0"/>
                         </a:rPr>
@@ -5292,90 +5235,6 @@
                           <a:cs typeface="Arial" panose="020B0604020202020204" pitchFamily="34" charset="0"/>
                         </a:rPr>
                         <a:t>Exposure misclassification: 8 hr exposure instead of 12 hr</a:t>
-                      </a:r>
-                    </a:p>
-                  </a:txBody>
-                  <a:tcPr anchor="ctr">
-                    <a:lnT w="12700" cmpd="sng">
-                      <a:noFill/>
-                    </a:lnT>
-                  </a:tcPr>
-                </a:tc>
-                <a:tc>
-                  <a:txBody>
-                    <a:bodyPr/>
-                    <a:lstStyle/>
-                    <a:p>
-                      <a:pPr algn="l"/>
-                      <a:r>
-                        <a:rPr lang="en-CA" sz="1100">
-                          <a:latin typeface="Arial" panose="020B0604020202020204" pitchFamily="34" charset="0"/>
-                          <a:cs typeface="Arial" panose="020B0604020202020204" pitchFamily="34" charset="0"/>
-                        </a:rPr>
-                        <a:t>10 percent missingness</a:t>
-                      </a:r>
-                    </a:p>
-                  </a:txBody>
-                  <a:tcPr anchor="ctr">
-                    <a:lnT w="12700" cmpd="sng">
-                      <a:noFill/>
-                    </a:lnT>
-                  </a:tcPr>
-                </a:tc>
-                <a:tc>
-                  <a:txBody>
-                    <a:bodyPr/>
-                    <a:lstStyle/>
-                    <a:p>
-                      <a:pPr algn="l"/>
-                      <a:r>
-                        <a:rPr lang="en-CA" sz="1100">
-                          <a:latin typeface="Arial" panose="020B0604020202020204" pitchFamily="34" charset="0"/>
-                          <a:cs typeface="Arial" panose="020B0604020202020204" pitchFamily="34" charset="0"/>
-                        </a:rPr>
-                        <a:t>30 percent missingness</a:t>
-                      </a:r>
-                    </a:p>
-                  </a:txBody>
-                  <a:tcPr anchor="ctr">
-                    <a:lnT w="12700" cmpd="sng">
-                      <a:noFill/>
-                    </a:lnT>
-                  </a:tcPr>
-                </a:tc>
-                <a:tc>
-                  <a:txBody>
-                    <a:bodyPr/>
-                    <a:lstStyle/>
-                    <a:p>
-                      <a:pPr algn="l"/>
-                      <a:r>
-                        <a:rPr lang="en-CA" sz="1100">
-                          <a:latin typeface="Arial" panose="020B0604020202020204" pitchFamily="34" charset="0"/>
-                          <a:cs typeface="Arial" panose="020B0604020202020204" pitchFamily="34" charset="0"/>
-                        </a:rPr>
-                        <a:t>50 percent missingness</a:t>
-                      </a:r>
-                    </a:p>
-                  </a:txBody>
-                  <a:tcPr anchor="ctr">
-                    <a:lnT w="12700" cmpd="sng">
-                      <a:noFill/>
-                    </a:lnT>
-                  </a:tcPr>
-                </a:tc>
-                <a:tc>
-                  <a:txBody>
-                    <a:bodyPr/>
-                    <a:lstStyle/>
-                    <a:p>
-                      <a:pPr algn="l"/>
-                      <a:r>
-                        <a:rPr lang="en-CA" sz="1100" dirty="0">
-                          <a:latin typeface="Arial" panose="020B0604020202020204" pitchFamily="34" charset="0"/>
-                          <a:cs typeface="Arial" panose="020B0604020202020204" pitchFamily="34" charset="0"/>
-                        </a:rPr>
-                        <a:t>70 percent missingness</a:t>
                       </a:r>
                     </a:p>
                   </a:txBody>
@@ -5488,6 +5347,30 @@
                     </a:solidFill>
                   </a:tcPr>
                 </a:tc>
+                <a:extLst>
+                  <a:ext uri="{0D108BD9-81ED-4DB2-BD59-A6C34878D82A}">
+                    <a16:rowId xmlns:a16="http://schemas.microsoft.com/office/drawing/2014/main" val="2890318742"/>
+                  </a:ext>
+                </a:extLst>
+              </a:tr>
+              <a:tr h="260107">
+                <a:tc>
+                  <a:txBody>
+                    <a:bodyPr/>
+                    <a:lstStyle/>
+                    <a:p>
+                      <a:pPr algn="l"/>
+                      <a:r>
+                        <a:rPr lang="en-CA" sz="1100" dirty="0">
+                          <a:latin typeface="Arial" panose="020B0604020202020204" pitchFamily="34" charset="0"/>
+                          <a:cs typeface="Arial" panose="020B0604020202020204" pitchFamily="34" charset="0"/>
+                        </a:rPr>
+                        <a:t>1%</a:t>
+                      </a:r>
+                    </a:p>
+                  </a:txBody>
+                  <a:tcPr anchor="ctr"/>
+                </a:tc>
                 <a:tc>
                   <a:txBody>
                     <a:bodyPr/>
@@ -5499,7 +5382,65 @@
                           <a:latin typeface="Arial" panose="020B0604020202020204" pitchFamily="34" charset="0"/>
                           <a:cs typeface="Arial" panose="020B0604020202020204" pitchFamily="34" charset="0"/>
                         </a:rPr>
-                        <a:t>-13 (95)</a:t>
+                        <a:t>1 (93)</a:t>
+                      </a:r>
+                    </a:p>
+                  </a:txBody>
+                  <a:tcPr anchor="ctr"/>
+                </a:tc>
+                <a:tc>
+                  <a:txBody>
+                    <a:bodyPr/>
+                    <a:lstStyle/>
+                    <a:p>
+                      <a:pPr algn="l"/>
+                      <a:r>
+                        <a:rPr lang="en-CA" sz="1100">
+                          <a:latin typeface="Arial" panose="020B0604020202020204" pitchFamily="34" charset="0"/>
+                          <a:cs typeface="Arial" panose="020B0604020202020204" pitchFamily="34" charset="0"/>
+                        </a:rPr>
+                        <a:t>-3 (94)</a:t>
+                      </a:r>
+                    </a:p>
+                  </a:txBody>
+                  <a:tcPr anchor="ctr"/>
+                </a:tc>
+                <a:tc>
+                  <a:txBody>
+                    <a:bodyPr/>
+                    <a:lstStyle/>
+                    <a:p>
+                      <a:pPr algn="l"/>
+                      <a:r>
+                        <a:rPr lang="en-CA" sz="1100">
+                          <a:latin typeface="Arial" panose="020B0604020202020204" pitchFamily="34" charset="0"/>
+                          <a:cs typeface="Arial" panose="020B0604020202020204" pitchFamily="34" charset="0"/>
+                        </a:rPr>
+                        <a:t>-70 (38)</a:t>
+                      </a:r>
+                    </a:p>
+                  </a:txBody>
+                  <a:tcPr anchor="ctr"/>
+                </a:tc>
+                <a:extLst>
+                  <a:ext uri="{0D108BD9-81ED-4DB2-BD59-A6C34878D82A}">
+                    <a16:rowId xmlns:a16="http://schemas.microsoft.com/office/drawing/2014/main" val="1764396818"/>
+                  </a:ext>
+                </a:extLst>
+              </a:tr>
+              <a:tr h="260107">
+                <a:tc>
+                  <a:txBody>
+                    <a:bodyPr/>
+                    <a:lstStyle/>
+                    <a:p>
+                      <a:pPr algn="l"/>
+                      <a:r>
+                        <a:rPr lang="en-CA" sz="1100" dirty="0">
+                          <a:latin typeface="Arial" panose="020B0604020202020204" pitchFamily="34" charset="0"/>
+                          <a:cs typeface="Arial" panose="020B0604020202020204" pitchFamily="34" charset="0"/>
+                        </a:rPr>
+                        <a:t>5%</a:t>
                       </a:r>
                     </a:p>
                   </a:txBody>
@@ -5523,7 +5464,7 @@
                           <a:latin typeface="Arial" panose="020B0604020202020204" pitchFamily="34" charset="0"/>
                           <a:cs typeface="Arial" panose="020B0604020202020204" pitchFamily="34" charset="0"/>
                         </a:rPr>
-                        <a:t>-13 (95)</a:t>
+                        <a:t>-3 (88)</a:t>
                       </a:r>
                     </a:p>
                   </a:txBody>
@@ -5547,7 +5488,7 @@
                           <a:latin typeface="Arial" panose="020B0604020202020204" pitchFamily="34" charset="0"/>
                           <a:cs typeface="Arial" panose="020B0604020202020204" pitchFamily="34" charset="0"/>
                         </a:rPr>
-                        <a:t>-29 (95)</a:t>
+                        <a:t>-8 (69)</a:t>
                       </a:r>
                     </a:p>
                   </a:txBody>
@@ -5571,349 +5512,7 @@
                           <a:latin typeface="Arial" panose="020B0604020202020204" pitchFamily="34" charset="0"/>
                           <a:cs typeface="Arial" panose="020B0604020202020204" pitchFamily="34" charset="0"/>
                         </a:rPr>
-                        <a:t>-39 (89)</a:t>
-                      </a:r>
-                    </a:p>
-                  </a:txBody>
-                  <a:tcPr anchor="ctr">
-                    <a:solidFill>
-                      <a:schemeClr val="accent1">
-                        <a:lumMod val="60000"/>
-                        <a:lumOff val="40000"/>
-                      </a:schemeClr>
-                    </a:solidFill>
-                  </a:tcPr>
-                </a:tc>
-                <a:extLst>
-                  <a:ext uri="{0D108BD9-81ED-4DB2-BD59-A6C34878D82A}">
-                    <a16:rowId xmlns:a16="http://schemas.microsoft.com/office/drawing/2014/main" val="2890318742"/>
-                  </a:ext>
-                </a:extLst>
-              </a:tr>
-              <a:tr h="260107">
-                <a:tc>
-                  <a:txBody>
-                    <a:bodyPr/>
-                    <a:lstStyle/>
-                    <a:p>
-                      <a:pPr algn="l"/>
-                      <a:r>
-                        <a:rPr lang="en-CA" sz="1100" dirty="0">
-                          <a:latin typeface="Arial" panose="020B0604020202020204" pitchFamily="34" charset="0"/>
-                          <a:cs typeface="Arial" panose="020B0604020202020204" pitchFamily="34" charset="0"/>
-                        </a:rPr>
-                        <a:t>1%</a:t>
-                      </a:r>
-                    </a:p>
-                  </a:txBody>
-                  <a:tcPr anchor="ctr"/>
-                </a:tc>
-                <a:tc>
-                  <a:txBody>
-                    <a:bodyPr/>
-                    <a:lstStyle/>
-                    <a:p>
-                      <a:pPr algn="l"/>
-                      <a:r>
-                        <a:rPr lang="en-CA" sz="1100">
-                          <a:latin typeface="Arial" panose="020B0604020202020204" pitchFamily="34" charset="0"/>
-                          <a:cs typeface="Arial" panose="020B0604020202020204" pitchFamily="34" charset="0"/>
-                        </a:rPr>
-                        <a:t>1 (93)</a:t>
-                      </a:r>
-                    </a:p>
-                  </a:txBody>
-                  <a:tcPr anchor="ctr"/>
-                </a:tc>
-                <a:tc>
-                  <a:txBody>
-                    <a:bodyPr/>
-                    <a:lstStyle/>
-                    <a:p>
-                      <a:pPr algn="l"/>
-                      <a:r>
-                        <a:rPr lang="en-CA" sz="1100">
-                          <a:latin typeface="Arial" panose="020B0604020202020204" pitchFamily="34" charset="0"/>
-                          <a:cs typeface="Arial" panose="020B0604020202020204" pitchFamily="34" charset="0"/>
-                        </a:rPr>
-                        <a:t>-3 (94)</a:t>
-                      </a:r>
-                    </a:p>
-                  </a:txBody>
-                  <a:tcPr anchor="ctr"/>
-                </a:tc>
-                <a:tc>
-                  <a:txBody>
-                    <a:bodyPr/>
-                    <a:lstStyle/>
-                    <a:p>
-                      <a:pPr algn="l"/>
-                      <a:r>
-                        <a:rPr lang="en-CA" sz="1100">
-                          <a:latin typeface="Arial" panose="020B0604020202020204" pitchFamily="34" charset="0"/>
-                          <a:cs typeface="Arial" panose="020B0604020202020204" pitchFamily="34" charset="0"/>
-                        </a:rPr>
-                        <a:t>-70 (38)</a:t>
-                      </a:r>
-                    </a:p>
-                  </a:txBody>
-                  <a:tcPr anchor="ctr"/>
-                </a:tc>
-                <a:tc>
-                  <a:txBody>
-                    <a:bodyPr/>
-                    <a:lstStyle/>
-                    <a:p>
-                      <a:pPr algn="l"/>
-                      <a:r>
-                        <a:rPr lang="en-CA" sz="1100">
-                          <a:latin typeface="Arial" panose="020B0604020202020204" pitchFamily="34" charset="0"/>
-                          <a:cs typeface="Arial" panose="020B0604020202020204" pitchFamily="34" charset="0"/>
-                        </a:rPr>
-                        <a:t>-3 (98)</a:t>
-                      </a:r>
-                    </a:p>
-                  </a:txBody>
-                  <a:tcPr anchor="ctr"/>
-                </a:tc>
-                <a:tc>
-                  <a:txBody>
-                    <a:bodyPr/>
-                    <a:lstStyle/>
-                    <a:p>
-                      <a:pPr algn="l"/>
-                      <a:r>
-                        <a:rPr lang="en-CA" sz="1100">
-                          <a:latin typeface="Arial" panose="020B0604020202020204" pitchFamily="34" charset="0"/>
-                          <a:cs typeface="Arial" panose="020B0604020202020204" pitchFamily="34" charset="0"/>
-                        </a:rPr>
-                        <a:t>-17 (92)</a:t>
-                      </a:r>
-                    </a:p>
-                  </a:txBody>
-                  <a:tcPr anchor="ctr"/>
-                </a:tc>
-                <a:tc>
-                  <a:txBody>
-                    <a:bodyPr/>
-                    <a:lstStyle/>
-                    <a:p>
-                      <a:pPr algn="l"/>
-                      <a:r>
-                        <a:rPr lang="en-CA" sz="1100">
-                          <a:latin typeface="Arial" panose="020B0604020202020204" pitchFamily="34" charset="0"/>
-                          <a:cs typeface="Arial" panose="020B0604020202020204" pitchFamily="34" charset="0"/>
-                        </a:rPr>
-                        <a:t>-29 (82)</a:t>
-                      </a:r>
-                    </a:p>
-                  </a:txBody>
-                  <a:tcPr anchor="ctr"/>
-                </a:tc>
-                <a:tc>
-                  <a:txBody>
-                    <a:bodyPr/>
-                    <a:lstStyle/>
-                    <a:p>
-                      <a:pPr algn="l"/>
-                      <a:r>
-                        <a:rPr lang="en-CA" sz="1100">
-                          <a:latin typeface="Arial" panose="020B0604020202020204" pitchFamily="34" charset="0"/>
-                          <a:cs typeface="Arial" panose="020B0604020202020204" pitchFamily="34" charset="0"/>
-                        </a:rPr>
-                        <a:t>-51 (67)</a:t>
-                      </a:r>
-                    </a:p>
-                  </a:txBody>
-                  <a:tcPr anchor="ctr"/>
-                </a:tc>
-                <a:extLst>
-                  <a:ext uri="{0D108BD9-81ED-4DB2-BD59-A6C34878D82A}">
-                    <a16:rowId xmlns:a16="http://schemas.microsoft.com/office/drawing/2014/main" val="1764396818"/>
-                  </a:ext>
-                </a:extLst>
-              </a:tr>
-              <a:tr h="260107">
-                <a:tc>
-                  <a:txBody>
-                    <a:bodyPr/>
-                    <a:lstStyle/>
-                    <a:p>
-                      <a:pPr algn="l"/>
-                      <a:r>
-                        <a:rPr lang="en-CA" sz="1100" dirty="0">
-                          <a:latin typeface="Arial" panose="020B0604020202020204" pitchFamily="34" charset="0"/>
-                          <a:cs typeface="Arial" panose="020B0604020202020204" pitchFamily="34" charset="0"/>
-                        </a:rPr>
-                        <a:t>5%</a:t>
-                      </a:r>
-                    </a:p>
-                  </a:txBody>
-                  <a:tcPr anchor="ctr">
-                    <a:solidFill>
-                      <a:schemeClr val="accent1">
-                        <a:lumMod val="60000"/>
-                        <a:lumOff val="40000"/>
-                      </a:schemeClr>
-                    </a:solidFill>
-                  </a:tcPr>
-                </a:tc>
-                <a:tc>
-                  <a:txBody>
-                    <a:bodyPr/>
-                    <a:lstStyle/>
-                    <a:p>
-                      <a:pPr algn="l"/>
-                      <a:r>
-                        <a:rPr lang="en-CA" sz="1100">
-                          <a:latin typeface="Arial" panose="020B0604020202020204" pitchFamily="34" charset="0"/>
-                          <a:cs typeface="Arial" panose="020B0604020202020204" pitchFamily="34" charset="0"/>
-                        </a:rPr>
-                        <a:t>-3 (88)</a:t>
-                      </a:r>
-                    </a:p>
-                  </a:txBody>
-                  <a:tcPr anchor="ctr">
-                    <a:solidFill>
-                      <a:schemeClr val="accent1">
-                        <a:lumMod val="60000"/>
-                        <a:lumOff val="40000"/>
-                      </a:schemeClr>
-                    </a:solidFill>
-                  </a:tcPr>
-                </a:tc>
-                <a:tc>
-                  <a:txBody>
-                    <a:bodyPr/>
-                    <a:lstStyle/>
-                    <a:p>
-                      <a:pPr algn="l"/>
-                      <a:r>
-                        <a:rPr lang="en-CA" sz="1100">
-                          <a:latin typeface="Arial" panose="020B0604020202020204" pitchFamily="34" charset="0"/>
-                          <a:cs typeface="Arial" panose="020B0604020202020204" pitchFamily="34" charset="0"/>
-                        </a:rPr>
-                        <a:t>-8 (69)</a:t>
-                      </a:r>
-                    </a:p>
-                  </a:txBody>
-                  <a:tcPr anchor="ctr">
-                    <a:solidFill>
-                      <a:schemeClr val="accent1">
-                        <a:lumMod val="60000"/>
-                        <a:lumOff val="40000"/>
-                      </a:schemeClr>
-                    </a:solidFill>
-                  </a:tcPr>
-                </a:tc>
-                <a:tc>
-                  <a:txBody>
-                    <a:bodyPr/>
-                    <a:lstStyle/>
-                    <a:p>
-                      <a:pPr algn="l"/>
-                      <a:r>
-                        <a:rPr lang="en-CA" sz="1100">
-                          <a:latin typeface="Arial" panose="020B0604020202020204" pitchFamily="34" charset="0"/>
-                          <a:cs typeface="Arial" panose="020B0604020202020204" pitchFamily="34" charset="0"/>
-                        </a:rPr>
                         <a:t>-69 (0)</a:t>
-                      </a:r>
-                    </a:p>
-                  </a:txBody>
-                  <a:tcPr anchor="ctr">
-                    <a:solidFill>
-                      <a:schemeClr val="accent1">
-                        <a:lumMod val="60000"/>
-                        <a:lumOff val="40000"/>
-                      </a:schemeClr>
-                    </a:solidFill>
-                  </a:tcPr>
-                </a:tc>
-                <a:tc>
-                  <a:txBody>
-                    <a:bodyPr/>
-                    <a:lstStyle/>
-                    <a:p>
-                      <a:pPr algn="l"/>
-                      <a:r>
-                        <a:rPr lang="en-CA" sz="1100">
-                          <a:latin typeface="Arial" panose="020B0604020202020204" pitchFamily="34" charset="0"/>
-                          <a:cs typeface="Arial" panose="020B0604020202020204" pitchFamily="34" charset="0"/>
-                        </a:rPr>
-                        <a:t>-8 (76)</a:t>
-                      </a:r>
-                    </a:p>
-                  </a:txBody>
-                  <a:tcPr anchor="ctr">
-                    <a:solidFill>
-                      <a:schemeClr val="accent1">
-                        <a:lumMod val="60000"/>
-                        <a:lumOff val="40000"/>
-                      </a:schemeClr>
-                    </a:solidFill>
-                  </a:tcPr>
-                </a:tc>
-                <a:tc>
-                  <a:txBody>
-                    <a:bodyPr/>
-                    <a:lstStyle/>
-                    <a:p>
-                      <a:pPr algn="l"/>
-                      <a:r>
-                        <a:rPr lang="en-CA" sz="1100">
-                          <a:latin typeface="Arial" panose="020B0604020202020204" pitchFamily="34" charset="0"/>
-                          <a:cs typeface="Arial" panose="020B0604020202020204" pitchFamily="34" charset="0"/>
-                        </a:rPr>
-                        <a:t>-19 (23)</a:t>
-                      </a:r>
-                    </a:p>
-                  </a:txBody>
-                  <a:tcPr anchor="ctr">
-                    <a:solidFill>
-                      <a:schemeClr val="accent1">
-                        <a:lumMod val="60000"/>
-                        <a:lumOff val="40000"/>
-                      </a:schemeClr>
-                    </a:solidFill>
-                  </a:tcPr>
-                </a:tc>
-                <a:tc>
-                  <a:txBody>
-                    <a:bodyPr/>
-                    <a:lstStyle/>
-                    <a:p>
-                      <a:pPr algn="l"/>
-                      <a:r>
-                        <a:rPr lang="en-CA" sz="1100">
-                          <a:latin typeface="Arial" panose="020B0604020202020204" pitchFamily="34" charset="0"/>
-                          <a:cs typeface="Arial" panose="020B0604020202020204" pitchFamily="34" charset="0"/>
-                        </a:rPr>
-                        <a:t>-32 (3)</a:t>
-                      </a:r>
-                    </a:p>
-                  </a:txBody>
-                  <a:tcPr anchor="ctr">
-                    <a:solidFill>
-                      <a:schemeClr val="accent1">
-                        <a:lumMod val="60000"/>
-                        <a:lumOff val="40000"/>
-                      </a:schemeClr>
-                    </a:solidFill>
-                  </a:tcPr>
-                </a:tc>
-                <a:tc>
-                  <a:txBody>
-                    <a:bodyPr/>
-                    <a:lstStyle/>
-                    <a:p>
-                      <a:pPr algn="l"/>
-                      <a:r>
-                        <a:rPr lang="en-CA" sz="1100" dirty="0">
-                          <a:latin typeface="Arial" panose="020B0604020202020204" pitchFamily="34" charset="0"/>
-                          <a:cs typeface="Arial" panose="020B0604020202020204" pitchFamily="34" charset="0"/>
-                        </a:rPr>
-                        <a:t>-47 (0)</a:t>
                       </a:r>
                     </a:p>
                   </a:txBody>
@@ -5951,14 +5550,14 @@
           <p:nvPr>
             <p:extLst>
               <p:ext uri="{D42A27DB-BD31-4B8C-83A1-F6EECF244321}">
-                <p14:modId xmlns:p14="http://schemas.microsoft.com/office/powerpoint/2010/main" val="487992505"/>
+                <p14:modId xmlns:p14="http://schemas.microsoft.com/office/powerpoint/2010/main" val="3916840394"/>
               </p:ext>
             </p:extLst>
           </p:nvPr>
         </p:nvGraphicFramePr>
         <p:xfrm>
           <a:off x="525453" y="3541852"/>
-          <a:ext cx="10987859" cy="1965960"/>
+          <a:ext cx="5492948" cy="1965960"/>
         </p:xfrm>
         <a:graphic>
           <a:graphicData uri="http://schemas.openxmlformats.org/drawingml/2006/table">
@@ -5995,37 +5594,9 @@
                     </a:ext>
                   </a:extLst>
                 </a:gridCol>
-                <a:gridCol w="1375200">
-                  <a:extLst>
-                    <a:ext uri="{9D8B030D-6E8A-4147-A177-3AD203B41FA5}">
-                      <a16:colId xmlns:a16="http://schemas.microsoft.com/office/drawing/2014/main" val="3016002565"/>
-                    </a:ext>
-                  </a:extLst>
-                </a:gridCol>
-                <a:gridCol w="1373237">
-                  <a:extLst>
-                    <a:ext uri="{9D8B030D-6E8A-4147-A177-3AD203B41FA5}">
-                      <a16:colId xmlns:a16="http://schemas.microsoft.com/office/drawing/2014/main" val="3297319028"/>
-                    </a:ext>
-                  </a:extLst>
-                </a:gridCol>
-                <a:gridCol w="1373237">
-                  <a:extLst>
-                    <a:ext uri="{9D8B030D-6E8A-4147-A177-3AD203B41FA5}">
-                      <a16:colId xmlns:a16="http://schemas.microsoft.com/office/drawing/2014/main" val="1620758043"/>
-                    </a:ext>
-                  </a:extLst>
-                </a:gridCol>
-                <a:gridCol w="1373237">
-                  <a:extLst>
-                    <a:ext uri="{9D8B030D-6E8A-4147-A177-3AD203B41FA5}">
-                      <a16:colId xmlns:a16="http://schemas.microsoft.com/office/drawing/2014/main" val="1413898383"/>
-                    </a:ext>
-                  </a:extLst>
-                </a:gridCol>
               </a:tblGrid>
               <a:tr h="252000">
-                <a:tc gridSpan="8">
+                <a:tc gridSpan="4">
                   <a:txBody>
                     <a:bodyPr/>
                     <a:lstStyle/>
@@ -6143,118 +5714,6 @@
                     <a:noFill/>
                   </a:tcPr>
                 </a:tc>
-                <a:tc hMerge="1">
-                  <a:txBody>
-                    <a:bodyPr/>
-                    <a:lstStyle/>
-                    <a:p>
-                      <a:pPr algn="l"/>
-                      <a:endParaRPr lang="en-CA" sz="1100">
-                        <a:latin typeface="Arial" panose="020B0604020202020204" pitchFamily="34" charset="0"/>
-                        <a:cs typeface="Arial" panose="020B0604020202020204" pitchFamily="34" charset="0"/>
-                      </a:endParaRPr>
-                    </a:p>
-                  </a:txBody>
-                  <a:tcPr anchor="ctr">
-                    <a:lnL>
-                      <a:noFill/>
-                    </a:lnL>
-                    <a:lnR>
-                      <a:noFill/>
-                    </a:lnR>
-                    <a:lnT>
-                      <a:noFill/>
-                    </a:lnT>
-                    <a:lnB>
-                      <a:noFill/>
-                    </a:lnB>
-                    <a:noFill/>
-                  </a:tcPr>
-                </a:tc>
-                <a:tc hMerge="1">
-                  <a:txBody>
-                    <a:bodyPr/>
-                    <a:lstStyle/>
-                    <a:p>
-                      <a:pPr algn="l"/>
-                      <a:endParaRPr lang="en-CA" sz="1100">
-                        <a:latin typeface="Arial" panose="020B0604020202020204" pitchFamily="34" charset="0"/>
-                        <a:cs typeface="Arial" panose="020B0604020202020204" pitchFamily="34" charset="0"/>
-                      </a:endParaRPr>
-                    </a:p>
-                  </a:txBody>
-                  <a:tcPr anchor="ctr">
-                    <a:lnL>
-                      <a:noFill/>
-                    </a:lnL>
-                    <a:lnR>
-                      <a:noFill/>
-                    </a:lnR>
-                    <a:lnT>
-                      <a:noFill/>
-                    </a:lnT>
-                    <a:lnB>
-                      <a:noFill/>
-                    </a:lnB>
-                    <a:noFill/>
-                  </a:tcPr>
-                </a:tc>
-                <a:tc hMerge="1">
-                  <a:txBody>
-                    <a:bodyPr/>
-                    <a:lstStyle/>
-                    <a:p>
-                      <a:pPr algn="l"/>
-                      <a:endParaRPr lang="en-CA" sz="1100">
-                        <a:latin typeface="Arial" panose="020B0604020202020204" pitchFamily="34" charset="0"/>
-                        <a:cs typeface="Arial" panose="020B0604020202020204" pitchFamily="34" charset="0"/>
-                      </a:endParaRPr>
-                    </a:p>
-                  </a:txBody>
-                  <a:tcPr anchor="ctr">
-                    <a:lnL>
-                      <a:noFill/>
-                    </a:lnL>
-                    <a:lnR>
-                      <a:noFill/>
-                    </a:lnR>
-                    <a:lnT>
-                      <a:noFill/>
-                    </a:lnT>
-                    <a:lnB>
-                      <a:noFill/>
-                    </a:lnB>
-                    <a:noFill/>
-                  </a:tcPr>
-                </a:tc>
-                <a:tc hMerge="1">
-                  <a:txBody>
-                    <a:bodyPr/>
-                    <a:lstStyle/>
-                    <a:p>
-                      <a:pPr algn="l"/>
-                      <a:endParaRPr lang="en-CA" sz="1100" dirty="0">
-                        <a:latin typeface="Arial" panose="020B0604020202020204" pitchFamily="34" charset="0"/>
-                        <a:cs typeface="Arial" panose="020B0604020202020204" pitchFamily="34" charset="0"/>
-                      </a:endParaRPr>
-                    </a:p>
-                  </a:txBody>
-                  <a:tcPr anchor="ctr">
-                    <a:lnL>
-                      <a:noFill/>
-                    </a:lnL>
-                    <a:lnR>
-                      <a:noFill/>
-                    </a:lnR>
-                    <a:lnT>
-                      <a:noFill/>
-                    </a:lnT>
-                    <a:lnB>
-                      <a:noFill/>
-                    </a:lnB>
-                    <a:noFill/>
-                  </a:tcPr>
-                </a:tc>
                 <a:extLst>
                   <a:ext uri="{0D108BD9-81ED-4DB2-BD59-A6C34878D82A}">
                     <a16:rowId xmlns:a16="http://schemas.microsoft.com/office/drawing/2014/main" val="1903597535"/>
@@ -6325,74 +5784,6 @@
                           <a:cs typeface="Arial" panose="020B0604020202020204" pitchFamily="34" charset="0"/>
                         </a:rPr>
                         <a:t>Exposure misclassification: 8 hr exposure instead of 12 hr</a:t>
-                      </a:r>
-                    </a:p>
-                  </a:txBody>
-                  <a:tcPr anchor="ctr"/>
-                </a:tc>
-                <a:tc>
-                  <a:txBody>
-                    <a:bodyPr/>
-                    <a:lstStyle/>
-                    <a:p>
-                      <a:pPr algn="l"/>
-                      <a:r>
-                        <a:rPr lang="en-CA" sz="1100" dirty="0">
-                          <a:latin typeface="Arial" panose="020B0604020202020204" pitchFamily="34" charset="0"/>
-                          <a:cs typeface="Arial" panose="020B0604020202020204" pitchFamily="34" charset="0"/>
-                        </a:rPr>
-                        <a:t>10 percent missingness</a:t>
-                      </a:r>
-                    </a:p>
-                  </a:txBody>
-                  <a:tcPr anchor="ctr"/>
-                </a:tc>
-                <a:tc>
-                  <a:txBody>
-                    <a:bodyPr/>
-                    <a:lstStyle/>
-                    <a:p>
-                      <a:pPr algn="l"/>
-                      <a:r>
-                        <a:rPr lang="en-CA" sz="1100">
-                          <a:latin typeface="Arial" panose="020B0604020202020204" pitchFamily="34" charset="0"/>
-                          <a:cs typeface="Arial" panose="020B0604020202020204" pitchFamily="34" charset="0"/>
-                        </a:rPr>
-                        <a:t>30 percent missingness</a:t>
-                      </a:r>
-                    </a:p>
-                  </a:txBody>
-                  <a:tcPr anchor="ctr"/>
-                </a:tc>
-                <a:tc>
-                  <a:txBody>
-                    <a:bodyPr/>
-                    <a:lstStyle/>
-                    <a:p>
-                      <a:pPr algn="l"/>
-                      <a:r>
-                        <a:rPr lang="en-CA" sz="1100">
-                          <a:latin typeface="Arial" panose="020B0604020202020204" pitchFamily="34" charset="0"/>
-                          <a:cs typeface="Arial" panose="020B0604020202020204" pitchFamily="34" charset="0"/>
-                        </a:rPr>
-                        <a:t>50 percent missingness</a:t>
-                      </a:r>
-                    </a:p>
-                  </a:txBody>
-                  <a:tcPr anchor="ctr"/>
-                </a:tc>
-                <a:tc>
-                  <a:txBody>
-                    <a:bodyPr/>
-                    <a:lstStyle/>
-                    <a:p>
-                      <a:pPr algn="l"/>
-                      <a:r>
-                        <a:rPr lang="en-CA" sz="1100" dirty="0">
-                          <a:latin typeface="Arial" panose="020B0604020202020204" pitchFamily="34" charset="0"/>
-                          <a:cs typeface="Arial" panose="020B0604020202020204" pitchFamily="34" charset="0"/>
-                        </a:rPr>
-                        <a:t>70 percent missingness</a:t>
                       </a:r>
                     </a:p>
                   </a:txBody>
@@ -6501,6 +5892,30 @@
                     </a:solidFill>
                   </a:tcPr>
                 </a:tc>
+                <a:extLst>
+                  <a:ext uri="{0D108BD9-81ED-4DB2-BD59-A6C34878D82A}">
+                    <a16:rowId xmlns:a16="http://schemas.microsoft.com/office/drawing/2014/main" val="3114814552"/>
+                  </a:ext>
+                </a:extLst>
+              </a:tr>
+              <a:tr h="252000">
+                <a:tc>
+                  <a:txBody>
+                    <a:bodyPr/>
+                    <a:lstStyle/>
+                    <a:p>
+                      <a:pPr algn="l"/>
+                      <a:r>
+                        <a:rPr lang="en-CA" sz="1100" dirty="0">
+                          <a:latin typeface="Arial" panose="020B0604020202020204" pitchFamily="34" charset="0"/>
+                          <a:cs typeface="Arial" panose="020B0604020202020204" pitchFamily="34" charset="0"/>
+                        </a:rPr>
+                        <a:t>1%</a:t>
+                      </a:r>
+                    </a:p>
+                  </a:txBody>
+                  <a:tcPr anchor="ctr"/>
+                </a:tc>
                 <a:tc>
                   <a:txBody>
                     <a:bodyPr/>
@@ -6512,7 +5927,65 @@
                           <a:latin typeface="Arial" panose="020B0604020202020204" pitchFamily="34" charset="0"/>
                           <a:cs typeface="Arial" panose="020B0604020202020204" pitchFamily="34" charset="0"/>
                         </a:rPr>
-                        <a:t>-10 (72)</a:t>
+                        <a:t>-2 (69)</a:t>
+                      </a:r>
+                    </a:p>
+                  </a:txBody>
+                  <a:tcPr anchor="ctr"/>
+                </a:tc>
+                <a:tc>
+                  <a:txBody>
+                    <a:bodyPr/>
+                    <a:lstStyle/>
+                    <a:p>
+                      <a:pPr algn="l"/>
+                      <a:r>
+                        <a:rPr lang="en-CA" sz="1100">
+                          <a:latin typeface="Arial" panose="020B0604020202020204" pitchFamily="34" charset="0"/>
+                          <a:cs typeface="Arial" panose="020B0604020202020204" pitchFamily="34" charset="0"/>
+                        </a:rPr>
+                        <a:t>0 (75)</a:t>
+                      </a:r>
+                    </a:p>
+                  </a:txBody>
+                  <a:tcPr anchor="ctr"/>
+                </a:tc>
+                <a:tc>
+                  <a:txBody>
+                    <a:bodyPr/>
+                    <a:lstStyle/>
+                    <a:p>
+                      <a:pPr algn="l"/>
+                      <a:r>
+                        <a:rPr lang="en-CA" sz="1100">
+                          <a:latin typeface="Arial" panose="020B0604020202020204" pitchFamily="34" charset="0"/>
+                          <a:cs typeface="Arial" panose="020B0604020202020204" pitchFamily="34" charset="0"/>
+                        </a:rPr>
+                        <a:t>-68 (7)</a:t>
+                      </a:r>
+                    </a:p>
+                  </a:txBody>
+                  <a:tcPr anchor="ctr"/>
+                </a:tc>
+                <a:extLst>
+                  <a:ext uri="{0D108BD9-81ED-4DB2-BD59-A6C34878D82A}">
+                    <a16:rowId xmlns:a16="http://schemas.microsoft.com/office/drawing/2014/main" val="168460837"/>
+                  </a:ext>
+                </a:extLst>
+              </a:tr>
+              <a:tr h="252000">
+                <a:tc>
+                  <a:txBody>
+                    <a:bodyPr/>
+                    <a:lstStyle/>
+                    <a:p>
+                      <a:pPr algn="l"/>
+                      <a:r>
+                        <a:rPr lang="en-CA" sz="1100" dirty="0">
+                          <a:latin typeface="Arial" panose="020B0604020202020204" pitchFamily="34" charset="0"/>
+                          <a:cs typeface="Arial" panose="020B0604020202020204" pitchFamily="34" charset="0"/>
+                        </a:rPr>
+                        <a:t>5%</a:t>
                       </a:r>
                     </a:p>
                   </a:txBody>
@@ -6536,7 +6009,7 @@
                           <a:latin typeface="Arial" panose="020B0604020202020204" pitchFamily="34" charset="0"/>
                           <a:cs typeface="Arial" panose="020B0604020202020204" pitchFamily="34" charset="0"/>
                         </a:rPr>
-                        <a:t>-18 (77)</a:t>
+                        <a:t>-3 (70)</a:t>
                       </a:r>
                     </a:p>
                   </a:txBody>
@@ -6556,11 +6029,11 @@
                     <a:p>
                       <a:pPr algn="l"/>
                       <a:r>
-                        <a:rPr lang="en-CA" sz="1100" dirty="0">
+                        <a:rPr lang="en-CA" sz="1100">
                           <a:latin typeface="Arial" panose="020B0604020202020204" pitchFamily="34" charset="0"/>
                           <a:cs typeface="Arial" panose="020B0604020202020204" pitchFamily="34" charset="0"/>
                         </a:rPr>
-                        <a:t>-26 (67)</a:t>
+                        <a:t>-8 (36)</a:t>
                       </a:r>
                     </a:p>
                   </a:txBody>
@@ -6584,349 +6057,7 @@
                           <a:latin typeface="Arial" panose="020B0604020202020204" pitchFamily="34" charset="0"/>
                           <a:cs typeface="Arial" panose="020B0604020202020204" pitchFamily="34" charset="0"/>
                         </a:rPr>
-                        <a:t>-44 (62)</a:t>
-                      </a:r>
-                    </a:p>
-                  </a:txBody>
-                  <a:tcPr anchor="ctr">
-                    <a:solidFill>
-                      <a:schemeClr val="accent1">
-                        <a:lumMod val="60000"/>
-                        <a:lumOff val="40000"/>
-                      </a:schemeClr>
-                    </a:solidFill>
-                  </a:tcPr>
-                </a:tc>
-                <a:extLst>
-                  <a:ext uri="{0D108BD9-81ED-4DB2-BD59-A6C34878D82A}">
-                    <a16:rowId xmlns:a16="http://schemas.microsoft.com/office/drawing/2014/main" val="3114814552"/>
-                  </a:ext>
-                </a:extLst>
-              </a:tr>
-              <a:tr h="252000">
-                <a:tc>
-                  <a:txBody>
-                    <a:bodyPr/>
-                    <a:lstStyle/>
-                    <a:p>
-                      <a:pPr algn="l"/>
-                      <a:r>
-                        <a:rPr lang="en-CA" sz="1100" dirty="0">
-                          <a:latin typeface="Arial" panose="020B0604020202020204" pitchFamily="34" charset="0"/>
-                          <a:cs typeface="Arial" panose="020B0604020202020204" pitchFamily="34" charset="0"/>
-                        </a:rPr>
-                        <a:t>1%</a:t>
-                      </a:r>
-                    </a:p>
-                  </a:txBody>
-                  <a:tcPr anchor="ctr"/>
-                </a:tc>
-                <a:tc>
-                  <a:txBody>
-                    <a:bodyPr/>
-                    <a:lstStyle/>
-                    <a:p>
-                      <a:pPr algn="l"/>
-                      <a:r>
-                        <a:rPr lang="en-CA" sz="1100">
-                          <a:latin typeface="Arial" panose="020B0604020202020204" pitchFamily="34" charset="0"/>
-                          <a:cs typeface="Arial" panose="020B0604020202020204" pitchFamily="34" charset="0"/>
-                        </a:rPr>
-                        <a:t>-2 (69)</a:t>
-                      </a:r>
-                    </a:p>
-                  </a:txBody>
-                  <a:tcPr anchor="ctr"/>
-                </a:tc>
-                <a:tc>
-                  <a:txBody>
-                    <a:bodyPr/>
-                    <a:lstStyle/>
-                    <a:p>
-                      <a:pPr algn="l"/>
-                      <a:r>
-                        <a:rPr lang="en-CA" sz="1100">
-                          <a:latin typeface="Arial" panose="020B0604020202020204" pitchFamily="34" charset="0"/>
-                          <a:cs typeface="Arial" panose="020B0604020202020204" pitchFamily="34" charset="0"/>
-                        </a:rPr>
-                        <a:t>0 (75)</a:t>
-                      </a:r>
-                    </a:p>
-                  </a:txBody>
-                  <a:tcPr anchor="ctr"/>
-                </a:tc>
-                <a:tc>
-                  <a:txBody>
-                    <a:bodyPr/>
-                    <a:lstStyle/>
-                    <a:p>
-                      <a:pPr algn="l"/>
-                      <a:r>
-                        <a:rPr lang="en-CA" sz="1100">
-                          <a:latin typeface="Arial" panose="020B0604020202020204" pitchFamily="34" charset="0"/>
-                          <a:cs typeface="Arial" panose="020B0604020202020204" pitchFamily="34" charset="0"/>
-                        </a:rPr>
-                        <a:t>-68 (7)</a:t>
-                      </a:r>
-                    </a:p>
-                  </a:txBody>
-                  <a:tcPr anchor="ctr"/>
-                </a:tc>
-                <a:tc>
-                  <a:txBody>
-                    <a:bodyPr/>
-                    <a:lstStyle/>
-                    <a:p>
-                      <a:pPr algn="l"/>
-                      <a:r>
-                        <a:rPr lang="en-CA" sz="1100">
-                          <a:latin typeface="Arial" panose="020B0604020202020204" pitchFamily="34" charset="0"/>
-                          <a:cs typeface="Arial" panose="020B0604020202020204" pitchFamily="34" charset="0"/>
-                        </a:rPr>
-                        <a:t>-3 (78)</a:t>
-                      </a:r>
-                    </a:p>
-                  </a:txBody>
-                  <a:tcPr anchor="ctr"/>
-                </a:tc>
-                <a:tc>
-                  <a:txBody>
-                    <a:bodyPr/>
-                    <a:lstStyle/>
-                    <a:p>
-                      <a:pPr algn="l"/>
-                      <a:r>
-                        <a:rPr lang="en-CA" sz="1100">
-                          <a:latin typeface="Arial" panose="020B0604020202020204" pitchFamily="34" charset="0"/>
-                          <a:cs typeface="Arial" panose="020B0604020202020204" pitchFamily="34" charset="0"/>
-                        </a:rPr>
-                        <a:t>-20 (58)</a:t>
-                      </a:r>
-                    </a:p>
-                  </a:txBody>
-                  <a:tcPr anchor="ctr"/>
-                </a:tc>
-                <a:tc>
-                  <a:txBody>
-                    <a:bodyPr/>
-                    <a:lstStyle/>
-                    <a:p>
-                      <a:pPr algn="l"/>
-                      <a:r>
-                        <a:rPr lang="en-CA" sz="1100">
-                          <a:latin typeface="Arial" panose="020B0604020202020204" pitchFamily="34" charset="0"/>
-                          <a:cs typeface="Arial" panose="020B0604020202020204" pitchFamily="34" charset="0"/>
-                        </a:rPr>
-                        <a:t>-29 (54)</a:t>
-                      </a:r>
-                    </a:p>
-                  </a:txBody>
-                  <a:tcPr anchor="ctr"/>
-                </a:tc>
-                <a:tc>
-                  <a:txBody>
-                    <a:bodyPr/>
-                    <a:lstStyle/>
-                    <a:p>
-                      <a:pPr algn="l"/>
-                      <a:r>
-                        <a:rPr lang="en-CA" sz="1100" dirty="0">
-                          <a:latin typeface="Arial" panose="020B0604020202020204" pitchFamily="34" charset="0"/>
-                          <a:cs typeface="Arial" panose="020B0604020202020204" pitchFamily="34" charset="0"/>
-                        </a:rPr>
-                        <a:t>-50 (26)</a:t>
-                      </a:r>
-                    </a:p>
-                  </a:txBody>
-                  <a:tcPr anchor="ctr"/>
-                </a:tc>
-                <a:extLst>
-                  <a:ext uri="{0D108BD9-81ED-4DB2-BD59-A6C34878D82A}">
-                    <a16:rowId xmlns:a16="http://schemas.microsoft.com/office/drawing/2014/main" val="168460837"/>
-                  </a:ext>
-                </a:extLst>
-              </a:tr>
-              <a:tr h="252000">
-                <a:tc>
-                  <a:txBody>
-                    <a:bodyPr/>
-                    <a:lstStyle/>
-                    <a:p>
-                      <a:pPr algn="l"/>
-                      <a:r>
-                        <a:rPr lang="en-CA" sz="1100" dirty="0">
-                          <a:latin typeface="Arial" panose="020B0604020202020204" pitchFamily="34" charset="0"/>
-                          <a:cs typeface="Arial" panose="020B0604020202020204" pitchFamily="34" charset="0"/>
-                        </a:rPr>
-                        <a:t>5%</a:t>
-                      </a:r>
-                    </a:p>
-                  </a:txBody>
-                  <a:tcPr anchor="ctr">
-                    <a:solidFill>
-                      <a:schemeClr val="accent1">
-                        <a:lumMod val="60000"/>
-                        <a:lumOff val="40000"/>
-                      </a:schemeClr>
-                    </a:solidFill>
-                  </a:tcPr>
-                </a:tc>
-                <a:tc>
-                  <a:txBody>
-                    <a:bodyPr/>
-                    <a:lstStyle/>
-                    <a:p>
-                      <a:pPr algn="l"/>
-                      <a:r>
-                        <a:rPr lang="en-CA" sz="1100">
-                          <a:latin typeface="Arial" panose="020B0604020202020204" pitchFamily="34" charset="0"/>
-                          <a:cs typeface="Arial" panose="020B0604020202020204" pitchFamily="34" charset="0"/>
-                        </a:rPr>
-                        <a:t>-3 (70)</a:t>
-                      </a:r>
-                    </a:p>
-                  </a:txBody>
-                  <a:tcPr anchor="ctr">
-                    <a:solidFill>
-                      <a:schemeClr val="accent1">
-                        <a:lumMod val="60000"/>
-                        <a:lumOff val="40000"/>
-                      </a:schemeClr>
-                    </a:solidFill>
-                  </a:tcPr>
-                </a:tc>
-                <a:tc>
-                  <a:txBody>
-                    <a:bodyPr/>
-                    <a:lstStyle/>
-                    <a:p>
-                      <a:pPr algn="l"/>
-                      <a:r>
-                        <a:rPr lang="en-CA" sz="1100">
-                          <a:latin typeface="Arial" panose="020B0604020202020204" pitchFamily="34" charset="0"/>
-                          <a:cs typeface="Arial" panose="020B0604020202020204" pitchFamily="34" charset="0"/>
-                        </a:rPr>
-                        <a:t>-8 (36)</a:t>
-                      </a:r>
-                    </a:p>
-                  </a:txBody>
-                  <a:tcPr anchor="ctr">
-                    <a:solidFill>
-                      <a:schemeClr val="accent1">
-                        <a:lumMod val="60000"/>
-                        <a:lumOff val="40000"/>
-                      </a:schemeClr>
-                    </a:solidFill>
-                  </a:tcPr>
-                </a:tc>
-                <a:tc>
-                  <a:txBody>
-                    <a:bodyPr/>
-                    <a:lstStyle/>
-                    <a:p>
-                      <a:pPr algn="l"/>
-                      <a:r>
-                        <a:rPr lang="en-CA" sz="1100">
-                          <a:latin typeface="Arial" panose="020B0604020202020204" pitchFamily="34" charset="0"/>
-                          <a:cs typeface="Arial" panose="020B0604020202020204" pitchFamily="34" charset="0"/>
-                        </a:rPr>
                         <a:t>-70 (0)</a:t>
-                      </a:r>
-                    </a:p>
-                  </a:txBody>
-                  <a:tcPr anchor="ctr">
-                    <a:solidFill>
-                      <a:schemeClr val="accent1">
-                        <a:lumMod val="60000"/>
-                        <a:lumOff val="40000"/>
-                      </a:schemeClr>
-                    </a:solidFill>
-                  </a:tcPr>
-                </a:tc>
-                <a:tc>
-                  <a:txBody>
-                    <a:bodyPr/>
-                    <a:lstStyle/>
-                    <a:p>
-                      <a:pPr algn="l"/>
-                      <a:r>
-                        <a:rPr lang="en-CA" sz="1100">
-                          <a:latin typeface="Arial" panose="020B0604020202020204" pitchFamily="34" charset="0"/>
-                          <a:cs typeface="Arial" panose="020B0604020202020204" pitchFamily="34" charset="0"/>
-                        </a:rPr>
-                        <a:t>-7 (45)</a:t>
-                      </a:r>
-                    </a:p>
-                  </a:txBody>
-                  <a:tcPr anchor="ctr">
-                    <a:solidFill>
-                      <a:schemeClr val="accent1">
-                        <a:lumMod val="60000"/>
-                        <a:lumOff val="40000"/>
-                      </a:schemeClr>
-                    </a:solidFill>
-                  </a:tcPr>
-                </a:tc>
-                <a:tc>
-                  <a:txBody>
-                    <a:bodyPr/>
-                    <a:lstStyle/>
-                    <a:p>
-                      <a:pPr algn="l"/>
-                      <a:r>
-                        <a:rPr lang="en-CA" sz="1100">
-                          <a:latin typeface="Arial" panose="020B0604020202020204" pitchFamily="34" charset="0"/>
-                          <a:cs typeface="Arial" panose="020B0604020202020204" pitchFamily="34" charset="0"/>
-                        </a:rPr>
-                        <a:t>-20 (6)</a:t>
-                      </a:r>
-                    </a:p>
-                  </a:txBody>
-                  <a:tcPr anchor="ctr">
-                    <a:solidFill>
-                      <a:schemeClr val="accent1">
-                        <a:lumMod val="60000"/>
-                        <a:lumOff val="40000"/>
-                      </a:schemeClr>
-                    </a:solidFill>
-                  </a:tcPr>
-                </a:tc>
-                <a:tc>
-                  <a:txBody>
-                    <a:bodyPr/>
-                    <a:lstStyle/>
-                    <a:p>
-                      <a:pPr algn="l"/>
-                      <a:r>
-                        <a:rPr lang="en-CA" sz="1100">
-                          <a:latin typeface="Arial" panose="020B0604020202020204" pitchFamily="34" charset="0"/>
-                          <a:cs typeface="Arial" panose="020B0604020202020204" pitchFamily="34" charset="0"/>
-                        </a:rPr>
-                        <a:t>-32 (1)</a:t>
-                      </a:r>
-                    </a:p>
-                  </a:txBody>
-                  <a:tcPr anchor="ctr">
-                    <a:solidFill>
-                      <a:schemeClr val="accent1">
-                        <a:lumMod val="60000"/>
-                        <a:lumOff val="40000"/>
-                      </a:schemeClr>
-                    </a:solidFill>
-                  </a:tcPr>
-                </a:tc>
-                <a:tc>
-                  <a:txBody>
-                    <a:bodyPr/>
-                    <a:lstStyle/>
-                    <a:p>
-                      <a:pPr algn="l"/>
-                      <a:r>
-                        <a:rPr lang="en-CA" sz="1100" dirty="0">
-                          <a:latin typeface="Arial" panose="020B0604020202020204" pitchFamily="34" charset="0"/>
-                          <a:cs typeface="Arial" panose="020B0604020202020204" pitchFamily="34" charset="0"/>
-                        </a:rPr>
-                        <a:t>-48 (0)</a:t>
                       </a:r>
                     </a:p>
                   </a:txBody>
@@ -7072,6 +6203,1890 @@
     <p:extLst>
       <p:ext uri="{BB962C8B-B14F-4D97-AF65-F5344CB8AC3E}">
         <p14:creationId xmlns:p14="http://schemas.microsoft.com/office/powerpoint/2010/main" val="993042122"/>
+      </p:ext>
+    </p:extLst>
+  </p:cSld>
+  <p:clrMapOvr>
+    <a:masterClrMapping/>
+  </p:clrMapOvr>
+</p:sld>
+</file>
+
+<file path=ppt/slides/slide5.xml><?xml version="1.0" encoding="utf-8"?>
+<p:sld xmlns:a="http://schemas.openxmlformats.org/drawingml/2006/main" xmlns:r="http://schemas.openxmlformats.org/officeDocument/2006/relationships" xmlns:p="http://schemas.openxmlformats.org/presentationml/2006/main">
+  <p:cSld>
+    <p:spTree>
+      <p:nvGrpSpPr>
+        <p:cNvPr id="1" name=""/>
+        <p:cNvGrpSpPr/>
+        <p:nvPr/>
+      </p:nvGrpSpPr>
+      <p:grpSpPr>
+        <a:xfrm>
+          <a:off x="0" y="0"/>
+          <a:ext cx="0" cy="0"/>
+          <a:chOff x="0" y="0"/>
+          <a:chExt cx="0" cy="0"/>
+        </a:xfrm>
+      </p:grpSpPr>
+      <p:graphicFrame>
+        <p:nvGraphicFramePr>
+          <p:cNvPr id="4" name="Table 3">
+            <a:extLst>
+              <a:ext uri="{FF2B5EF4-FFF2-40B4-BE49-F238E27FC236}">
+                <a16:creationId xmlns:a16="http://schemas.microsoft.com/office/drawing/2014/main" id="{C4A95BCD-E200-42BB-8098-35296347A609}"/>
+              </a:ext>
+            </a:extLst>
+          </p:cNvPr>
+          <p:cNvGraphicFramePr>
+            <a:graphicFrameLocks noGrp="1"/>
+          </p:cNvGraphicFramePr>
+          <p:nvPr>
+            <p:extLst>
+              <p:ext uri="{D42A27DB-BD31-4B8C-83A1-F6EECF244321}">
+                <p14:modId xmlns:p14="http://schemas.microsoft.com/office/powerpoint/2010/main" val="1470683712"/>
+              </p:ext>
+            </p:extLst>
+          </p:nvPr>
+        </p:nvGraphicFramePr>
+        <p:xfrm>
+          <a:off x="514023" y="2610328"/>
+          <a:ext cx="9270060" cy="2021903"/>
+        </p:xfrm>
+        <a:graphic>
+          <a:graphicData uri="http://schemas.openxmlformats.org/drawingml/2006/table">
+            <a:tbl>
+              <a:tblPr>
+                <a:tableStyleId>{22838BEF-8BB2-4498-84A7-C5851F593DF1}</a:tableStyleId>
+              </a:tblPr>
+              <a:tblGrid>
+                <a:gridCol w="1854012">
+                  <a:extLst>
+                    <a:ext uri="{9D8B030D-6E8A-4147-A177-3AD203B41FA5}">
+                      <a16:colId xmlns:a16="http://schemas.microsoft.com/office/drawing/2014/main" val="2122928611"/>
+                    </a:ext>
+                  </a:extLst>
+                </a:gridCol>
+                <a:gridCol w="1854012">
+                  <a:extLst>
+                    <a:ext uri="{9D8B030D-6E8A-4147-A177-3AD203B41FA5}">
+                      <a16:colId xmlns:a16="http://schemas.microsoft.com/office/drawing/2014/main" val="123828048"/>
+                    </a:ext>
+                  </a:extLst>
+                </a:gridCol>
+                <a:gridCol w="1854012">
+                  <a:extLst>
+                    <a:ext uri="{9D8B030D-6E8A-4147-A177-3AD203B41FA5}">
+                      <a16:colId xmlns:a16="http://schemas.microsoft.com/office/drawing/2014/main" val="3449117178"/>
+                    </a:ext>
+                  </a:extLst>
+                </a:gridCol>
+                <a:gridCol w="1854012">
+                  <a:extLst>
+                    <a:ext uri="{9D8B030D-6E8A-4147-A177-3AD203B41FA5}">
+                      <a16:colId xmlns:a16="http://schemas.microsoft.com/office/drawing/2014/main" val="2259402722"/>
+                    </a:ext>
+                  </a:extLst>
+                </a:gridCol>
+                <a:gridCol w="1854012">
+                  <a:extLst>
+                    <a:ext uri="{9D8B030D-6E8A-4147-A177-3AD203B41FA5}">
+                      <a16:colId xmlns:a16="http://schemas.microsoft.com/office/drawing/2014/main" val="514538102"/>
+                    </a:ext>
+                  </a:extLst>
+                </a:gridCol>
+              </a:tblGrid>
+              <a:tr h="586600">
+                <a:tc gridSpan="4">
+                  <a:txBody>
+                    <a:bodyPr/>
+                    <a:lstStyle/>
+                    <a:p>
+                      <a:pPr algn="l"/>
+                      <a:r>
+                        <a:rPr lang="en-CA" sz="1100" b="1" dirty="0">
+                          <a:latin typeface="Arial" panose="020B0604020202020204" pitchFamily="34" charset="0"/>
+                          <a:cs typeface="Arial" panose="020B0604020202020204" pitchFamily="34" charset="0"/>
+                        </a:rPr>
+                        <a:t>Table 1B: Results from case-crossover study design simulations, select cases of missingness </a:t>
+                      </a:r>
+                    </a:p>
+                    <a:p>
+                      <a:pPr algn="l"/>
+                      <a:r>
+                        <a:rPr lang="en-CA" sz="1100" b="1" dirty="0">
+                          <a:latin typeface="Arial" panose="020B0604020202020204" pitchFamily="34" charset="0"/>
+                          <a:cs typeface="Arial" panose="020B0604020202020204" pitchFamily="34" charset="0"/>
+                        </a:rPr>
+                        <a:t>Average percent bias (coverage)</a:t>
+                      </a:r>
+                    </a:p>
+                  </a:txBody>
+                  <a:tcPr marL="83680" marR="83680" marT="41840" marB="41840" anchor="ctr">
+                    <a:lnL w="12700" cmpd="sng">
+                      <a:noFill/>
+                    </a:lnL>
+                    <a:lnR w="12700" cmpd="sng">
+                      <a:noFill/>
+                    </a:lnR>
+                    <a:lnT w="12700" cmpd="sng">
+                      <a:noFill/>
+                    </a:lnT>
+                    <a:lnB w="12700" cmpd="sng">
+                      <a:noFill/>
+                    </a:lnB>
+                    <a:lnTlToBr w="12700" cmpd="sng">
+                      <a:noFill/>
+                      <a:prstDash val="solid"/>
+                    </a:lnTlToBr>
+                    <a:lnBlToTr w="12700" cmpd="sng">
+                      <a:noFill/>
+                      <a:prstDash val="solid"/>
+                    </a:lnBlToTr>
+                    <a:solidFill>
+                      <a:schemeClr val="accent1">
+                        <a:lumMod val="60000"/>
+                        <a:lumOff val="40000"/>
+                      </a:schemeClr>
+                    </a:solidFill>
+                  </a:tcPr>
+                </a:tc>
+                <a:tc hMerge="1">
+                  <a:txBody>
+                    <a:bodyPr/>
+                    <a:lstStyle/>
+                    <a:p>
+                      <a:endParaRPr dirty="0"/>
+                    </a:p>
+                  </a:txBody>
+                  <a:tcPr marL="83680" marR="83680" marT="41840" marB="41840" anchor="ctr"/>
+                </a:tc>
+                <a:tc hMerge="1">
+                  <a:txBody>
+                    <a:bodyPr/>
+                    <a:lstStyle/>
+                    <a:p>
+                      <a:pPr algn="l"/>
+                      <a:endParaRPr lang="en-CA" sz="1400" b="1" dirty="0"/>
+                    </a:p>
+                  </a:txBody>
+                  <a:tcPr marL="83680" marR="83680" marT="41840" marB="41840" anchor="ctr"/>
+                </a:tc>
+                <a:tc hMerge="1">
+                  <a:txBody>
+                    <a:bodyPr/>
+                    <a:lstStyle/>
+                    <a:p>
+                      <a:pPr algn="l"/>
+                      <a:endParaRPr lang="en-CA" sz="1400" b="1" dirty="0"/>
+                    </a:p>
+                  </a:txBody>
+                  <a:tcPr marL="83680" marR="83680" marT="41840" marB="41840" anchor="ctr"/>
+                </a:tc>
+                <a:tc>
+                  <a:txBody>
+                    <a:bodyPr/>
+                    <a:lstStyle/>
+                    <a:p>
+                      <a:pPr algn="l"/>
+                      <a:endParaRPr lang="en-CA" sz="1100" b="1" dirty="0">
+                        <a:latin typeface="Arial" panose="020B0604020202020204" pitchFamily="34" charset="0"/>
+                        <a:cs typeface="Arial" panose="020B0604020202020204" pitchFamily="34" charset="0"/>
+                      </a:endParaRPr>
+                    </a:p>
+                  </a:txBody>
+                  <a:tcPr marL="83680" marR="83680" marT="41840" marB="41840" anchor="ctr">
+                    <a:lnL w="12700" cmpd="sng">
+                      <a:noFill/>
+                    </a:lnL>
+                    <a:lnR w="12700" cmpd="sng">
+                      <a:noFill/>
+                    </a:lnR>
+                    <a:lnT w="12700" cmpd="sng">
+                      <a:noFill/>
+                    </a:lnT>
+                    <a:lnB w="12700" cmpd="sng">
+                      <a:noFill/>
+                    </a:lnB>
+                    <a:lnTlToBr w="12700" cmpd="sng">
+                      <a:noFill/>
+                      <a:prstDash val="solid"/>
+                    </a:lnTlToBr>
+                    <a:lnBlToTr w="12700" cmpd="sng">
+                      <a:noFill/>
+                      <a:prstDash val="solid"/>
+                    </a:lnBlToTr>
+                    <a:solidFill>
+                      <a:schemeClr val="accent1">
+                        <a:lumMod val="60000"/>
+                        <a:lumOff val="40000"/>
+                      </a:schemeClr>
+                    </a:solidFill>
+                  </a:tcPr>
+                </a:tc>
+                <a:extLst>
+                  <a:ext uri="{0D108BD9-81ED-4DB2-BD59-A6C34878D82A}">
+                    <a16:rowId xmlns:a16="http://schemas.microsoft.com/office/drawing/2014/main" val="3943850057"/>
+                  </a:ext>
+                </a:extLst>
+              </a:tr>
+              <a:tr h="654982">
+                <a:tc>
+                  <a:txBody>
+                    <a:bodyPr/>
+                    <a:lstStyle/>
+                    <a:p>
+                      <a:pPr algn="l"/>
+                      <a:r>
+                        <a:rPr lang="en-CA" sz="1100" dirty="0">
+                          <a:latin typeface="Arial" panose="020B0604020202020204" pitchFamily="34" charset="0"/>
+                          <a:cs typeface="Arial" panose="020B0604020202020204" pitchFamily="34" charset="0"/>
+                        </a:rPr>
+                        <a:t>True simulated effect size of power outage on hospitalization</a:t>
+                      </a:r>
+                    </a:p>
+                  </a:txBody>
+                  <a:tcPr anchor="ctr">
+                    <a:lnT w="12700" cmpd="sng">
+                      <a:noFill/>
+                    </a:lnT>
+                  </a:tcPr>
+                </a:tc>
+                <a:tc>
+                  <a:txBody>
+                    <a:bodyPr/>
+                    <a:lstStyle/>
+                    <a:p>
+                      <a:pPr algn="l"/>
+                      <a:r>
+                        <a:rPr lang="en-CA" sz="1100" dirty="0">
+                          <a:latin typeface="Arial" panose="020B0604020202020204" pitchFamily="34" charset="0"/>
+                          <a:cs typeface="Arial" panose="020B0604020202020204" pitchFamily="34" charset="0"/>
+                        </a:rPr>
+                        <a:t>No missing data</a:t>
+                      </a:r>
+                    </a:p>
+                  </a:txBody>
+                  <a:tcPr anchor="ctr">
+                    <a:lnT w="12700" cmpd="sng">
+                      <a:noFill/>
+                    </a:lnT>
+                  </a:tcPr>
+                </a:tc>
+                <a:tc>
+                  <a:txBody>
+                    <a:bodyPr/>
+                    <a:lstStyle/>
+                    <a:p>
+                      <a:pPr algn="l"/>
+                      <a:r>
+                        <a:rPr lang="en-CA" sz="1100" dirty="0">
+                          <a:latin typeface="Arial" panose="020B0604020202020204" pitchFamily="34" charset="0"/>
+                          <a:cs typeface="Arial" panose="020B0604020202020204" pitchFamily="34" charset="0"/>
+                        </a:rPr>
+                        <a:t>20% of counties missing 80% of data </a:t>
+                      </a:r>
+                    </a:p>
+                  </a:txBody>
+                  <a:tcPr anchor="ctr">
+                    <a:lnT w="12700" cmpd="sng">
+                      <a:noFill/>
+                    </a:lnT>
+                  </a:tcPr>
+                </a:tc>
+                <a:tc>
+                  <a:txBody>
+                    <a:bodyPr/>
+                    <a:lstStyle/>
+                    <a:p>
+                      <a:pPr algn="l"/>
+                      <a:r>
+                        <a:rPr lang="en-CA" sz="1100" dirty="0">
+                          <a:latin typeface="Arial" panose="020B0604020202020204" pitchFamily="34" charset="0"/>
+                          <a:cs typeface="Arial" panose="020B0604020202020204" pitchFamily="34" charset="0"/>
+                        </a:rPr>
+                        <a:t>50% of counties missing 80% of data </a:t>
+                      </a:r>
+                    </a:p>
+                  </a:txBody>
+                  <a:tcPr anchor="ctr">
+                    <a:lnT w="12700" cmpd="sng">
+                      <a:noFill/>
+                    </a:lnT>
+                  </a:tcPr>
+                </a:tc>
+                <a:tc>
+                  <a:txBody>
+                    <a:bodyPr/>
+                    <a:lstStyle/>
+                    <a:p>
+                      <a:pPr algn="l"/>
+                      <a:r>
+                        <a:rPr lang="en-CA" sz="1100" dirty="0">
+                          <a:latin typeface="Arial" panose="020B0604020202020204" pitchFamily="34" charset="0"/>
+                          <a:cs typeface="Arial" panose="020B0604020202020204" pitchFamily="34" charset="0"/>
+                        </a:rPr>
+                        <a:t>80% of counties missing 80% of data </a:t>
+                      </a:r>
+                    </a:p>
+                  </a:txBody>
+                  <a:tcPr anchor="ctr">
+                    <a:lnT w="12700" cmpd="sng">
+                      <a:noFill/>
+                    </a:lnT>
+                  </a:tcPr>
+                </a:tc>
+                <a:extLst>
+                  <a:ext uri="{0D108BD9-81ED-4DB2-BD59-A6C34878D82A}">
+                    <a16:rowId xmlns:a16="http://schemas.microsoft.com/office/drawing/2014/main" val="118549937"/>
+                  </a:ext>
+                </a:extLst>
+              </a:tr>
+              <a:tr h="260107">
+                <a:tc>
+                  <a:txBody>
+                    <a:bodyPr/>
+                    <a:lstStyle/>
+                    <a:p>
+                      <a:pPr algn="l"/>
+                      <a:r>
+                        <a:rPr lang="en-CA" sz="1100" dirty="0">
+                          <a:latin typeface="Arial" panose="020B0604020202020204" pitchFamily="34" charset="0"/>
+                          <a:cs typeface="Arial" panose="020B0604020202020204" pitchFamily="34" charset="0"/>
+                        </a:rPr>
+                        <a:t>0.5%</a:t>
+                      </a:r>
+                    </a:p>
+                  </a:txBody>
+                  <a:tcPr anchor="ctr">
+                    <a:solidFill>
+                      <a:schemeClr val="accent1">
+                        <a:lumMod val="60000"/>
+                        <a:lumOff val="40000"/>
+                      </a:schemeClr>
+                    </a:solidFill>
+                  </a:tcPr>
+                </a:tc>
+                <a:tc>
+                  <a:txBody>
+                    <a:bodyPr/>
+                    <a:lstStyle/>
+                    <a:p>
+                      <a:pPr algn="l"/>
+                      <a:r>
+                        <a:rPr lang="en-CA" sz="1100" b="0" i="0" kern="1200" dirty="0">
+                          <a:solidFill>
+                            <a:schemeClr val="dk1"/>
+                          </a:solidFill>
+                          <a:effectLst/>
+                          <a:latin typeface="Arial" panose="020B0604020202020204" pitchFamily="34" charset="0"/>
+                          <a:ea typeface="+mn-ea"/>
+                          <a:cs typeface="Arial" panose="020B0604020202020204" pitchFamily="34" charset="0"/>
+                        </a:rPr>
+                        <a:t>-9.1%</a:t>
+                      </a:r>
+                      <a:r>
+                        <a:rPr lang="en-CA" sz="1100" dirty="0">
+                          <a:latin typeface="Arial" panose="020B0604020202020204" pitchFamily="34" charset="0"/>
+                          <a:cs typeface="Arial" panose="020B0604020202020204" pitchFamily="34" charset="0"/>
+                        </a:rPr>
+                        <a:t> (95.8%)</a:t>
+                      </a:r>
+                    </a:p>
+                  </a:txBody>
+                  <a:tcPr anchor="ctr">
+                    <a:solidFill>
+                      <a:schemeClr val="accent1">
+                        <a:lumMod val="60000"/>
+                        <a:lumOff val="40000"/>
+                      </a:schemeClr>
+                    </a:solidFill>
+                  </a:tcPr>
+                </a:tc>
+                <a:tc>
+                  <a:txBody>
+                    <a:bodyPr/>
+                    <a:lstStyle/>
+                    <a:p>
+                      <a:pPr algn="l"/>
+                      <a:r>
+                        <a:rPr lang="en-CA" sz="1100" dirty="0">
+                          <a:latin typeface="Arial" panose="020B0604020202020204" pitchFamily="34" charset="0"/>
+                          <a:cs typeface="Arial" panose="020B0604020202020204" pitchFamily="34" charset="0"/>
+                        </a:rPr>
+                        <a:t>-6.3% </a:t>
+                      </a:r>
+                      <a:r>
+                        <a:rPr lang="en-US" sz="1100" dirty="0">
+                          <a:latin typeface="Arial" panose="020B0604020202020204" pitchFamily="34" charset="0"/>
+                          <a:cs typeface="Arial" panose="020B0604020202020204" pitchFamily="34" charset="0"/>
+                        </a:rPr>
+                        <a:t>(90.5%)</a:t>
+                      </a:r>
+                      <a:endParaRPr lang="en-CA" sz="1100" dirty="0">
+                        <a:latin typeface="Arial" panose="020B0604020202020204" pitchFamily="34" charset="0"/>
+                        <a:cs typeface="Arial" panose="020B0604020202020204" pitchFamily="34" charset="0"/>
+                      </a:endParaRPr>
+                    </a:p>
+                  </a:txBody>
+                  <a:tcPr anchor="ctr">
+                    <a:solidFill>
+                      <a:schemeClr val="accent1">
+                        <a:lumMod val="60000"/>
+                        <a:lumOff val="40000"/>
+                      </a:schemeClr>
+                    </a:solidFill>
+                  </a:tcPr>
+                </a:tc>
+                <a:tc>
+                  <a:txBody>
+                    <a:bodyPr/>
+                    <a:lstStyle/>
+                    <a:p>
+                      <a:pPr algn="l"/>
+                      <a:r>
+                        <a:rPr lang="en-CA" sz="1100" dirty="0">
+                          <a:latin typeface="Arial" panose="020B0604020202020204" pitchFamily="34" charset="0"/>
+                          <a:cs typeface="Arial" panose="020B0604020202020204" pitchFamily="34" charset="0"/>
+                        </a:rPr>
+                        <a:t>-38.4% (80.6%)</a:t>
+                      </a:r>
+                    </a:p>
+                  </a:txBody>
+                  <a:tcPr anchor="ctr">
+                    <a:solidFill>
+                      <a:schemeClr val="accent1">
+                        <a:lumMod val="60000"/>
+                        <a:lumOff val="40000"/>
+                      </a:schemeClr>
+                    </a:solidFill>
+                  </a:tcPr>
+                </a:tc>
+                <a:tc>
+                  <a:txBody>
+                    <a:bodyPr/>
+                    <a:lstStyle/>
+                    <a:p>
+                      <a:pPr algn="l"/>
+                      <a:r>
+                        <a:rPr lang="en-US" sz="1100" dirty="0">
+                          <a:latin typeface="Arial" panose="020B0604020202020204" pitchFamily="34" charset="0"/>
+                          <a:cs typeface="Arial" panose="020B0604020202020204" pitchFamily="34" charset="0"/>
+                        </a:rPr>
+                        <a:t>-57.6% (80.6%)</a:t>
+                      </a:r>
+                      <a:endParaRPr lang="en-CA" sz="1100" dirty="0">
+                        <a:latin typeface="Arial" panose="020B0604020202020204" pitchFamily="34" charset="0"/>
+                        <a:cs typeface="Arial" panose="020B0604020202020204" pitchFamily="34" charset="0"/>
+                      </a:endParaRPr>
+                    </a:p>
+                  </a:txBody>
+                  <a:tcPr anchor="ctr">
+                    <a:solidFill>
+                      <a:schemeClr val="accent1">
+                        <a:lumMod val="60000"/>
+                        <a:lumOff val="40000"/>
+                      </a:schemeClr>
+                    </a:solidFill>
+                  </a:tcPr>
+                </a:tc>
+                <a:extLst>
+                  <a:ext uri="{0D108BD9-81ED-4DB2-BD59-A6C34878D82A}">
+                    <a16:rowId xmlns:a16="http://schemas.microsoft.com/office/drawing/2014/main" val="2890318742"/>
+                  </a:ext>
+                </a:extLst>
+              </a:tr>
+              <a:tr h="260107">
+                <a:tc>
+                  <a:txBody>
+                    <a:bodyPr/>
+                    <a:lstStyle/>
+                    <a:p>
+                      <a:pPr algn="l"/>
+                      <a:r>
+                        <a:rPr lang="en-CA" sz="1100" dirty="0">
+                          <a:latin typeface="Arial" panose="020B0604020202020204" pitchFamily="34" charset="0"/>
+                          <a:cs typeface="Arial" panose="020B0604020202020204" pitchFamily="34" charset="0"/>
+                        </a:rPr>
+                        <a:t>1%</a:t>
+                      </a:r>
+                    </a:p>
+                  </a:txBody>
+                  <a:tcPr anchor="ctr"/>
+                </a:tc>
+                <a:tc>
+                  <a:txBody>
+                    <a:bodyPr/>
+                    <a:lstStyle/>
+                    <a:p>
+                      <a:pPr algn="l"/>
+                      <a:r>
+                        <a:rPr lang="en-CA" sz="1100" dirty="0">
+                          <a:latin typeface="Arial" panose="020B0604020202020204" pitchFamily="34" charset="0"/>
+                          <a:cs typeface="Arial" panose="020B0604020202020204" pitchFamily="34" charset="0"/>
+                        </a:rPr>
+                        <a:t>0.25% (95.7%)</a:t>
+                      </a:r>
+                    </a:p>
+                  </a:txBody>
+                  <a:tcPr anchor="ctr"/>
+                </a:tc>
+                <a:tc>
+                  <a:txBody>
+                    <a:bodyPr/>
+                    <a:lstStyle/>
+                    <a:p>
+                      <a:pPr algn="l"/>
+                      <a:r>
+                        <a:rPr lang="en-CA" sz="1100" dirty="0">
+                          <a:latin typeface="Arial" panose="020B0604020202020204" pitchFamily="34" charset="0"/>
+                          <a:cs typeface="Arial" panose="020B0604020202020204" pitchFamily="34" charset="0"/>
+                        </a:rPr>
+                        <a:t>-11.2% (87.5%)</a:t>
+                      </a:r>
+                    </a:p>
+                  </a:txBody>
+                  <a:tcPr anchor="ctr"/>
+                </a:tc>
+                <a:tc>
+                  <a:txBody>
+                    <a:bodyPr/>
+                    <a:lstStyle/>
+                    <a:p>
+                      <a:pPr algn="l"/>
+                      <a:r>
+                        <a:rPr lang="en-CA" sz="1100" dirty="0">
+                          <a:latin typeface="Arial" panose="020B0604020202020204" pitchFamily="34" charset="0"/>
+                          <a:cs typeface="Arial" panose="020B0604020202020204" pitchFamily="34" charset="0"/>
+                        </a:rPr>
+                        <a:t>-30.7% (66.0%)</a:t>
+                      </a:r>
+                    </a:p>
+                  </a:txBody>
+                  <a:tcPr anchor="ctr"/>
+                </a:tc>
+                <a:tc>
+                  <a:txBody>
+                    <a:bodyPr/>
+                    <a:lstStyle/>
+                    <a:p>
+                      <a:pPr algn="l"/>
+                      <a:r>
+                        <a:rPr lang="en-CA" sz="1100" dirty="0">
+                          <a:latin typeface="Arial" panose="020B0604020202020204" pitchFamily="34" charset="0"/>
+                          <a:cs typeface="Arial" panose="020B0604020202020204" pitchFamily="34" charset="0"/>
+                        </a:rPr>
+                        <a:t>-51.8% (49.0%)</a:t>
+                      </a:r>
+                    </a:p>
+                  </a:txBody>
+                  <a:tcPr anchor="ctr"/>
+                </a:tc>
+                <a:extLst>
+                  <a:ext uri="{0D108BD9-81ED-4DB2-BD59-A6C34878D82A}">
+                    <a16:rowId xmlns:a16="http://schemas.microsoft.com/office/drawing/2014/main" val="1764396818"/>
+                  </a:ext>
+                </a:extLst>
+              </a:tr>
+              <a:tr h="260107">
+                <a:tc>
+                  <a:txBody>
+                    <a:bodyPr/>
+                    <a:lstStyle/>
+                    <a:p>
+                      <a:pPr algn="l"/>
+                      <a:r>
+                        <a:rPr lang="en-CA" sz="1100" dirty="0">
+                          <a:latin typeface="Arial" panose="020B0604020202020204" pitchFamily="34" charset="0"/>
+                          <a:cs typeface="Arial" panose="020B0604020202020204" pitchFamily="34" charset="0"/>
+                        </a:rPr>
+                        <a:t>5%</a:t>
+                      </a:r>
+                    </a:p>
+                  </a:txBody>
+                  <a:tcPr anchor="ctr">
+                    <a:solidFill>
+                      <a:schemeClr val="accent1">
+                        <a:lumMod val="60000"/>
+                        <a:lumOff val="40000"/>
+                      </a:schemeClr>
+                    </a:solidFill>
+                  </a:tcPr>
+                </a:tc>
+                <a:tc>
+                  <a:txBody>
+                    <a:bodyPr/>
+                    <a:lstStyle/>
+                    <a:p>
+                      <a:pPr algn="l"/>
+                      <a:r>
+                        <a:rPr lang="en-CA" sz="1100" dirty="0">
+                          <a:latin typeface="Arial" panose="020B0604020202020204" pitchFamily="34" charset="0"/>
+                          <a:cs typeface="Arial" panose="020B0604020202020204" pitchFamily="34" charset="0"/>
+                        </a:rPr>
+                        <a:t>-1.8% (95.6%)</a:t>
+                      </a:r>
+                    </a:p>
+                  </a:txBody>
+                  <a:tcPr anchor="ctr">
+                    <a:solidFill>
+                      <a:schemeClr val="accent1">
+                        <a:lumMod val="60000"/>
+                        <a:lumOff val="40000"/>
+                      </a:schemeClr>
+                    </a:solidFill>
+                  </a:tcPr>
+                </a:tc>
+                <a:tc>
+                  <a:txBody>
+                    <a:bodyPr/>
+                    <a:lstStyle/>
+                    <a:p>
+                      <a:pPr algn="l"/>
+                      <a:r>
+                        <a:rPr lang="en-CA" sz="1100" dirty="0">
+                          <a:latin typeface="Arial" panose="020B0604020202020204" pitchFamily="34" charset="0"/>
+                          <a:cs typeface="Arial" panose="020B0604020202020204" pitchFamily="34" charset="0"/>
+                        </a:rPr>
+                        <a:t>-13.8% (75.2%)</a:t>
+                      </a:r>
+                    </a:p>
+                  </a:txBody>
+                  <a:tcPr anchor="ctr">
+                    <a:solidFill>
+                      <a:schemeClr val="accent1">
+                        <a:lumMod val="60000"/>
+                        <a:lumOff val="40000"/>
+                      </a:schemeClr>
+                    </a:solidFill>
+                  </a:tcPr>
+                </a:tc>
+                <a:tc>
+                  <a:txBody>
+                    <a:bodyPr/>
+                    <a:lstStyle/>
+                    <a:p>
+                      <a:pPr algn="l"/>
+                      <a:r>
+                        <a:rPr lang="en-CA" sz="1100" dirty="0">
+                          <a:latin typeface="Arial" panose="020B0604020202020204" pitchFamily="34" charset="0"/>
+                          <a:cs typeface="Arial" panose="020B0604020202020204" pitchFamily="34" charset="0"/>
+                        </a:rPr>
+                        <a:t>-32.6% (47.9%)</a:t>
+                      </a:r>
+                    </a:p>
+                  </a:txBody>
+                  <a:tcPr anchor="ctr">
+                    <a:solidFill>
+                      <a:schemeClr val="accent1">
+                        <a:lumMod val="60000"/>
+                        <a:lumOff val="40000"/>
+                      </a:schemeClr>
+                    </a:solidFill>
+                  </a:tcPr>
+                </a:tc>
+                <a:tc>
+                  <a:txBody>
+                    <a:bodyPr/>
+                    <a:lstStyle/>
+                    <a:p>
+                      <a:pPr algn="l"/>
+                      <a:r>
+                        <a:rPr lang="en-CA" sz="1100" dirty="0">
+                          <a:latin typeface="Arial" panose="020B0604020202020204" pitchFamily="34" charset="0"/>
+                          <a:cs typeface="Arial" panose="020B0604020202020204" pitchFamily="34" charset="0"/>
+                        </a:rPr>
+                        <a:t>-48.8% (19.1%)</a:t>
+                      </a:r>
+                    </a:p>
+                  </a:txBody>
+                  <a:tcPr anchor="ctr">
+                    <a:solidFill>
+                      <a:schemeClr val="accent1">
+                        <a:lumMod val="60000"/>
+                        <a:lumOff val="40000"/>
+                      </a:schemeClr>
+                    </a:solidFill>
+                  </a:tcPr>
+                </a:tc>
+                <a:extLst>
+                  <a:ext uri="{0D108BD9-81ED-4DB2-BD59-A6C34878D82A}">
+                    <a16:rowId xmlns:a16="http://schemas.microsoft.com/office/drawing/2014/main" val="2742093009"/>
+                  </a:ext>
+                </a:extLst>
+              </a:tr>
+            </a:tbl>
+          </a:graphicData>
+        </a:graphic>
+      </p:graphicFrame>
+      <p:graphicFrame>
+        <p:nvGraphicFramePr>
+          <p:cNvPr id="7" name="Table 6">
+            <a:extLst>
+              <a:ext uri="{FF2B5EF4-FFF2-40B4-BE49-F238E27FC236}">
+                <a16:creationId xmlns:a16="http://schemas.microsoft.com/office/drawing/2014/main" id="{A36186C2-6B58-E490-CC4E-C921DBFC0BAB}"/>
+              </a:ext>
+            </a:extLst>
+          </p:cNvPr>
+          <p:cNvGraphicFramePr>
+            <a:graphicFrameLocks noGrp="1"/>
+          </p:cNvGraphicFramePr>
+          <p:nvPr>
+            <p:extLst>
+              <p:ext uri="{D42A27DB-BD31-4B8C-83A1-F6EECF244321}">
+                <p14:modId xmlns:p14="http://schemas.microsoft.com/office/powerpoint/2010/main" val="3537472963"/>
+              </p:ext>
+            </p:extLst>
+          </p:nvPr>
+        </p:nvGraphicFramePr>
+        <p:xfrm>
+          <a:off x="422582" y="362428"/>
+          <a:ext cx="9270060" cy="2021903"/>
+        </p:xfrm>
+        <a:graphic>
+          <a:graphicData uri="http://schemas.openxmlformats.org/drawingml/2006/table">
+            <a:tbl>
+              <a:tblPr>
+                <a:tableStyleId>{22838BEF-8BB2-4498-84A7-C5851F593DF1}</a:tableStyleId>
+              </a:tblPr>
+              <a:tblGrid>
+                <a:gridCol w="1854012">
+                  <a:extLst>
+                    <a:ext uri="{9D8B030D-6E8A-4147-A177-3AD203B41FA5}">
+                      <a16:colId xmlns:a16="http://schemas.microsoft.com/office/drawing/2014/main" val="2122928611"/>
+                    </a:ext>
+                  </a:extLst>
+                </a:gridCol>
+                <a:gridCol w="1854012">
+                  <a:extLst>
+                    <a:ext uri="{9D8B030D-6E8A-4147-A177-3AD203B41FA5}">
+                      <a16:colId xmlns:a16="http://schemas.microsoft.com/office/drawing/2014/main" val="123828048"/>
+                    </a:ext>
+                  </a:extLst>
+                </a:gridCol>
+                <a:gridCol w="1854012">
+                  <a:extLst>
+                    <a:ext uri="{9D8B030D-6E8A-4147-A177-3AD203B41FA5}">
+                      <a16:colId xmlns:a16="http://schemas.microsoft.com/office/drawing/2014/main" val="3449117178"/>
+                    </a:ext>
+                  </a:extLst>
+                </a:gridCol>
+                <a:gridCol w="1854012">
+                  <a:extLst>
+                    <a:ext uri="{9D8B030D-6E8A-4147-A177-3AD203B41FA5}">
+                      <a16:colId xmlns:a16="http://schemas.microsoft.com/office/drawing/2014/main" val="2259402722"/>
+                    </a:ext>
+                  </a:extLst>
+                </a:gridCol>
+                <a:gridCol w="1854012">
+                  <a:extLst>
+                    <a:ext uri="{9D8B030D-6E8A-4147-A177-3AD203B41FA5}">
+                      <a16:colId xmlns:a16="http://schemas.microsoft.com/office/drawing/2014/main" val="514538102"/>
+                    </a:ext>
+                  </a:extLst>
+                </a:gridCol>
+              </a:tblGrid>
+              <a:tr h="586600">
+                <a:tc gridSpan="4">
+                  <a:txBody>
+                    <a:bodyPr/>
+                    <a:lstStyle/>
+                    <a:p>
+                      <a:pPr algn="l"/>
+                      <a:r>
+                        <a:rPr lang="en-CA" sz="1100" b="1" dirty="0">
+                          <a:latin typeface="Arial" panose="020B0604020202020204" pitchFamily="34" charset="0"/>
+                          <a:cs typeface="Arial" panose="020B0604020202020204" pitchFamily="34" charset="0"/>
+                        </a:rPr>
+                        <a:t>Table 1A: Results from difference-in-differences study design simulations, select cases of missingness </a:t>
+                      </a:r>
+                    </a:p>
+                    <a:p>
+                      <a:pPr algn="l"/>
+                      <a:r>
+                        <a:rPr lang="en-CA" sz="1100" b="1" dirty="0">
+                          <a:latin typeface="Arial" panose="020B0604020202020204" pitchFamily="34" charset="0"/>
+                          <a:cs typeface="Arial" panose="020B0604020202020204" pitchFamily="34" charset="0"/>
+                        </a:rPr>
+                        <a:t>Average percent bias (coverage)</a:t>
+                      </a:r>
+                    </a:p>
+                  </a:txBody>
+                  <a:tcPr marL="83680" marR="83680" marT="41840" marB="41840" anchor="ctr">
+                    <a:lnL w="12700" cmpd="sng">
+                      <a:noFill/>
+                    </a:lnL>
+                    <a:lnR w="12700" cmpd="sng">
+                      <a:noFill/>
+                    </a:lnR>
+                    <a:lnT w="12700" cmpd="sng">
+                      <a:noFill/>
+                    </a:lnT>
+                    <a:lnB w="12700" cmpd="sng">
+                      <a:noFill/>
+                    </a:lnB>
+                    <a:lnTlToBr w="12700" cmpd="sng">
+                      <a:noFill/>
+                      <a:prstDash val="solid"/>
+                    </a:lnTlToBr>
+                    <a:lnBlToTr w="12700" cmpd="sng">
+                      <a:noFill/>
+                      <a:prstDash val="solid"/>
+                    </a:lnBlToTr>
+                    <a:solidFill>
+                      <a:schemeClr val="accent1">
+                        <a:lumMod val="60000"/>
+                        <a:lumOff val="40000"/>
+                      </a:schemeClr>
+                    </a:solidFill>
+                  </a:tcPr>
+                </a:tc>
+                <a:tc hMerge="1">
+                  <a:txBody>
+                    <a:bodyPr/>
+                    <a:lstStyle/>
+                    <a:p>
+                      <a:endParaRPr dirty="0"/>
+                    </a:p>
+                  </a:txBody>
+                  <a:tcPr marL="83680" marR="83680" marT="41840" marB="41840" anchor="ctr"/>
+                </a:tc>
+                <a:tc hMerge="1">
+                  <a:txBody>
+                    <a:bodyPr/>
+                    <a:lstStyle/>
+                    <a:p>
+                      <a:pPr algn="l"/>
+                      <a:endParaRPr lang="en-CA" sz="1400" b="1" dirty="0"/>
+                    </a:p>
+                  </a:txBody>
+                  <a:tcPr marL="83680" marR="83680" marT="41840" marB="41840" anchor="ctr"/>
+                </a:tc>
+                <a:tc hMerge="1">
+                  <a:txBody>
+                    <a:bodyPr/>
+                    <a:lstStyle/>
+                    <a:p>
+                      <a:pPr algn="l"/>
+                      <a:endParaRPr lang="en-CA" sz="1400" b="1" dirty="0"/>
+                    </a:p>
+                  </a:txBody>
+                  <a:tcPr marL="83680" marR="83680" marT="41840" marB="41840" anchor="ctr"/>
+                </a:tc>
+                <a:tc>
+                  <a:txBody>
+                    <a:bodyPr/>
+                    <a:lstStyle/>
+                    <a:p>
+                      <a:pPr algn="l"/>
+                      <a:endParaRPr lang="en-CA" sz="1100" b="1" dirty="0">
+                        <a:latin typeface="Arial" panose="020B0604020202020204" pitchFamily="34" charset="0"/>
+                        <a:cs typeface="Arial" panose="020B0604020202020204" pitchFamily="34" charset="0"/>
+                      </a:endParaRPr>
+                    </a:p>
+                  </a:txBody>
+                  <a:tcPr marL="83680" marR="83680" marT="41840" marB="41840" anchor="ctr">
+                    <a:lnL w="12700" cmpd="sng">
+                      <a:noFill/>
+                    </a:lnL>
+                    <a:lnR w="12700" cmpd="sng">
+                      <a:noFill/>
+                    </a:lnR>
+                    <a:lnT w="12700" cmpd="sng">
+                      <a:noFill/>
+                    </a:lnT>
+                    <a:lnB w="12700" cmpd="sng">
+                      <a:noFill/>
+                    </a:lnB>
+                    <a:lnTlToBr w="12700" cmpd="sng">
+                      <a:noFill/>
+                      <a:prstDash val="solid"/>
+                    </a:lnTlToBr>
+                    <a:lnBlToTr w="12700" cmpd="sng">
+                      <a:noFill/>
+                      <a:prstDash val="solid"/>
+                    </a:lnBlToTr>
+                    <a:solidFill>
+                      <a:schemeClr val="accent1">
+                        <a:lumMod val="60000"/>
+                        <a:lumOff val="40000"/>
+                      </a:schemeClr>
+                    </a:solidFill>
+                  </a:tcPr>
+                </a:tc>
+                <a:extLst>
+                  <a:ext uri="{0D108BD9-81ED-4DB2-BD59-A6C34878D82A}">
+                    <a16:rowId xmlns:a16="http://schemas.microsoft.com/office/drawing/2014/main" val="3943850057"/>
+                  </a:ext>
+                </a:extLst>
+              </a:tr>
+              <a:tr h="654982">
+                <a:tc>
+                  <a:txBody>
+                    <a:bodyPr/>
+                    <a:lstStyle/>
+                    <a:p>
+                      <a:pPr algn="l"/>
+                      <a:r>
+                        <a:rPr lang="en-CA" sz="1100" dirty="0">
+                          <a:latin typeface="Arial" panose="020B0604020202020204" pitchFamily="34" charset="0"/>
+                          <a:cs typeface="Arial" panose="020B0604020202020204" pitchFamily="34" charset="0"/>
+                        </a:rPr>
+                        <a:t>True simulated effect size of power outage on hospitalization</a:t>
+                      </a:r>
+                    </a:p>
+                  </a:txBody>
+                  <a:tcPr anchor="ctr">
+                    <a:lnT w="12700" cmpd="sng">
+                      <a:noFill/>
+                    </a:lnT>
+                  </a:tcPr>
+                </a:tc>
+                <a:tc>
+                  <a:txBody>
+                    <a:bodyPr/>
+                    <a:lstStyle/>
+                    <a:p>
+                      <a:pPr algn="l"/>
+                      <a:r>
+                        <a:rPr lang="en-CA" sz="1100" dirty="0">
+                          <a:latin typeface="Arial" panose="020B0604020202020204" pitchFamily="34" charset="0"/>
+                          <a:cs typeface="Arial" panose="020B0604020202020204" pitchFamily="34" charset="0"/>
+                        </a:rPr>
+                        <a:t>No missing data</a:t>
+                      </a:r>
+                    </a:p>
+                  </a:txBody>
+                  <a:tcPr anchor="ctr">
+                    <a:lnT w="12700" cmpd="sng">
+                      <a:noFill/>
+                    </a:lnT>
+                  </a:tcPr>
+                </a:tc>
+                <a:tc>
+                  <a:txBody>
+                    <a:bodyPr/>
+                    <a:lstStyle/>
+                    <a:p>
+                      <a:pPr algn="l"/>
+                      <a:r>
+                        <a:rPr lang="en-CA" sz="1100" dirty="0">
+                          <a:latin typeface="Arial" panose="020B0604020202020204" pitchFamily="34" charset="0"/>
+                          <a:cs typeface="Arial" panose="020B0604020202020204" pitchFamily="34" charset="0"/>
+                        </a:rPr>
+                        <a:t>20% of counties missing 80% of data </a:t>
+                      </a:r>
+                    </a:p>
+                  </a:txBody>
+                  <a:tcPr anchor="ctr">
+                    <a:lnT w="12700" cmpd="sng">
+                      <a:noFill/>
+                    </a:lnT>
+                  </a:tcPr>
+                </a:tc>
+                <a:tc>
+                  <a:txBody>
+                    <a:bodyPr/>
+                    <a:lstStyle/>
+                    <a:p>
+                      <a:pPr algn="l"/>
+                      <a:r>
+                        <a:rPr lang="en-CA" sz="1100" dirty="0">
+                          <a:latin typeface="Arial" panose="020B0604020202020204" pitchFamily="34" charset="0"/>
+                          <a:cs typeface="Arial" panose="020B0604020202020204" pitchFamily="34" charset="0"/>
+                        </a:rPr>
+                        <a:t>50% of counties missing 80% of data </a:t>
+                      </a:r>
+                    </a:p>
+                  </a:txBody>
+                  <a:tcPr anchor="ctr">
+                    <a:lnT w="12700" cmpd="sng">
+                      <a:noFill/>
+                    </a:lnT>
+                  </a:tcPr>
+                </a:tc>
+                <a:tc>
+                  <a:txBody>
+                    <a:bodyPr/>
+                    <a:lstStyle/>
+                    <a:p>
+                      <a:pPr algn="l"/>
+                      <a:r>
+                        <a:rPr lang="en-CA" sz="1100" dirty="0">
+                          <a:latin typeface="Arial" panose="020B0604020202020204" pitchFamily="34" charset="0"/>
+                          <a:cs typeface="Arial" panose="020B0604020202020204" pitchFamily="34" charset="0"/>
+                        </a:rPr>
+                        <a:t>80% of counties missing 80% of data </a:t>
+                      </a:r>
+                    </a:p>
+                  </a:txBody>
+                  <a:tcPr anchor="ctr">
+                    <a:lnT w="12700" cmpd="sng">
+                      <a:noFill/>
+                    </a:lnT>
+                  </a:tcPr>
+                </a:tc>
+                <a:extLst>
+                  <a:ext uri="{0D108BD9-81ED-4DB2-BD59-A6C34878D82A}">
+                    <a16:rowId xmlns:a16="http://schemas.microsoft.com/office/drawing/2014/main" val="118549937"/>
+                  </a:ext>
+                </a:extLst>
+              </a:tr>
+              <a:tr h="260107">
+                <a:tc>
+                  <a:txBody>
+                    <a:bodyPr/>
+                    <a:lstStyle/>
+                    <a:p>
+                      <a:pPr algn="l"/>
+                      <a:r>
+                        <a:rPr lang="en-CA" sz="1100" dirty="0">
+                          <a:latin typeface="Arial" panose="020B0604020202020204" pitchFamily="34" charset="0"/>
+                          <a:cs typeface="Arial" panose="020B0604020202020204" pitchFamily="34" charset="0"/>
+                        </a:rPr>
+                        <a:t>0.5%</a:t>
+                      </a:r>
+                    </a:p>
+                  </a:txBody>
+                  <a:tcPr anchor="ctr">
+                    <a:solidFill>
+                      <a:schemeClr val="accent1">
+                        <a:lumMod val="60000"/>
+                        <a:lumOff val="40000"/>
+                      </a:schemeClr>
+                    </a:solidFill>
+                  </a:tcPr>
+                </a:tc>
+                <a:tc>
+                  <a:txBody>
+                    <a:bodyPr/>
+                    <a:lstStyle/>
+                    <a:p>
+                      <a:pPr algn="l"/>
+                      <a:r>
+                        <a:rPr lang="en-CA" sz="1100" b="0" i="0" kern="1200" dirty="0">
+                          <a:solidFill>
+                            <a:schemeClr val="dk1"/>
+                          </a:solidFill>
+                          <a:effectLst/>
+                          <a:latin typeface="Arial" panose="020B0604020202020204" pitchFamily="34" charset="0"/>
+                          <a:ea typeface="+mn-ea"/>
+                          <a:cs typeface="Arial" panose="020B0604020202020204" pitchFamily="34" charset="0"/>
+                        </a:rPr>
+                        <a:t>-8.9%</a:t>
+                      </a:r>
+                      <a:r>
+                        <a:rPr lang="en-CA" sz="1100" dirty="0">
+                          <a:latin typeface="Arial" panose="020B0604020202020204" pitchFamily="34" charset="0"/>
+                          <a:cs typeface="Arial" panose="020B0604020202020204" pitchFamily="34" charset="0"/>
+                        </a:rPr>
+                        <a:t> (94.9%)</a:t>
+                      </a:r>
+                    </a:p>
+                  </a:txBody>
+                  <a:tcPr anchor="ctr">
+                    <a:solidFill>
+                      <a:schemeClr val="accent1">
+                        <a:lumMod val="60000"/>
+                        <a:lumOff val="40000"/>
+                      </a:schemeClr>
+                    </a:solidFill>
+                  </a:tcPr>
+                </a:tc>
+                <a:tc>
+                  <a:txBody>
+                    <a:bodyPr/>
+                    <a:lstStyle/>
+                    <a:p>
+                      <a:pPr algn="l"/>
+                      <a:r>
+                        <a:rPr lang="en-CA" sz="1100" dirty="0">
+                          <a:latin typeface="Arial" panose="020B0604020202020204" pitchFamily="34" charset="0"/>
+                          <a:cs typeface="Arial" panose="020B0604020202020204" pitchFamily="34" charset="0"/>
+                        </a:rPr>
+                        <a:t>-11.0% </a:t>
+                      </a:r>
+                      <a:r>
+                        <a:rPr lang="en-US" sz="1100" dirty="0">
+                          <a:latin typeface="Arial" panose="020B0604020202020204" pitchFamily="34" charset="0"/>
+                          <a:cs typeface="Arial" panose="020B0604020202020204" pitchFamily="34" charset="0"/>
+                        </a:rPr>
+                        <a:t>(92.9%)</a:t>
+                      </a:r>
+                      <a:endParaRPr lang="en-CA" sz="1100" dirty="0">
+                        <a:latin typeface="Arial" panose="020B0604020202020204" pitchFamily="34" charset="0"/>
+                        <a:cs typeface="Arial" panose="020B0604020202020204" pitchFamily="34" charset="0"/>
+                      </a:endParaRPr>
+                    </a:p>
+                  </a:txBody>
+                  <a:tcPr anchor="ctr">
+                    <a:solidFill>
+                      <a:schemeClr val="accent1">
+                        <a:lumMod val="60000"/>
+                        <a:lumOff val="40000"/>
+                      </a:schemeClr>
+                    </a:solidFill>
+                  </a:tcPr>
+                </a:tc>
+                <a:tc>
+                  <a:txBody>
+                    <a:bodyPr/>
+                    <a:lstStyle/>
+                    <a:p>
+                      <a:pPr algn="l"/>
+                      <a:r>
+                        <a:rPr lang="en-CA" sz="1100" dirty="0">
+                          <a:latin typeface="Arial" panose="020B0604020202020204" pitchFamily="34" charset="0"/>
+                          <a:cs typeface="Arial" panose="020B0604020202020204" pitchFamily="34" charset="0"/>
+                        </a:rPr>
+                        <a:t>-30.1% (88.9%)</a:t>
+                      </a:r>
+                    </a:p>
+                  </a:txBody>
+                  <a:tcPr anchor="ctr">
+                    <a:solidFill>
+                      <a:schemeClr val="accent1">
+                        <a:lumMod val="60000"/>
+                        <a:lumOff val="40000"/>
+                      </a:schemeClr>
+                    </a:solidFill>
+                  </a:tcPr>
+                </a:tc>
+                <a:tc>
+                  <a:txBody>
+                    <a:bodyPr/>
+                    <a:lstStyle/>
+                    <a:p>
+                      <a:pPr algn="l"/>
+                      <a:r>
+                        <a:rPr lang="en-US" sz="1100" dirty="0">
+                          <a:latin typeface="Arial" panose="020B0604020202020204" pitchFamily="34" charset="0"/>
+                          <a:cs typeface="Arial" panose="020B0604020202020204" pitchFamily="34" charset="0"/>
+                        </a:rPr>
+                        <a:t>-54.2% (89.9%)</a:t>
+                      </a:r>
+                      <a:endParaRPr lang="en-CA" sz="1100" dirty="0">
+                        <a:latin typeface="Arial" panose="020B0604020202020204" pitchFamily="34" charset="0"/>
+                        <a:cs typeface="Arial" panose="020B0604020202020204" pitchFamily="34" charset="0"/>
+                      </a:endParaRPr>
+                    </a:p>
+                  </a:txBody>
+                  <a:tcPr anchor="ctr">
+                    <a:solidFill>
+                      <a:schemeClr val="accent1">
+                        <a:lumMod val="60000"/>
+                        <a:lumOff val="40000"/>
+                      </a:schemeClr>
+                    </a:solidFill>
+                  </a:tcPr>
+                </a:tc>
+                <a:extLst>
+                  <a:ext uri="{0D108BD9-81ED-4DB2-BD59-A6C34878D82A}">
+                    <a16:rowId xmlns:a16="http://schemas.microsoft.com/office/drawing/2014/main" val="2890318742"/>
+                  </a:ext>
+                </a:extLst>
+              </a:tr>
+              <a:tr h="260107">
+                <a:tc>
+                  <a:txBody>
+                    <a:bodyPr/>
+                    <a:lstStyle/>
+                    <a:p>
+                      <a:pPr algn="l"/>
+                      <a:r>
+                        <a:rPr lang="en-CA" sz="1100" dirty="0">
+                          <a:latin typeface="Arial" panose="020B0604020202020204" pitchFamily="34" charset="0"/>
+                          <a:cs typeface="Arial" panose="020B0604020202020204" pitchFamily="34" charset="0"/>
+                        </a:rPr>
+                        <a:t>1%</a:t>
+                      </a:r>
+                    </a:p>
+                  </a:txBody>
+                  <a:tcPr anchor="ctr"/>
+                </a:tc>
+                <a:tc>
+                  <a:txBody>
+                    <a:bodyPr/>
+                    <a:lstStyle/>
+                    <a:p>
+                      <a:pPr algn="l"/>
+                      <a:r>
+                        <a:rPr lang="en-CA" sz="1100" dirty="0">
+                          <a:latin typeface="Arial" panose="020B0604020202020204" pitchFamily="34" charset="0"/>
+                          <a:cs typeface="Arial" panose="020B0604020202020204" pitchFamily="34" charset="0"/>
+                        </a:rPr>
+                        <a:t>0.4% (93.9%)</a:t>
+                      </a:r>
+                    </a:p>
+                  </a:txBody>
+                  <a:tcPr anchor="ctr"/>
+                </a:tc>
+                <a:tc>
+                  <a:txBody>
+                    <a:bodyPr/>
+                    <a:lstStyle/>
+                    <a:p>
+                      <a:pPr algn="l"/>
+                      <a:r>
+                        <a:rPr lang="en-CA" sz="1100" dirty="0">
+                          <a:latin typeface="Arial" panose="020B0604020202020204" pitchFamily="34" charset="0"/>
+                          <a:cs typeface="Arial" panose="020B0604020202020204" pitchFamily="34" charset="0"/>
+                        </a:rPr>
+                        <a:t>-8.7% (90.9%)</a:t>
+                      </a:r>
+                    </a:p>
+                  </a:txBody>
+                  <a:tcPr anchor="ctr"/>
+                </a:tc>
+                <a:tc>
+                  <a:txBody>
+                    <a:bodyPr/>
+                    <a:lstStyle/>
+                    <a:p>
+                      <a:pPr algn="l"/>
+                      <a:r>
+                        <a:rPr lang="en-CA" sz="1100" dirty="0">
+                          <a:latin typeface="Arial" panose="020B0604020202020204" pitchFamily="34" charset="0"/>
+                          <a:cs typeface="Arial" panose="020B0604020202020204" pitchFamily="34" charset="0"/>
+                        </a:rPr>
+                        <a:t>-31.0% (77.8%)</a:t>
+                      </a:r>
+                    </a:p>
+                  </a:txBody>
+                  <a:tcPr anchor="ctr"/>
+                </a:tc>
+                <a:tc>
+                  <a:txBody>
+                    <a:bodyPr/>
+                    <a:lstStyle/>
+                    <a:p>
+                      <a:pPr algn="l"/>
+                      <a:r>
+                        <a:rPr lang="en-CA" sz="1100" dirty="0">
+                          <a:latin typeface="Arial" panose="020B0604020202020204" pitchFamily="34" charset="0"/>
+                          <a:cs typeface="Arial" panose="020B0604020202020204" pitchFamily="34" charset="0"/>
+                        </a:rPr>
+                        <a:t>-54.4% (63.6%)</a:t>
+                      </a:r>
+                    </a:p>
+                  </a:txBody>
+                  <a:tcPr anchor="ctr"/>
+                </a:tc>
+                <a:extLst>
+                  <a:ext uri="{0D108BD9-81ED-4DB2-BD59-A6C34878D82A}">
+                    <a16:rowId xmlns:a16="http://schemas.microsoft.com/office/drawing/2014/main" val="1764396818"/>
+                  </a:ext>
+                </a:extLst>
+              </a:tr>
+              <a:tr h="260107">
+                <a:tc>
+                  <a:txBody>
+                    <a:bodyPr/>
+                    <a:lstStyle/>
+                    <a:p>
+                      <a:pPr algn="l"/>
+                      <a:r>
+                        <a:rPr lang="en-CA" sz="1100" dirty="0">
+                          <a:latin typeface="Arial" panose="020B0604020202020204" pitchFamily="34" charset="0"/>
+                          <a:cs typeface="Arial" panose="020B0604020202020204" pitchFamily="34" charset="0"/>
+                        </a:rPr>
+                        <a:t>5%</a:t>
+                      </a:r>
+                    </a:p>
+                  </a:txBody>
+                  <a:tcPr anchor="ctr">
+                    <a:solidFill>
+                      <a:schemeClr val="accent1">
+                        <a:lumMod val="60000"/>
+                        <a:lumOff val="40000"/>
+                      </a:schemeClr>
+                    </a:solidFill>
+                  </a:tcPr>
+                </a:tc>
+                <a:tc>
+                  <a:txBody>
+                    <a:bodyPr/>
+                    <a:lstStyle/>
+                    <a:p>
+                      <a:pPr algn="l"/>
+                      <a:r>
+                        <a:rPr lang="en-CA" sz="1100" dirty="0">
+                          <a:latin typeface="Arial" panose="020B0604020202020204" pitchFamily="34" charset="0"/>
+                          <a:cs typeface="Arial" panose="020B0604020202020204" pitchFamily="34" charset="0"/>
+                        </a:rPr>
+                        <a:t>-1.3% (88.9%)</a:t>
+                      </a:r>
+                    </a:p>
+                  </a:txBody>
+                  <a:tcPr anchor="ctr">
+                    <a:solidFill>
+                      <a:schemeClr val="accent1">
+                        <a:lumMod val="60000"/>
+                        <a:lumOff val="40000"/>
+                      </a:schemeClr>
+                    </a:solidFill>
+                  </a:tcPr>
+                </a:tc>
+                <a:tc>
+                  <a:txBody>
+                    <a:bodyPr/>
+                    <a:lstStyle/>
+                    <a:p>
+                      <a:pPr algn="l"/>
+                      <a:r>
+                        <a:rPr lang="en-CA" sz="1100" dirty="0">
+                          <a:latin typeface="Arial" panose="020B0604020202020204" pitchFamily="34" charset="0"/>
+                          <a:cs typeface="Arial" panose="020B0604020202020204" pitchFamily="34" charset="0"/>
+                        </a:rPr>
+                        <a:t>-13.3% (74.7%)</a:t>
+                      </a:r>
+                    </a:p>
+                  </a:txBody>
+                  <a:tcPr anchor="ctr">
+                    <a:solidFill>
+                      <a:schemeClr val="accent1">
+                        <a:lumMod val="60000"/>
+                        <a:lumOff val="40000"/>
+                      </a:schemeClr>
+                    </a:solidFill>
+                  </a:tcPr>
+                </a:tc>
+                <a:tc>
+                  <a:txBody>
+                    <a:bodyPr/>
+                    <a:lstStyle/>
+                    <a:p>
+                      <a:pPr algn="l"/>
+                      <a:r>
+                        <a:rPr lang="en-CA" sz="1100" dirty="0">
+                          <a:latin typeface="Arial" panose="020B0604020202020204" pitchFamily="34" charset="0"/>
+                          <a:cs typeface="Arial" panose="020B0604020202020204" pitchFamily="34" charset="0"/>
+                        </a:rPr>
+                        <a:t>-33.3% (44.4%)</a:t>
+                      </a:r>
+                    </a:p>
+                  </a:txBody>
+                  <a:tcPr anchor="ctr">
+                    <a:solidFill>
+                      <a:schemeClr val="accent1">
+                        <a:lumMod val="60000"/>
+                        <a:lumOff val="40000"/>
+                      </a:schemeClr>
+                    </a:solidFill>
+                  </a:tcPr>
+                </a:tc>
+                <a:tc>
+                  <a:txBody>
+                    <a:bodyPr/>
+                    <a:lstStyle/>
+                    <a:p>
+                      <a:pPr algn="l"/>
+                      <a:r>
+                        <a:rPr lang="en-CA" sz="1100" dirty="0">
+                          <a:latin typeface="Arial" panose="020B0604020202020204" pitchFamily="34" charset="0"/>
+                          <a:cs typeface="Arial" panose="020B0604020202020204" pitchFamily="34" charset="0"/>
+                        </a:rPr>
+                        <a:t>-50.5% (18.2%)</a:t>
+                      </a:r>
+                    </a:p>
+                  </a:txBody>
+                  <a:tcPr anchor="ctr">
+                    <a:solidFill>
+                      <a:schemeClr val="accent1">
+                        <a:lumMod val="60000"/>
+                        <a:lumOff val="40000"/>
+                      </a:schemeClr>
+                    </a:solidFill>
+                  </a:tcPr>
+                </a:tc>
+                <a:extLst>
+                  <a:ext uri="{0D108BD9-81ED-4DB2-BD59-A6C34878D82A}">
+                    <a16:rowId xmlns:a16="http://schemas.microsoft.com/office/drawing/2014/main" val="2742093009"/>
+                  </a:ext>
+                </a:extLst>
+              </a:tr>
+            </a:tbl>
+          </a:graphicData>
+        </a:graphic>
+      </p:graphicFrame>
+      <p:graphicFrame>
+        <p:nvGraphicFramePr>
+          <p:cNvPr id="2" name="Table 1">
+            <a:extLst>
+              <a:ext uri="{FF2B5EF4-FFF2-40B4-BE49-F238E27FC236}">
+                <a16:creationId xmlns:a16="http://schemas.microsoft.com/office/drawing/2014/main" id="{EBE27C47-8715-D88C-1A23-B2E64B207B5B}"/>
+              </a:ext>
+            </a:extLst>
+          </p:cNvPr>
+          <p:cNvGraphicFramePr>
+            <a:graphicFrameLocks noGrp="1"/>
+          </p:cNvGraphicFramePr>
+          <p:nvPr>
+            <p:extLst>
+              <p:ext uri="{D42A27DB-BD31-4B8C-83A1-F6EECF244321}">
+                <p14:modId xmlns:p14="http://schemas.microsoft.com/office/powerpoint/2010/main" val="2714284214"/>
+              </p:ext>
+            </p:extLst>
+          </p:nvPr>
+        </p:nvGraphicFramePr>
+        <p:xfrm>
+          <a:off x="514023" y="5041424"/>
+          <a:ext cx="10305288" cy="1539240"/>
+        </p:xfrm>
+        <a:graphic>
+          <a:graphicData uri="http://schemas.openxmlformats.org/drawingml/2006/table">
+            <a:tbl>
+              <a:tblPr/>
+              <a:tblGrid>
+                <a:gridCol w="841248">
+                  <a:extLst>
+                    <a:ext uri="{9D8B030D-6E8A-4147-A177-3AD203B41FA5}">
+                      <a16:colId xmlns:a16="http://schemas.microsoft.com/office/drawing/2014/main" val="1799810274"/>
+                    </a:ext>
+                  </a:extLst>
+                </a:gridCol>
+                <a:gridCol w="2208276">
+                  <a:extLst>
+                    <a:ext uri="{9D8B030D-6E8A-4147-A177-3AD203B41FA5}">
+                      <a16:colId xmlns:a16="http://schemas.microsoft.com/office/drawing/2014/main" val="3690122679"/>
+                    </a:ext>
+                  </a:extLst>
+                </a:gridCol>
+                <a:gridCol w="2418588">
+                  <a:extLst>
+                    <a:ext uri="{9D8B030D-6E8A-4147-A177-3AD203B41FA5}">
+                      <a16:colId xmlns:a16="http://schemas.microsoft.com/office/drawing/2014/main" val="2878935439"/>
+                    </a:ext>
+                  </a:extLst>
+                </a:gridCol>
+                <a:gridCol w="2418588">
+                  <a:extLst>
+                    <a:ext uri="{9D8B030D-6E8A-4147-A177-3AD203B41FA5}">
+                      <a16:colId xmlns:a16="http://schemas.microsoft.com/office/drawing/2014/main" val="3097784857"/>
+                    </a:ext>
+                  </a:extLst>
+                </a:gridCol>
+                <a:gridCol w="2418588">
+                  <a:extLst>
+                    <a:ext uri="{9D8B030D-6E8A-4147-A177-3AD203B41FA5}">
+                      <a16:colId xmlns:a16="http://schemas.microsoft.com/office/drawing/2014/main" val="1395931819"/>
+                    </a:ext>
+                  </a:extLst>
+                </a:gridCol>
+              </a:tblGrid>
+              <a:tr h="0">
+                <a:tc>
+                  <a:txBody>
+                    <a:bodyPr/>
+                    <a:lstStyle/>
+                    <a:p>
+                      <a:pPr algn="l"/>
+                      <a:r>
+                        <a:rPr lang="en-CA" sz="1100"/>
+                        <a:t>effect_size</a:t>
+                      </a:r>
+                    </a:p>
+                  </a:txBody>
+                  <a:tcPr anchor="ctr"/>
+                </a:tc>
+                <a:tc>
+                  <a:txBody>
+                    <a:bodyPr/>
+                    <a:lstStyle/>
+                    <a:p>
+                      <a:pPr algn="l"/>
+                      <a:r>
+                        <a:rPr lang="en-CA" sz="1100"/>
+                        <a:t>0% of counties missing 0% of data</a:t>
+                      </a:r>
+                    </a:p>
+                  </a:txBody>
+                  <a:tcPr anchor="ctr"/>
+                </a:tc>
+                <a:tc>
+                  <a:txBody>
+                    <a:bodyPr/>
+                    <a:lstStyle/>
+                    <a:p>
+                      <a:pPr algn="l"/>
+                      <a:r>
+                        <a:rPr lang="en-CA" sz="1100"/>
+                        <a:t>80% of counties missing 80% of data</a:t>
+                      </a:r>
+                    </a:p>
+                  </a:txBody>
+                  <a:tcPr anchor="ctr"/>
+                </a:tc>
+                <a:tc>
+                  <a:txBody>
+                    <a:bodyPr/>
+                    <a:lstStyle/>
+                    <a:p>
+                      <a:pPr algn="l"/>
+                      <a:r>
+                        <a:rPr lang="en-CA" sz="1100"/>
+                        <a:t>50% of counties missing 80% of data</a:t>
+                      </a:r>
+                    </a:p>
+                  </a:txBody>
+                  <a:tcPr anchor="ctr"/>
+                </a:tc>
+                <a:tc>
+                  <a:txBody>
+                    <a:bodyPr/>
+                    <a:lstStyle/>
+                    <a:p>
+                      <a:pPr algn="l"/>
+                      <a:r>
+                        <a:rPr lang="en-CA" sz="1100"/>
+                        <a:t>20% of counties missing 80% of data</a:t>
+                      </a:r>
+                    </a:p>
+                  </a:txBody>
+                  <a:tcPr anchor="ctr"/>
+                </a:tc>
+                <a:extLst>
+                  <a:ext uri="{0D108BD9-81ED-4DB2-BD59-A6C34878D82A}">
+                    <a16:rowId xmlns:a16="http://schemas.microsoft.com/office/drawing/2014/main" val="2413008250"/>
+                  </a:ext>
+                </a:extLst>
+              </a:tr>
+              <a:tr h="0">
+                <a:tc>
+                  <a:txBody>
+                    <a:bodyPr/>
+                    <a:lstStyle/>
+                    <a:p>
+                      <a:pPr algn="l"/>
+                      <a:r>
+                        <a:rPr lang="en-CA" sz="1100"/>
+                        <a:t>.5% increase</a:t>
+                      </a:r>
+                    </a:p>
+                  </a:txBody>
+                  <a:tcPr anchor="ctr"/>
+                </a:tc>
+                <a:tc>
+                  <a:txBody>
+                    <a:bodyPr/>
+                    <a:lstStyle/>
+                    <a:p>
+                      <a:pPr algn="l"/>
+                      <a:r>
+                        <a:rPr lang="en-CA" sz="1100"/>
+                        <a:t>-8.9% (94.9%)</a:t>
+                      </a:r>
+                    </a:p>
+                  </a:txBody>
+                  <a:tcPr anchor="ctr"/>
+                </a:tc>
+                <a:tc>
+                  <a:txBody>
+                    <a:bodyPr/>
+                    <a:lstStyle/>
+                    <a:p>
+                      <a:pPr algn="l"/>
+                      <a:r>
+                        <a:rPr lang="en-CA" sz="1100"/>
+                        <a:t>-54.2% (89.9%)</a:t>
+                      </a:r>
+                    </a:p>
+                  </a:txBody>
+                  <a:tcPr anchor="ctr"/>
+                </a:tc>
+                <a:tc>
+                  <a:txBody>
+                    <a:bodyPr/>
+                    <a:lstStyle/>
+                    <a:p>
+                      <a:pPr algn="l"/>
+                      <a:r>
+                        <a:rPr lang="en-CA" sz="1100"/>
+                        <a:t>-29.5% (90.9%)</a:t>
+                      </a:r>
+                    </a:p>
+                  </a:txBody>
+                  <a:tcPr anchor="ctr"/>
+                </a:tc>
+                <a:tc>
+                  <a:txBody>
+                    <a:bodyPr/>
+                    <a:lstStyle/>
+                    <a:p>
+                      <a:pPr algn="l"/>
+                      <a:r>
+                        <a:rPr lang="en-CA" sz="1100"/>
+                        <a:t>-17.5% (94.9%)</a:t>
+                      </a:r>
+                    </a:p>
+                  </a:txBody>
+                  <a:tcPr anchor="ctr"/>
+                </a:tc>
+                <a:extLst>
+                  <a:ext uri="{0D108BD9-81ED-4DB2-BD59-A6C34878D82A}">
+                    <a16:rowId xmlns:a16="http://schemas.microsoft.com/office/drawing/2014/main" val="4105488317"/>
+                  </a:ext>
+                </a:extLst>
+              </a:tr>
+              <a:tr h="0">
+                <a:tc>
+                  <a:txBody>
+                    <a:bodyPr/>
+                    <a:lstStyle/>
+                    <a:p>
+                      <a:pPr algn="l"/>
+                      <a:r>
+                        <a:rPr lang="en-CA" sz="1100"/>
+                        <a:t>1% increase</a:t>
+                      </a:r>
+                    </a:p>
+                  </a:txBody>
+                  <a:tcPr anchor="ctr"/>
+                </a:tc>
+                <a:tc>
+                  <a:txBody>
+                    <a:bodyPr/>
+                    <a:lstStyle/>
+                    <a:p>
+                      <a:pPr algn="l"/>
+                      <a:r>
+                        <a:rPr lang="en-CA" sz="1100"/>
+                        <a:t>0.4% (93.9%)</a:t>
+                      </a:r>
+                    </a:p>
+                  </a:txBody>
+                  <a:tcPr anchor="ctr"/>
+                </a:tc>
+                <a:tc>
+                  <a:txBody>
+                    <a:bodyPr/>
+                    <a:lstStyle/>
+                    <a:p>
+                      <a:pPr algn="l"/>
+                      <a:r>
+                        <a:rPr lang="en-CA" sz="1100"/>
+                        <a:t>-54.4% (63.6%)</a:t>
+                      </a:r>
+                    </a:p>
+                  </a:txBody>
+                  <a:tcPr anchor="ctr"/>
+                </a:tc>
+                <a:tc>
+                  <a:txBody>
+                    <a:bodyPr/>
+                    <a:lstStyle/>
+                    <a:p>
+                      <a:pPr algn="l"/>
+                      <a:r>
+                        <a:rPr lang="en-CA" sz="1100"/>
+                        <a:t>-33% (81.8%)</a:t>
+                      </a:r>
+                    </a:p>
+                  </a:txBody>
+                  <a:tcPr anchor="ctr"/>
+                </a:tc>
+                <a:tc>
+                  <a:txBody>
+                    <a:bodyPr/>
+                    <a:lstStyle/>
+                    <a:p>
+                      <a:pPr algn="l"/>
+                      <a:r>
+                        <a:rPr lang="en-CA" sz="1100"/>
+                        <a:t>-13.3% (96%)</a:t>
+                      </a:r>
+                    </a:p>
+                  </a:txBody>
+                  <a:tcPr anchor="ctr"/>
+                </a:tc>
+                <a:extLst>
+                  <a:ext uri="{0D108BD9-81ED-4DB2-BD59-A6C34878D82A}">
+                    <a16:rowId xmlns:a16="http://schemas.microsoft.com/office/drawing/2014/main" val="3699930996"/>
+                  </a:ext>
+                </a:extLst>
+              </a:tr>
+              <a:tr h="0">
+                <a:tc>
+                  <a:txBody>
+                    <a:bodyPr/>
+                    <a:lstStyle/>
+                    <a:p>
+                      <a:pPr algn="l"/>
+                      <a:r>
+                        <a:rPr lang="en-CA" sz="1100"/>
+                        <a:t>5% increase</a:t>
+                      </a:r>
+                    </a:p>
+                  </a:txBody>
+                  <a:tcPr anchor="ctr"/>
+                </a:tc>
+                <a:tc>
+                  <a:txBody>
+                    <a:bodyPr/>
+                    <a:lstStyle/>
+                    <a:p>
+                      <a:pPr algn="l"/>
+                      <a:r>
+                        <a:rPr lang="en-CA" sz="1100"/>
+                        <a:t>-1.3% (88.9%)</a:t>
+                      </a:r>
+                    </a:p>
+                  </a:txBody>
+                  <a:tcPr anchor="ctr"/>
+                </a:tc>
+                <a:tc>
+                  <a:txBody>
+                    <a:bodyPr/>
+                    <a:lstStyle/>
+                    <a:p>
+                      <a:pPr algn="l"/>
+                      <a:r>
+                        <a:rPr lang="en-CA" sz="1100"/>
+                        <a:t>-50.5% (18.2%)</a:t>
+                      </a:r>
+                    </a:p>
+                  </a:txBody>
+                  <a:tcPr anchor="ctr"/>
+                </a:tc>
+                <a:tc>
+                  <a:txBody>
+                    <a:bodyPr/>
+                    <a:lstStyle/>
+                    <a:p>
+                      <a:pPr algn="l"/>
+                      <a:r>
+                        <a:rPr lang="en-CA" sz="1100"/>
+                        <a:t>-35.5% (19.2%)</a:t>
+                      </a:r>
+                    </a:p>
+                  </a:txBody>
+                  <a:tcPr anchor="ctr"/>
+                </a:tc>
+                <a:tc>
+                  <a:txBody>
+                    <a:bodyPr/>
+                    <a:lstStyle/>
+                    <a:p>
+                      <a:pPr algn="l"/>
+                      <a:r>
+                        <a:rPr lang="en-CA" sz="1100" dirty="0"/>
+                        <a:t>-18% (40.4%)</a:t>
+                      </a:r>
+                    </a:p>
+                  </a:txBody>
+                  <a:tcPr anchor="ctr"/>
+                </a:tc>
+                <a:extLst>
+                  <a:ext uri="{0D108BD9-81ED-4DB2-BD59-A6C34878D82A}">
+                    <a16:rowId xmlns:a16="http://schemas.microsoft.com/office/drawing/2014/main" val="1483386016"/>
+                  </a:ext>
+                </a:extLst>
+              </a:tr>
+            </a:tbl>
+          </a:graphicData>
+        </a:graphic>
+      </p:graphicFrame>
+    </p:spTree>
+    <p:extLst>
+      <p:ext uri="{BB962C8B-B14F-4D97-AF65-F5344CB8AC3E}">
+        <p14:creationId xmlns:p14="http://schemas.microsoft.com/office/powerpoint/2010/main" val="1587117633"/>
+      </p:ext>
+    </p:extLst>
+  </p:cSld>
+  <p:clrMapOvr>
+    <a:masterClrMapping/>
+  </p:clrMapOvr>
+</p:sld>
+</file>
+
+<file path=ppt/slides/slide6.xml><?xml version="1.0" encoding="utf-8"?>
+<p:sld xmlns:a="http://schemas.openxmlformats.org/drawingml/2006/main" xmlns:r="http://schemas.openxmlformats.org/officeDocument/2006/relationships" xmlns:p="http://schemas.openxmlformats.org/presentationml/2006/main">
+  <p:cSld>
+    <p:spTree>
+      <p:nvGrpSpPr>
+        <p:cNvPr id="1" name=""/>
+        <p:cNvGrpSpPr/>
+        <p:nvPr/>
+      </p:nvGrpSpPr>
+      <p:grpSpPr>
+        <a:xfrm>
+          <a:off x="0" y="0"/>
+          <a:ext cx="0" cy="0"/>
+          <a:chOff x="0" y="0"/>
+          <a:chExt cx="0" cy="0"/>
+        </a:xfrm>
+      </p:grpSpPr>
+      <p:sp>
+        <p:nvSpPr>
+          <p:cNvPr id="5" name="TextBox 4">
+            <a:extLst>
+              <a:ext uri="{FF2B5EF4-FFF2-40B4-BE49-F238E27FC236}">
+                <a16:creationId xmlns:a16="http://schemas.microsoft.com/office/drawing/2014/main" id="{F5570679-D43E-20CE-D0F3-98BB752FF87C}"/>
+              </a:ext>
+            </a:extLst>
+          </p:cNvPr>
+          <p:cNvSpPr txBox="1"/>
+          <p:nvPr/>
+        </p:nvSpPr>
+        <p:spPr>
+          <a:xfrm>
+            <a:off x="742950" y="788671"/>
+            <a:ext cx="13064490" cy="1169551"/>
+          </a:xfrm>
+          <a:prstGeom prst="rect">
+            <a:avLst/>
+          </a:prstGeom>
+          <a:noFill/>
+        </p:spPr>
+        <p:txBody>
+          <a:bodyPr wrap="square">
+            <a:spAutoFit/>
+          </a:bodyPr>
+          <a:lstStyle/>
+          <a:p>
+            <a:r>
+              <a:rPr lang="en-US" sz="1400" dirty="0"/>
+              <a:t>|</a:t>
+            </a:r>
+            <a:r>
+              <a:rPr lang="en-US" sz="1400" dirty="0" err="1"/>
+              <a:t>effect_size</a:t>
+            </a:r>
+            <a:r>
+              <a:rPr lang="en-US" sz="1400" dirty="0"/>
+              <a:t>  | mean_percent_bias_80_80| mean_percent_bias_80_50| mean_percent_bias_80_20| coverage_80_80| coverage_80_50| coverage_80_20|</a:t>
+            </a:r>
+          </a:p>
+          <a:p>
+            <a:r>
+              <a:rPr lang="en-US" sz="1400" dirty="0"/>
+              <a:t>|:------------|-----------------------:|-----------------------:|-----------------------:|--------------:|--------------:|--------------:|</a:t>
+            </a:r>
+          </a:p>
+          <a:p>
+            <a:r>
+              <a:rPr lang="en-US" sz="1400" dirty="0"/>
+              <a:t>|.5% increase |               -57.64503|               -38.38967|                -6.33103|       80.85106|       80.64516|       90.52632|</a:t>
+            </a:r>
+          </a:p>
+          <a:p>
+            <a:r>
+              <a:rPr lang="en-US" sz="1400" dirty="0"/>
+              <a:t>|1% increase  |               -51.82795|               -30.72747|               -11.23662|       48.97959|       65.97938|       87.50000|</a:t>
+            </a:r>
+          </a:p>
+          <a:p>
+            <a:r>
+              <a:rPr lang="en-US" sz="1400" dirty="0"/>
+              <a:t>|5% increase  |               -48.81851|               -32.58425|               -13.83406|       19.14894|       47.87234|       75.26882|</a:t>
+            </a:r>
+          </a:p>
+        </p:txBody>
+      </p:sp>
+    </p:spTree>
+    <p:extLst>
+      <p:ext uri="{BB962C8B-B14F-4D97-AF65-F5344CB8AC3E}">
+        <p14:creationId xmlns:p14="http://schemas.microsoft.com/office/powerpoint/2010/main" val="2315979143"/>
       </p:ext>
     </p:extLst>
   </p:cSld>

</xml_diff>

<commit_message>
changes to manuscript and figures
</commit_message>
<xml_diff>
--- a/figures/manual figs.pptx
+++ b/figures/manual figs.pptx
@@ -202,7 +202,7 @@
           <a:p>
             <a:fld id="{E7CA70EE-0A76-034B-B3BD-8D77E208ED84}" type="datetimeFigureOut">
               <a:rPr lang="en-US" smtClean="0"/>
-              <a:t>10/23/24</a:t>
+              <a:t>11/7/24</a:t>
             </a:fld>
             <a:endParaRPr lang="en-US"/>
           </a:p>
@@ -700,7 +700,7 @@
           <a:p>
             <a:fld id="{A439EA33-ED7C-8340-AD6D-B4965999229A}" type="datetimeFigureOut">
               <a:rPr lang="en-US" smtClean="0"/>
-              <a:t>10/23/24</a:t>
+              <a:t>11/7/24</a:t>
             </a:fld>
             <a:endParaRPr lang="en-US"/>
           </a:p>
@@ -898,7 +898,7 @@
           <a:p>
             <a:fld id="{A439EA33-ED7C-8340-AD6D-B4965999229A}" type="datetimeFigureOut">
               <a:rPr lang="en-US" smtClean="0"/>
-              <a:t>10/23/24</a:t>
+              <a:t>11/7/24</a:t>
             </a:fld>
             <a:endParaRPr lang="en-US"/>
           </a:p>
@@ -1106,7 +1106,7 @@
           <a:p>
             <a:fld id="{A439EA33-ED7C-8340-AD6D-B4965999229A}" type="datetimeFigureOut">
               <a:rPr lang="en-US" smtClean="0"/>
-              <a:t>10/23/24</a:t>
+              <a:t>11/7/24</a:t>
             </a:fld>
             <a:endParaRPr lang="en-US"/>
           </a:p>
@@ -1304,7 +1304,7 @@
           <a:p>
             <a:fld id="{A439EA33-ED7C-8340-AD6D-B4965999229A}" type="datetimeFigureOut">
               <a:rPr lang="en-US" smtClean="0"/>
-              <a:t>10/23/24</a:t>
+              <a:t>11/7/24</a:t>
             </a:fld>
             <a:endParaRPr lang="en-US"/>
           </a:p>
@@ -1579,7 +1579,7 @@
           <a:p>
             <a:fld id="{A439EA33-ED7C-8340-AD6D-B4965999229A}" type="datetimeFigureOut">
               <a:rPr lang="en-US" smtClean="0"/>
-              <a:t>10/23/24</a:t>
+              <a:t>11/7/24</a:t>
             </a:fld>
             <a:endParaRPr lang="en-US"/>
           </a:p>
@@ -1844,7 +1844,7 @@
           <a:p>
             <a:fld id="{A439EA33-ED7C-8340-AD6D-B4965999229A}" type="datetimeFigureOut">
               <a:rPr lang="en-US" smtClean="0"/>
-              <a:t>10/23/24</a:t>
+              <a:t>11/7/24</a:t>
             </a:fld>
             <a:endParaRPr lang="en-US"/>
           </a:p>
@@ -2256,7 +2256,7 @@
           <a:p>
             <a:fld id="{A439EA33-ED7C-8340-AD6D-B4965999229A}" type="datetimeFigureOut">
               <a:rPr lang="en-US" smtClean="0"/>
-              <a:t>10/23/24</a:t>
+              <a:t>11/7/24</a:t>
             </a:fld>
             <a:endParaRPr lang="en-US"/>
           </a:p>
@@ -2397,7 +2397,7 @@
           <a:p>
             <a:fld id="{A439EA33-ED7C-8340-AD6D-B4965999229A}" type="datetimeFigureOut">
               <a:rPr lang="en-US" smtClean="0"/>
-              <a:t>10/23/24</a:t>
+              <a:t>11/7/24</a:t>
             </a:fld>
             <a:endParaRPr lang="en-US"/>
           </a:p>
@@ -2510,7 +2510,7 @@
           <a:p>
             <a:fld id="{A439EA33-ED7C-8340-AD6D-B4965999229A}" type="datetimeFigureOut">
               <a:rPr lang="en-US" smtClean="0"/>
-              <a:t>10/23/24</a:t>
+              <a:t>11/7/24</a:t>
             </a:fld>
             <a:endParaRPr lang="en-US"/>
           </a:p>
@@ -2821,7 +2821,7 @@
           <a:p>
             <a:fld id="{A439EA33-ED7C-8340-AD6D-B4965999229A}" type="datetimeFigureOut">
               <a:rPr lang="en-US" smtClean="0"/>
-              <a:t>10/23/24</a:t>
+              <a:t>11/7/24</a:t>
             </a:fld>
             <a:endParaRPr lang="en-US"/>
           </a:p>
@@ -3109,7 +3109,7 @@
           <a:p>
             <a:fld id="{A439EA33-ED7C-8340-AD6D-B4965999229A}" type="datetimeFigureOut">
               <a:rPr lang="en-US" smtClean="0"/>
-              <a:t>10/23/24</a:t>
+              <a:t>11/7/24</a:t>
             </a:fld>
             <a:endParaRPr lang="en-US"/>
           </a:p>
@@ -3350,7 +3350,7 @@
           <a:p>
             <a:fld id="{A439EA33-ED7C-8340-AD6D-B4965999229A}" type="datetimeFigureOut">
               <a:rPr lang="en-US" smtClean="0"/>
-              <a:t>10/23/24</a:t>
+              <a:t>11/7/24</a:t>
             </a:fld>
             <a:endParaRPr lang="en-US"/>
           </a:p>
@@ -3781,8 +3781,8 @@
         </p:nvSpPr>
         <p:spPr>
           <a:xfrm>
-            <a:off x="182878" y="3380636"/>
-            <a:ext cx="11424924" cy="720611"/>
+            <a:off x="7764780" y="3661491"/>
+            <a:ext cx="6746242" cy="1591414"/>
           </a:xfrm>
           <a:prstGeom prst="rect">
             <a:avLst/>
@@ -3810,7 +3810,7 @@
                 <a:ea typeface="Times New Roman" panose="02020603050405020304" pitchFamily="18" charset="0"/>
                 <a:cs typeface="Times New Roman" panose="02020603050405020304" pitchFamily="18" charset="0"/>
               </a:rPr>
-              <a:t>Figure 1: Simulation results. </a:t>
+              <a:t>Figure 2: Simulation results. </a:t>
             </a:r>
             <a:r>
               <a:rPr lang="en-CA" sz="1050" kern="100" dirty="0">
@@ -3925,7 +3925,7 @@
                 <a:ea typeface="Times New Roman" panose="02020603050405020304" pitchFamily="18" charset="0"/>
                 <a:cs typeface="Times New Roman" panose="02020603050405020304" pitchFamily="18" charset="0"/>
               </a:rPr>
-              <a:t>. Figure 1A includes results from simulations using a difference-in-differences study design, while </a:t>
+              <a:t>. Figure 2A includes results from simulations using a difference-in-differences study design, while </a:t>
             </a:r>
             <a:r>
               <a:rPr lang="en-CA" sz="1050" kern="100" dirty="0">
@@ -3942,7 +3942,7 @@
                 <a:ea typeface="Times New Roman" panose="02020603050405020304" pitchFamily="18" charset="0"/>
                 <a:cs typeface="Times New Roman" panose="02020603050405020304" pitchFamily="18" charset="0"/>
               </a:rPr>
-              <a:t>igure 1B includes results from the case-crossover design. Colors correspond to the true simulated effect size, and the x-axis titles describe each simulation case. There is a dashed line at 0.</a:t>
+              <a:t>igure 2B includes results from the case-crossover design. Colors correspond to the true simulated effect size, and the x-axis titles describe each simulation case. There is a dashed line at 0.</a:t>
             </a:r>
             <a:endParaRPr lang="en-CA" sz="1200" kern="100" dirty="0">
               <a:effectLst/>
@@ -3986,7 +3986,7 @@
                 <a:latin typeface="Arial" panose="020B0604020202020204" pitchFamily="34" charset="0"/>
                 <a:cs typeface="Arial" panose="020B0604020202020204" pitchFamily="34" charset="0"/>
               </a:rPr>
-              <a:t>Figure 1A: Difference-in-differences simulations:</a:t>
+              <a:t>Figure 2A: Difference-in-differences simulations:</a:t>
             </a:r>
           </a:p>
         </p:txBody>
@@ -4041,7 +4041,7 @@
         </p:blipFill>
         <p:spPr>
           <a:xfrm>
-            <a:off x="9870440" y="43738"/>
+            <a:off x="5275580" y="929861"/>
             <a:ext cx="1931672" cy="1251378"/>
           </a:xfrm>
           <a:prstGeom prst="rect">
@@ -4117,7 +4117,7 @@
         </p:nvSpPr>
         <p:spPr>
           <a:xfrm>
-            <a:off x="5456795" y="415511"/>
+            <a:off x="196755" y="3535114"/>
             <a:ext cx="2539478" cy="253916"/>
           </a:xfrm>
           <a:prstGeom prst="rect">
@@ -4136,7 +4136,7 @@
                 <a:latin typeface="Arial" panose="020B0604020202020204" pitchFamily="34" charset="0"/>
                 <a:cs typeface="Arial" panose="020B0604020202020204" pitchFamily="34" charset="0"/>
               </a:rPr>
-              <a:t>Figure 1B: Case-crossover simulations:</a:t>
+              <a:t>Figure 2B: Case-crossover simulations:</a:t>
             </a:r>
           </a:p>
         </p:txBody>
@@ -4162,8 +4162,37 @@
         </p:blipFill>
         <p:spPr>
           <a:xfrm>
-            <a:off x="5305758" y="541888"/>
+            <a:off x="45718" y="3661491"/>
             <a:ext cx="5027932" cy="2838748"/>
+          </a:xfrm>
+          <a:prstGeom prst="rect">
+            <a:avLst/>
+          </a:prstGeom>
+        </p:spPr>
+      </p:pic>
+      <p:pic>
+        <p:nvPicPr>
+          <p:cNvPr id="2" name="Picture 1">
+            <a:extLst>
+              <a:ext uri="{FF2B5EF4-FFF2-40B4-BE49-F238E27FC236}">
+                <a16:creationId xmlns:a16="http://schemas.microsoft.com/office/drawing/2014/main" id="{6E025F80-0430-D2A9-5F48-17306A4B9A66}"/>
+              </a:ext>
+            </a:extLst>
+          </p:cNvPr>
+          <p:cNvPicPr>
+            <a:picLocks noChangeAspect="1"/>
+          </p:cNvPicPr>
+          <p:nvPr/>
+        </p:nvPicPr>
+        <p:blipFill rotWithShape="1">
+          <a:blip r:embed="rId4"/>
+          <a:srcRect l="87625" t="23999" r="63" b="41108"/>
+          <a:stretch/>
+        </p:blipFill>
+        <p:spPr>
+          <a:xfrm>
+            <a:off x="5275580" y="4282661"/>
+            <a:ext cx="1931672" cy="1251378"/>
           </a:xfrm>
           <a:prstGeom prst="rect">
             <a:avLst/>
@@ -4230,6 +4259,35 @@
           <a:chExt cx="0" cy="0"/>
         </a:xfrm>
       </p:grpSpPr>
+      <p:pic>
+        <p:nvPicPr>
+          <p:cNvPr id="3" name="Picture 2">
+            <a:extLst>
+              <a:ext uri="{FF2B5EF4-FFF2-40B4-BE49-F238E27FC236}">
+                <a16:creationId xmlns:a16="http://schemas.microsoft.com/office/drawing/2014/main" id="{64DB5043-7B0A-5734-6F5A-7F0312501ED0}"/>
+              </a:ext>
+            </a:extLst>
+          </p:cNvPr>
+          <p:cNvPicPr>
+            <a:picLocks noChangeAspect="1"/>
+          </p:cNvPicPr>
+          <p:nvPr/>
+        </p:nvPicPr>
+        <p:blipFill>
+          <a:blip r:embed="rId2"/>
+          <a:srcRect r="61356"/>
+          <a:stretch/>
+        </p:blipFill>
+        <p:spPr>
+          <a:xfrm>
+            <a:off x="377041" y="3771707"/>
+            <a:ext cx="5001208" cy="2250755"/>
+          </a:xfrm>
+          <a:prstGeom prst="rect">
+            <a:avLst/>
+          </a:prstGeom>
+        </p:spPr>
+      </p:pic>
       <p:sp>
         <p:nvSpPr>
           <p:cNvPr id="6" name="Text Box 2">
@@ -4244,8 +4302,8 @@
         </p:nvSpPr>
         <p:spPr>
           <a:xfrm>
-            <a:off x="377187" y="5879720"/>
-            <a:ext cx="7669534" cy="758190"/>
+            <a:off x="7183822" y="3548683"/>
+            <a:ext cx="5929220" cy="2085611"/>
           </a:xfrm>
           <a:prstGeom prst="rect">
             <a:avLst/>
@@ -4367,7 +4425,7 @@
           <p:nvPr/>
         </p:nvPicPr>
         <p:blipFill rotWithShape="1">
-          <a:blip r:embed="rId2"/>
+          <a:blip r:embed="rId3"/>
           <a:srcRect r="60884"/>
           <a:stretch/>
         </p:blipFill>
@@ -4396,13 +4454,13 @@
           <p:nvPr/>
         </p:nvPicPr>
         <p:blipFill rotWithShape="1">
-          <a:blip r:embed="rId3"/>
+          <a:blip r:embed="rId4"/>
           <a:srcRect l="86888" t="37373" r="30" b="39746"/>
           <a:stretch/>
         </p:blipFill>
         <p:spPr>
           <a:xfrm>
-            <a:off x="5849946" y="704327"/>
+            <a:off x="5732408" y="2303614"/>
             <a:ext cx="1691640" cy="514573"/>
           </a:xfrm>
           <a:prstGeom prst="rect">
@@ -4574,168 +4632,6 @@
       </p:sp>
       <p:sp>
         <p:nvSpPr>
-          <p:cNvPr id="18" name="Rectangle 17">
-            <a:extLst>
-              <a:ext uri="{FF2B5EF4-FFF2-40B4-BE49-F238E27FC236}">
-                <a16:creationId xmlns:a16="http://schemas.microsoft.com/office/drawing/2014/main" id="{A7FE4107-F54B-3C29-F5BC-55239B77E9AB}"/>
-              </a:ext>
-            </a:extLst>
-          </p:cNvPr>
-          <p:cNvSpPr/>
-          <p:nvPr/>
-        </p:nvSpPr>
-        <p:spPr>
-          <a:xfrm>
-            <a:off x="6808844" y="1101622"/>
-            <a:ext cx="117987" cy="4532671"/>
-          </a:xfrm>
-          <a:prstGeom prst="rect">
-            <a:avLst/>
-          </a:prstGeom>
-          <a:solidFill>
-            <a:schemeClr val="bg1"/>
-          </a:solidFill>
-          <a:ln>
-            <a:solidFill>
-              <a:schemeClr val="bg1"/>
-            </a:solidFill>
-          </a:ln>
-        </p:spPr>
-        <p:style>
-          <a:lnRef idx="2">
-            <a:schemeClr val="accent1">
-              <a:shade val="15000"/>
-            </a:schemeClr>
-          </a:lnRef>
-          <a:fillRef idx="1">
-            <a:schemeClr val="accent1"/>
-          </a:fillRef>
-          <a:effectRef idx="0">
-            <a:schemeClr val="accent1"/>
-          </a:effectRef>
-          <a:fontRef idx="minor">
-            <a:schemeClr val="lt1"/>
-          </a:fontRef>
-        </p:style>
-        <p:txBody>
-          <a:bodyPr rtlCol="0" anchor="ctr"/>
-          <a:lstStyle/>
-          <a:p>
-            <a:pPr algn="ctr"/>
-            <a:endParaRPr lang="en-US"/>
-          </a:p>
-        </p:txBody>
-      </p:sp>
-      <p:sp>
-        <p:nvSpPr>
-          <p:cNvPr id="19" name="Rectangle 18">
-            <a:extLst>
-              <a:ext uri="{FF2B5EF4-FFF2-40B4-BE49-F238E27FC236}">
-                <a16:creationId xmlns:a16="http://schemas.microsoft.com/office/drawing/2014/main" id="{AB3F32F9-E9AC-A4A3-F3B6-50776AAA35A5}"/>
-              </a:ext>
-            </a:extLst>
-          </p:cNvPr>
-          <p:cNvSpPr/>
-          <p:nvPr/>
-        </p:nvSpPr>
-        <p:spPr>
-          <a:xfrm>
-            <a:off x="8300297" y="1286214"/>
-            <a:ext cx="117987" cy="4532671"/>
-          </a:xfrm>
-          <a:prstGeom prst="rect">
-            <a:avLst/>
-          </a:prstGeom>
-          <a:solidFill>
-            <a:schemeClr val="bg1"/>
-          </a:solidFill>
-          <a:ln>
-            <a:solidFill>
-              <a:schemeClr val="bg1"/>
-            </a:solidFill>
-          </a:ln>
-        </p:spPr>
-        <p:style>
-          <a:lnRef idx="2">
-            <a:schemeClr val="accent1">
-              <a:shade val="15000"/>
-            </a:schemeClr>
-          </a:lnRef>
-          <a:fillRef idx="1">
-            <a:schemeClr val="accent1"/>
-          </a:fillRef>
-          <a:effectRef idx="0">
-            <a:schemeClr val="accent1"/>
-          </a:effectRef>
-          <a:fontRef idx="minor">
-            <a:schemeClr val="lt1"/>
-          </a:fontRef>
-        </p:style>
-        <p:txBody>
-          <a:bodyPr rtlCol="0" anchor="ctr"/>
-          <a:lstStyle/>
-          <a:p>
-            <a:pPr algn="ctr"/>
-            <a:endParaRPr lang="en-US"/>
-          </a:p>
-        </p:txBody>
-      </p:sp>
-      <p:sp>
-        <p:nvSpPr>
-          <p:cNvPr id="20" name="Rectangle 19">
-            <a:extLst>
-              <a:ext uri="{FF2B5EF4-FFF2-40B4-BE49-F238E27FC236}">
-                <a16:creationId xmlns:a16="http://schemas.microsoft.com/office/drawing/2014/main" id="{FE62FC87-B156-D70F-36D6-823C3EA58D9D}"/>
-              </a:ext>
-            </a:extLst>
-          </p:cNvPr>
-          <p:cNvSpPr/>
-          <p:nvPr/>
-        </p:nvSpPr>
-        <p:spPr>
-          <a:xfrm>
-            <a:off x="9817519" y="1358183"/>
-            <a:ext cx="117987" cy="4532671"/>
-          </a:xfrm>
-          <a:prstGeom prst="rect">
-            <a:avLst/>
-          </a:prstGeom>
-          <a:solidFill>
-            <a:schemeClr val="bg1"/>
-          </a:solidFill>
-          <a:ln>
-            <a:solidFill>
-              <a:schemeClr val="bg1"/>
-            </a:solidFill>
-          </a:ln>
-        </p:spPr>
-        <p:style>
-          <a:lnRef idx="2">
-            <a:schemeClr val="accent1">
-              <a:shade val="15000"/>
-            </a:schemeClr>
-          </a:lnRef>
-          <a:fillRef idx="1">
-            <a:schemeClr val="accent1"/>
-          </a:fillRef>
-          <a:effectRef idx="0">
-            <a:schemeClr val="accent1"/>
-          </a:effectRef>
-          <a:fontRef idx="minor">
-            <a:schemeClr val="lt1"/>
-          </a:fontRef>
-        </p:style>
-        <p:txBody>
-          <a:bodyPr rtlCol="0" anchor="ctr"/>
-          <a:lstStyle/>
-          <a:p>
-            <a:pPr algn="ctr"/>
-            <a:endParaRPr lang="en-US"/>
-          </a:p>
-        </p:txBody>
-      </p:sp>
-      <p:sp>
-        <p:nvSpPr>
           <p:cNvPr id="21" name="Rectangle 20">
             <a:extLst>
               <a:ext uri="{FF2B5EF4-FFF2-40B4-BE49-F238E27FC236}">
@@ -4821,7 +4717,7 @@
                 <a:latin typeface="Arial" panose="020B0604020202020204" pitchFamily="34" charset="0"/>
                 <a:cs typeface="Arial" panose="020B0604020202020204" pitchFamily="34" charset="0"/>
               </a:rPr>
-              <a:t>Figure 2A: Difference-in-differences simulations</a:t>
+              <a:t>Figure 3A: Difference-in-differences simulations</a:t>
             </a:r>
           </a:p>
         </p:txBody>
@@ -4859,7 +4755,7 @@
                 <a:latin typeface="Arial" panose="020B0604020202020204" pitchFamily="34" charset="0"/>
                 <a:cs typeface="Arial" panose="020B0604020202020204" pitchFamily="34" charset="0"/>
               </a:rPr>
-              <a:t>Figure 2B: Case-crossover simulations</a:t>
+              <a:t>Figure 3B: Case-crossover simulations</a:t>
             </a:r>
           </a:p>
         </p:txBody>
@@ -4933,13 +4829,13 @@
           <p:nvPr/>
         </p:nvPicPr>
         <p:blipFill rotWithShape="1">
-          <a:blip r:embed="rId4"/>
+          <a:blip r:embed="rId5"/>
           <a:srcRect l="86888" r="30" b="63293"/>
           <a:stretch/>
         </p:blipFill>
         <p:spPr>
           <a:xfrm>
-            <a:off x="4157306" y="336250"/>
+            <a:off x="5678536" y="1478114"/>
             <a:ext cx="1691640" cy="825500"/>
           </a:xfrm>
           <a:prstGeom prst="rect">
@@ -4949,10 +4845,10 @@
       </p:pic>
       <p:pic>
         <p:nvPicPr>
-          <p:cNvPr id="3" name="Picture 2">
-            <a:extLst>
-              <a:ext uri="{FF2B5EF4-FFF2-40B4-BE49-F238E27FC236}">
-                <a16:creationId xmlns:a16="http://schemas.microsoft.com/office/drawing/2014/main" id="{64DB5043-7B0A-5734-6F5A-7F0312501ED0}"/>
+          <p:cNvPr id="2" name="Picture 1">
+            <a:extLst>
+              <a:ext uri="{FF2B5EF4-FFF2-40B4-BE49-F238E27FC236}">
+                <a16:creationId xmlns:a16="http://schemas.microsoft.com/office/drawing/2014/main" id="{5F28D15D-B972-B131-A9E4-FD48F2960181}"/>
               </a:ext>
             </a:extLst>
           </p:cNvPr>
@@ -4961,15 +4857,44 @@
           </p:cNvPicPr>
           <p:nvPr/>
         </p:nvPicPr>
-        <p:blipFill>
-          <a:blip r:embed="rId5"/>
-          <a:srcRect r="61356"/>
+        <p:blipFill rotWithShape="1">
+          <a:blip r:embed="rId4"/>
+          <a:srcRect l="86888" t="37373" r="30" b="39746"/>
           <a:stretch/>
         </p:blipFill>
         <p:spPr>
           <a:xfrm>
-            <a:off x="377041" y="3771707"/>
-            <a:ext cx="5001208" cy="2250755"/>
+            <a:off x="5732408" y="4521817"/>
+            <a:ext cx="1691640" cy="514573"/>
+          </a:xfrm>
+          <a:prstGeom prst="rect">
+            <a:avLst/>
+          </a:prstGeom>
+        </p:spPr>
+      </p:pic>
+      <p:pic>
+        <p:nvPicPr>
+          <p:cNvPr id="4" name="Picture 3">
+            <a:extLst>
+              <a:ext uri="{FF2B5EF4-FFF2-40B4-BE49-F238E27FC236}">
+                <a16:creationId xmlns:a16="http://schemas.microsoft.com/office/drawing/2014/main" id="{EFC64E25-9993-8A8F-98DA-25BFB826323B}"/>
+              </a:ext>
+            </a:extLst>
+          </p:cNvPr>
+          <p:cNvPicPr>
+            <a:picLocks noChangeAspect="1"/>
+          </p:cNvPicPr>
+          <p:nvPr/>
+        </p:nvPicPr>
+        <p:blipFill rotWithShape="1">
+          <a:blip r:embed="rId5"/>
+          <a:srcRect l="86888" r="30" b="63293"/>
+          <a:stretch/>
+        </p:blipFill>
+        <p:spPr>
+          <a:xfrm>
+            <a:off x="5678536" y="3696317"/>
+            <a:ext cx="1691640" cy="825500"/>
           </a:xfrm>
           <a:prstGeom prst="rect">
             <a:avLst/>
@@ -6244,14 +6169,14 @@
           <p:nvPr>
             <p:extLst>
               <p:ext uri="{D42A27DB-BD31-4B8C-83A1-F6EECF244321}">
-                <p14:modId xmlns:p14="http://schemas.microsoft.com/office/powerpoint/2010/main" val="1470683712"/>
+                <p14:modId xmlns:p14="http://schemas.microsoft.com/office/powerpoint/2010/main" val="3274013418"/>
               </p:ext>
             </p:extLst>
           </p:nvPr>
         </p:nvGraphicFramePr>
         <p:xfrm>
-          <a:off x="514023" y="2610328"/>
-          <a:ext cx="9270060" cy="2021903"/>
+          <a:off x="422582" y="3429000"/>
+          <a:ext cx="9270060" cy="2887840"/>
         </p:xfrm>
         <a:graphic>
           <a:graphicData uri="http://schemas.openxmlformats.org/drawingml/2006/table">
@@ -6304,17 +6229,17 @@
                     <a:p>
                       <a:pPr algn="l"/>
                       <a:r>
-                        <a:rPr lang="en-CA" sz="1100" b="1" dirty="0">
+                        <a:rPr lang="en-CA" sz="1600" b="1" dirty="0">
                           <a:latin typeface="Arial" panose="020B0604020202020204" pitchFamily="34" charset="0"/>
                           <a:cs typeface="Arial" panose="020B0604020202020204" pitchFamily="34" charset="0"/>
                         </a:rPr>
-                        <a:t>Table 1B: Results from case-crossover study design simulations, select cases of missingness </a:t>
-                      </a:r>
-                    </a:p>
-                    <a:p>
-                      <a:pPr algn="l"/>
-                      <a:r>
-                        <a:rPr lang="en-CA" sz="1100" b="1" dirty="0">
+                        <a:t>Table 2B: Results from case-crossover study design simulations, select cases of missingness </a:t>
+                      </a:r>
+                    </a:p>
+                    <a:p>
+                      <a:pPr algn="l"/>
+                      <a:r>
+                        <a:rPr lang="en-CA" sz="1600" b="1" dirty="0">
                           <a:latin typeface="Arial" panose="020B0604020202020204" pitchFamily="34" charset="0"/>
                           <a:cs typeface="Arial" panose="020B0604020202020204" pitchFamily="34" charset="0"/>
                         </a:rPr>
@@ -6389,7 +6314,7 @@
                     <a:lstStyle/>
                     <a:p>
                       <a:pPr algn="l"/>
-                      <a:endParaRPr lang="en-CA" sz="1100" b="1" dirty="0">
+                      <a:endParaRPr lang="en-CA" sz="1600" b="1" dirty="0">
                         <a:latin typeface="Arial" panose="020B0604020202020204" pitchFamily="34" charset="0"/>
                         <a:cs typeface="Arial" panose="020B0604020202020204" pitchFamily="34" charset="0"/>
                       </a:endParaRPr>
@@ -6438,7 +6363,7 @@
                     <a:p>
                       <a:pPr algn="l"/>
                       <a:r>
-                        <a:rPr lang="en-CA" sz="1100" dirty="0">
+                        <a:rPr lang="en-CA" sz="1600" dirty="0">
                           <a:latin typeface="Arial" panose="020B0604020202020204" pitchFamily="34" charset="0"/>
                           <a:cs typeface="Arial" panose="020B0604020202020204" pitchFamily="34" charset="0"/>
                         </a:rPr>
@@ -6459,7 +6384,7 @@
                     <a:p>
                       <a:pPr algn="l"/>
                       <a:r>
-                        <a:rPr lang="en-CA" sz="1100" dirty="0">
+                        <a:rPr lang="en-CA" sz="1600" dirty="0">
                           <a:latin typeface="Arial" panose="020B0604020202020204" pitchFamily="34" charset="0"/>
                           <a:cs typeface="Arial" panose="020B0604020202020204" pitchFamily="34" charset="0"/>
                         </a:rPr>
@@ -6480,7 +6405,7 @@
                     <a:p>
                       <a:pPr algn="l"/>
                       <a:r>
-                        <a:rPr lang="en-CA" sz="1100" dirty="0">
+                        <a:rPr lang="en-CA" sz="1600" dirty="0">
                           <a:latin typeface="Arial" panose="020B0604020202020204" pitchFamily="34" charset="0"/>
                           <a:cs typeface="Arial" panose="020B0604020202020204" pitchFamily="34" charset="0"/>
                         </a:rPr>
@@ -6501,7 +6426,7 @@
                     <a:p>
                       <a:pPr algn="l"/>
                       <a:r>
-                        <a:rPr lang="en-CA" sz="1100" dirty="0">
+                        <a:rPr lang="en-CA" sz="1600" dirty="0">
                           <a:latin typeface="Arial" panose="020B0604020202020204" pitchFamily="34" charset="0"/>
                           <a:cs typeface="Arial" panose="020B0604020202020204" pitchFamily="34" charset="0"/>
                         </a:rPr>
@@ -6522,7 +6447,7 @@
                     <a:p>
                       <a:pPr algn="l"/>
                       <a:r>
-                        <a:rPr lang="en-CA" sz="1100" dirty="0">
+                        <a:rPr lang="en-CA" sz="1600" dirty="0">
                           <a:latin typeface="Arial" panose="020B0604020202020204" pitchFamily="34" charset="0"/>
                           <a:cs typeface="Arial" panose="020B0604020202020204" pitchFamily="34" charset="0"/>
                         </a:rPr>
@@ -6550,7 +6475,7 @@
                     <a:p>
                       <a:pPr algn="l"/>
                       <a:r>
-                        <a:rPr lang="en-CA" sz="1100" dirty="0">
+                        <a:rPr lang="en-CA" sz="1600" dirty="0">
                           <a:latin typeface="Arial" panose="020B0604020202020204" pitchFamily="34" charset="0"/>
                           <a:cs typeface="Arial" panose="020B0604020202020204" pitchFamily="34" charset="0"/>
                         </a:rPr>
@@ -6574,7 +6499,7 @@
                     <a:p>
                       <a:pPr algn="l"/>
                       <a:r>
-                        <a:rPr lang="en-CA" sz="1100" b="0" i="0" kern="1200" dirty="0">
+                        <a:rPr lang="en-CA" sz="1600" b="0" i="0" kern="1200" dirty="0">
                           <a:solidFill>
                             <a:schemeClr val="dk1"/>
                           </a:solidFill>
@@ -6586,7 +6511,7 @@
                         <a:t>-9.1%</a:t>
                       </a:r>
                       <a:r>
-                        <a:rPr lang="en-CA" sz="1100" dirty="0">
+                        <a:rPr lang="en-CA" sz="1600" dirty="0">
                           <a:latin typeface="Arial" panose="020B0604020202020204" pitchFamily="34" charset="0"/>
                           <a:cs typeface="Arial" panose="020B0604020202020204" pitchFamily="34" charset="0"/>
                         </a:rPr>
@@ -6610,20 +6535,20 @@
                     <a:p>
                       <a:pPr algn="l"/>
                       <a:r>
-                        <a:rPr lang="en-CA" sz="1100" dirty="0">
+                        <a:rPr lang="en-CA" sz="1600" dirty="0">
                           <a:latin typeface="Arial" panose="020B0604020202020204" pitchFamily="34" charset="0"/>
                           <a:cs typeface="Arial" panose="020B0604020202020204" pitchFamily="34" charset="0"/>
                         </a:rPr>
                         <a:t>-6.3% </a:t>
                       </a:r>
                       <a:r>
-                        <a:rPr lang="en-US" sz="1100" dirty="0">
+                        <a:rPr lang="en-US" sz="1600" dirty="0">
                           <a:latin typeface="Arial" panose="020B0604020202020204" pitchFamily="34" charset="0"/>
                           <a:cs typeface="Arial" panose="020B0604020202020204" pitchFamily="34" charset="0"/>
                         </a:rPr>
                         <a:t>(90.5%)</a:t>
                       </a:r>
-                      <a:endParaRPr lang="en-CA" sz="1100" dirty="0">
+                      <a:endParaRPr lang="en-CA" sz="1600" dirty="0">
                         <a:latin typeface="Arial" panose="020B0604020202020204" pitchFamily="34" charset="0"/>
                         <a:cs typeface="Arial" panose="020B0604020202020204" pitchFamily="34" charset="0"/>
                       </a:endParaRPr>
@@ -6645,7 +6570,7 @@
                     <a:p>
                       <a:pPr algn="l"/>
                       <a:r>
-                        <a:rPr lang="en-CA" sz="1100" dirty="0">
+                        <a:rPr lang="en-CA" sz="1600" dirty="0">
                           <a:latin typeface="Arial" panose="020B0604020202020204" pitchFamily="34" charset="0"/>
                           <a:cs typeface="Arial" panose="020B0604020202020204" pitchFamily="34" charset="0"/>
                         </a:rPr>
@@ -6669,13 +6594,13 @@
                     <a:p>
                       <a:pPr algn="l"/>
                       <a:r>
-                        <a:rPr lang="en-US" sz="1100" dirty="0">
+                        <a:rPr lang="en-US" sz="1600" dirty="0">
                           <a:latin typeface="Arial" panose="020B0604020202020204" pitchFamily="34" charset="0"/>
                           <a:cs typeface="Arial" panose="020B0604020202020204" pitchFamily="34" charset="0"/>
                         </a:rPr>
                         <a:t>-57.6% (80.6%)</a:t>
                       </a:r>
-                      <a:endParaRPr lang="en-CA" sz="1100" dirty="0">
+                      <a:endParaRPr lang="en-CA" sz="1600" dirty="0">
                         <a:latin typeface="Arial" panose="020B0604020202020204" pitchFamily="34" charset="0"/>
                         <a:cs typeface="Arial" panose="020B0604020202020204" pitchFamily="34" charset="0"/>
                       </a:endParaRPr>
@@ -6704,7 +6629,7 @@
                     <a:p>
                       <a:pPr algn="l"/>
                       <a:r>
-                        <a:rPr lang="en-CA" sz="1100" dirty="0">
+                        <a:rPr lang="en-CA" sz="1600" dirty="0">
                           <a:latin typeface="Arial" panose="020B0604020202020204" pitchFamily="34" charset="0"/>
                           <a:cs typeface="Arial" panose="020B0604020202020204" pitchFamily="34" charset="0"/>
                         </a:rPr>
@@ -6721,7 +6646,7 @@
                     <a:p>
                       <a:pPr algn="l"/>
                       <a:r>
-                        <a:rPr lang="en-CA" sz="1100" dirty="0">
+                        <a:rPr lang="en-CA" sz="1600" dirty="0">
                           <a:latin typeface="Arial" panose="020B0604020202020204" pitchFamily="34" charset="0"/>
                           <a:cs typeface="Arial" panose="020B0604020202020204" pitchFamily="34" charset="0"/>
                         </a:rPr>
@@ -6738,7 +6663,7 @@
                     <a:p>
                       <a:pPr algn="l"/>
                       <a:r>
-                        <a:rPr lang="en-CA" sz="1100" dirty="0">
+                        <a:rPr lang="en-CA" sz="1600" dirty="0">
                           <a:latin typeface="Arial" panose="020B0604020202020204" pitchFamily="34" charset="0"/>
                           <a:cs typeface="Arial" panose="020B0604020202020204" pitchFamily="34" charset="0"/>
                         </a:rPr>
@@ -6755,7 +6680,7 @@
                     <a:p>
                       <a:pPr algn="l"/>
                       <a:r>
-                        <a:rPr lang="en-CA" sz="1100" dirty="0">
+                        <a:rPr lang="en-CA" sz="1600" dirty="0">
                           <a:latin typeface="Arial" panose="020B0604020202020204" pitchFamily="34" charset="0"/>
                           <a:cs typeface="Arial" panose="020B0604020202020204" pitchFamily="34" charset="0"/>
                         </a:rPr>
@@ -6772,7 +6697,7 @@
                     <a:p>
                       <a:pPr algn="l"/>
                       <a:r>
-                        <a:rPr lang="en-CA" sz="1100" dirty="0">
+                        <a:rPr lang="en-CA" sz="1600" dirty="0">
                           <a:latin typeface="Arial" panose="020B0604020202020204" pitchFamily="34" charset="0"/>
                           <a:cs typeface="Arial" panose="020B0604020202020204" pitchFamily="34" charset="0"/>
                         </a:rPr>
@@ -6796,7 +6721,7 @@
                     <a:p>
                       <a:pPr algn="l"/>
                       <a:r>
-                        <a:rPr lang="en-CA" sz="1100" dirty="0">
+                        <a:rPr lang="en-CA" sz="1600" dirty="0">
                           <a:latin typeface="Arial" panose="020B0604020202020204" pitchFamily="34" charset="0"/>
                           <a:cs typeface="Arial" panose="020B0604020202020204" pitchFamily="34" charset="0"/>
                         </a:rPr>
@@ -6820,7 +6745,7 @@
                     <a:p>
                       <a:pPr algn="l"/>
                       <a:r>
-                        <a:rPr lang="en-CA" sz="1100" dirty="0">
+                        <a:rPr lang="en-CA" sz="1600" dirty="0">
                           <a:latin typeface="Arial" panose="020B0604020202020204" pitchFamily="34" charset="0"/>
                           <a:cs typeface="Arial" panose="020B0604020202020204" pitchFamily="34" charset="0"/>
                         </a:rPr>
@@ -6844,7 +6769,7 @@
                     <a:p>
                       <a:pPr algn="l"/>
                       <a:r>
-                        <a:rPr lang="en-CA" sz="1100" dirty="0">
+                        <a:rPr lang="en-CA" sz="1600" dirty="0">
                           <a:latin typeface="Arial" panose="020B0604020202020204" pitchFamily="34" charset="0"/>
                           <a:cs typeface="Arial" panose="020B0604020202020204" pitchFamily="34" charset="0"/>
                         </a:rPr>
@@ -6868,7 +6793,7 @@
                     <a:p>
                       <a:pPr algn="l"/>
                       <a:r>
-                        <a:rPr lang="en-CA" sz="1100" dirty="0">
+                        <a:rPr lang="en-CA" sz="1600" dirty="0">
                           <a:latin typeface="Arial" panose="020B0604020202020204" pitchFamily="34" charset="0"/>
                           <a:cs typeface="Arial" panose="020B0604020202020204" pitchFamily="34" charset="0"/>
                         </a:rPr>
@@ -6892,7 +6817,7 @@
                     <a:p>
                       <a:pPr algn="l"/>
                       <a:r>
-                        <a:rPr lang="en-CA" sz="1100" dirty="0">
+                        <a:rPr lang="en-CA" sz="1600" dirty="0">
                           <a:latin typeface="Arial" panose="020B0604020202020204" pitchFamily="34" charset="0"/>
                           <a:cs typeface="Arial" panose="020B0604020202020204" pitchFamily="34" charset="0"/>
                         </a:rPr>
@@ -6934,14 +6859,14 @@
           <p:nvPr>
             <p:extLst>
               <p:ext uri="{D42A27DB-BD31-4B8C-83A1-F6EECF244321}">
-                <p14:modId xmlns:p14="http://schemas.microsoft.com/office/powerpoint/2010/main" val="3537472963"/>
+                <p14:modId xmlns:p14="http://schemas.microsoft.com/office/powerpoint/2010/main" val="2780941060"/>
               </p:ext>
             </p:extLst>
           </p:nvPr>
         </p:nvGraphicFramePr>
         <p:xfrm>
           <a:off x="422582" y="362428"/>
-          <a:ext cx="9270060" cy="2021903"/>
+          <a:ext cx="9270060" cy="2887840"/>
         </p:xfrm>
         <a:graphic>
           <a:graphicData uri="http://schemas.openxmlformats.org/drawingml/2006/table">
@@ -6994,17 +6919,17 @@
                     <a:p>
                       <a:pPr algn="l"/>
                       <a:r>
-                        <a:rPr lang="en-CA" sz="1100" b="1" dirty="0">
+                        <a:rPr lang="en-CA" sz="1600" b="1" dirty="0">
                           <a:latin typeface="Arial" panose="020B0604020202020204" pitchFamily="34" charset="0"/>
                           <a:cs typeface="Arial" panose="020B0604020202020204" pitchFamily="34" charset="0"/>
                         </a:rPr>
-                        <a:t>Table 1A: Results from difference-in-differences study design simulations, select cases of missingness </a:t>
-                      </a:r>
-                    </a:p>
-                    <a:p>
-                      <a:pPr algn="l"/>
-                      <a:r>
-                        <a:rPr lang="en-CA" sz="1100" b="1" dirty="0">
+                        <a:t>Table 2A: Results from difference-in-differences study design simulations, select cases of missingness </a:t>
+                      </a:r>
+                    </a:p>
+                    <a:p>
+                      <a:pPr algn="l"/>
+                      <a:r>
+                        <a:rPr lang="en-CA" sz="1600" b="1" dirty="0">
                           <a:latin typeface="Arial" panose="020B0604020202020204" pitchFamily="34" charset="0"/>
                           <a:cs typeface="Arial" panose="020B0604020202020204" pitchFamily="34" charset="0"/>
                         </a:rPr>
@@ -7079,7 +7004,7 @@
                     <a:lstStyle/>
                     <a:p>
                       <a:pPr algn="l"/>
-                      <a:endParaRPr lang="en-CA" sz="1100" b="1" dirty="0">
+                      <a:endParaRPr lang="en-CA" sz="1600" b="1" dirty="0">
                         <a:latin typeface="Arial" panose="020B0604020202020204" pitchFamily="34" charset="0"/>
                         <a:cs typeface="Arial" panose="020B0604020202020204" pitchFamily="34" charset="0"/>
                       </a:endParaRPr>
@@ -7128,7 +7053,7 @@
                     <a:p>
                       <a:pPr algn="l"/>
                       <a:r>
-                        <a:rPr lang="en-CA" sz="1100" dirty="0">
+                        <a:rPr lang="en-CA" sz="1600" dirty="0">
                           <a:latin typeface="Arial" panose="020B0604020202020204" pitchFamily="34" charset="0"/>
                           <a:cs typeface="Arial" panose="020B0604020202020204" pitchFamily="34" charset="0"/>
                         </a:rPr>
@@ -7149,7 +7074,7 @@
                     <a:p>
                       <a:pPr algn="l"/>
                       <a:r>
-                        <a:rPr lang="en-CA" sz="1100" dirty="0">
+                        <a:rPr lang="en-CA" sz="1600" dirty="0">
                           <a:latin typeface="Arial" panose="020B0604020202020204" pitchFamily="34" charset="0"/>
                           <a:cs typeface="Arial" panose="020B0604020202020204" pitchFamily="34" charset="0"/>
                         </a:rPr>
@@ -7170,7 +7095,7 @@
                     <a:p>
                       <a:pPr algn="l"/>
                       <a:r>
-                        <a:rPr lang="en-CA" sz="1100" dirty="0">
+                        <a:rPr lang="en-CA" sz="1600" dirty="0">
                           <a:latin typeface="Arial" panose="020B0604020202020204" pitchFamily="34" charset="0"/>
                           <a:cs typeface="Arial" panose="020B0604020202020204" pitchFamily="34" charset="0"/>
                         </a:rPr>
@@ -7191,7 +7116,7 @@
                     <a:p>
                       <a:pPr algn="l"/>
                       <a:r>
-                        <a:rPr lang="en-CA" sz="1100" dirty="0">
+                        <a:rPr lang="en-CA" sz="1600" dirty="0">
                           <a:latin typeface="Arial" panose="020B0604020202020204" pitchFamily="34" charset="0"/>
                           <a:cs typeface="Arial" panose="020B0604020202020204" pitchFamily="34" charset="0"/>
                         </a:rPr>
@@ -7212,7 +7137,7 @@
                     <a:p>
                       <a:pPr algn="l"/>
                       <a:r>
-                        <a:rPr lang="en-CA" sz="1100" dirty="0">
+                        <a:rPr lang="en-CA" sz="1600" dirty="0">
                           <a:latin typeface="Arial" panose="020B0604020202020204" pitchFamily="34" charset="0"/>
                           <a:cs typeface="Arial" panose="020B0604020202020204" pitchFamily="34" charset="0"/>
                         </a:rPr>
@@ -7240,7 +7165,7 @@
                     <a:p>
                       <a:pPr algn="l"/>
                       <a:r>
-                        <a:rPr lang="en-CA" sz="1100" dirty="0">
+                        <a:rPr lang="en-CA" sz="1600" dirty="0">
                           <a:latin typeface="Arial" panose="020B0604020202020204" pitchFamily="34" charset="0"/>
                           <a:cs typeface="Arial" panose="020B0604020202020204" pitchFamily="34" charset="0"/>
                         </a:rPr>
@@ -7264,7 +7189,7 @@
                     <a:p>
                       <a:pPr algn="l"/>
                       <a:r>
-                        <a:rPr lang="en-CA" sz="1100" b="0" i="0" kern="1200" dirty="0">
+                        <a:rPr lang="en-CA" sz="1600" b="0" i="0" kern="1200" dirty="0">
                           <a:solidFill>
                             <a:schemeClr val="dk1"/>
                           </a:solidFill>
@@ -7276,7 +7201,7 @@
                         <a:t>-8.9%</a:t>
                       </a:r>
                       <a:r>
-                        <a:rPr lang="en-CA" sz="1100" dirty="0">
+                        <a:rPr lang="en-CA" sz="1600" dirty="0">
                           <a:latin typeface="Arial" panose="020B0604020202020204" pitchFamily="34" charset="0"/>
                           <a:cs typeface="Arial" panose="020B0604020202020204" pitchFamily="34" charset="0"/>
                         </a:rPr>
@@ -7300,20 +7225,20 @@
                     <a:p>
                       <a:pPr algn="l"/>
                       <a:r>
-                        <a:rPr lang="en-CA" sz="1100" dirty="0">
+                        <a:rPr lang="en-CA" sz="1600" dirty="0">
                           <a:latin typeface="Arial" panose="020B0604020202020204" pitchFamily="34" charset="0"/>
                           <a:cs typeface="Arial" panose="020B0604020202020204" pitchFamily="34" charset="0"/>
                         </a:rPr>
                         <a:t>-11.0% </a:t>
                       </a:r>
                       <a:r>
-                        <a:rPr lang="en-US" sz="1100" dirty="0">
+                        <a:rPr lang="en-US" sz="1600" dirty="0">
                           <a:latin typeface="Arial" panose="020B0604020202020204" pitchFamily="34" charset="0"/>
                           <a:cs typeface="Arial" panose="020B0604020202020204" pitchFamily="34" charset="0"/>
                         </a:rPr>
                         <a:t>(92.9%)</a:t>
                       </a:r>
-                      <a:endParaRPr lang="en-CA" sz="1100" dirty="0">
+                      <a:endParaRPr lang="en-CA" sz="1600" dirty="0">
                         <a:latin typeface="Arial" panose="020B0604020202020204" pitchFamily="34" charset="0"/>
                         <a:cs typeface="Arial" panose="020B0604020202020204" pitchFamily="34" charset="0"/>
                       </a:endParaRPr>
@@ -7335,7 +7260,7 @@
                     <a:p>
                       <a:pPr algn="l"/>
                       <a:r>
-                        <a:rPr lang="en-CA" sz="1100" dirty="0">
+                        <a:rPr lang="en-CA" sz="1600" dirty="0">
                           <a:latin typeface="Arial" panose="020B0604020202020204" pitchFamily="34" charset="0"/>
                           <a:cs typeface="Arial" panose="020B0604020202020204" pitchFamily="34" charset="0"/>
                         </a:rPr>
@@ -7359,13 +7284,13 @@
                     <a:p>
                       <a:pPr algn="l"/>
                       <a:r>
-                        <a:rPr lang="en-US" sz="1100" dirty="0">
+                        <a:rPr lang="en-US" sz="1600" dirty="0">
                           <a:latin typeface="Arial" panose="020B0604020202020204" pitchFamily="34" charset="0"/>
                           <a:cs typeface="Arial" panose="020B0604020202020204" pitchFamily="34" charset="0"/>
                         </a:rPr>
                         <a:t>-54.2% (89.9%)</a:t>
                       </a:r>
-                      <a:endParaRPr lang="en-CA" sz="1100" dirty="0">
+                      <a:endParaRPr lang="en-CA" sz="1600" dirty="0">
                         <a:latin typeface="Arial" panose="020B0604020202020204" pitchFamily="34" charset="0"/>
                         <a:cs typeface="Arial" panose="020B0604020202020204" pitchFamily="34" charset="0"/>
                       </a:endParaRPr>
@@ -7394,7 +7319,7 @@
                     <a:p>
                       <a:pPr algn="l"/>
                       <a:r>
-                        <a:rPr lang="en-CA" sz="1100" dirty="0">
+                        <a:rPr lang="en-CA" sz="1600" dirty="0">
                           <a:latin typeface="Arial" panose="020B0604020202020204" pitchFamily="34" charset="0"/>
                           <a:cs typeface="Arial" panose="020B0604020202020204" pitchFamily="34" charset="0"/>
                         </a:rPr>
@@ -7411,7 +7336,7 @@
                     <a:p>
                       <a:pPr algn="l"/>
                       <a:r>
-                        <a:rPr lang="en-CA" sz="1100" dirty="0">
+                        <a:rPr lang="en-CA" sz="1600" dirty="0">
                           <a:latin typeface="Arial" panose="020B0604020202020204" pitchFamily="34" charset="0"/>
                           <a:cs typeface="Arial" panose="020B0604020202020204" pitchFamily="34" charset="0"/>
                         </a:rPr>
@@ -7428,7 +7353,7 @@
                     <a:p>
                       <a:pPr algn="l"/>
                       <a:r>
-                        <a:rPr lang="en-CA" sz="1100" dirty="0">
+                        <a:rPr lang="en-CA" sz="1600" dirty="0">
                           <a:latin typeface="Arial" panose="020B0604020202020204" pitchFamily="34" charset="0"/>
                           <a:cs typeface="Arial" panose="020B0604020202020204" pitchFamily="34" charset="0"/>
                         </a:rPr>
@@ -7445,7 +7370,7 @@
                     <a:p>
                       <a:pPr algn="l"/>
                       <a:r>
-                        <a:rPr lang="en-CA" sz="1100" dirty="0">
+                        <a:rPr lang="en-CA" sz="1600" dirty="0">
                           <a:latin typeface="Arial" panose="020B0604020202020204" pitchFamily="34" charset="0"/>
                           <a:cs typeface="Arial" panose="020B0604020202020204" pitchFamily="34" charset="0"/>
                         </a:rPr>
@@ -7462,7 +7387,7 @@
                     <a:p>
                       <a:pPr algn="l"/>
                       <a:r>
-                        <a:rPr lang="en-CA" sz="1100" dirty="0">
+                        <a:rPr lang="en-CA" sz="1600" dirty="0">
                           <a:latin typeface="Arial" panose="020B0604020202020204" pitchFamily="34" charset="0"/>
                           <a:cs typeface="Arial" panose="020B0604020202020204" pitchFamily="34" charset="0"/>
                         </a:rPr>
@@ -7486,7 +7411,7 @@
                     <a:p>
                       <a:pPr algn="l"/>
                       <a:r>
-                        <a:rPr lang="en-CA" sz="1100" dirty="0">
+                        <a:rPr lang="en-CA" sz="1600" dirty="0">
                           <a:latin typeface="Arial" panose="020B0604020202020204" pitchFamily="34" charset="0"/>
                           <a:cs typeface="Arial" panose="020B0604020202020204" pitchFamily="34" charset="0"/>
                         </a:rPr>
@@ -7510,7 +7435,7 @@
                     <a:p>
                       <a:pPr algn="l"/>
                       <a:r>
-                        <a:rPr lang="en-CA" sz="1100" dirty="0">
+                        <a:rPr lang="en-CA" sz="1600" dirty="0">
                           <a:latin typeface="Arial" panose="020B0604020202020204" pitchFamily="34" charset="0"/>
                           <a:cs typeface="Arial" panose="020B0604020202020204" pitchFamily="34" charset="0"/>
                         </a:rPr>
@@ -7534,7 +7459,7 @@
                     <a:p>
                       <a:pPr algn="l"/>
                       <a:r>
-                        <a:rPr lang="en-CA" sz="1100" dirty="0">
+                        <a:rPr lang="en-CA" sz="1600" dirty="0">
                           <a:latin typeface="Arial" panose="020B0604020202020204" pitchFamily="34" charset="0"/>
                           <a:cs typeface="Arial" panose="020B0604020202020204" pitchFamily="34" charset="0"/>
                         </a:rPr>
@@ -7558,7 +7483,7 @@
                     <a:p>
                       <a:pPr algn="l"/>
                       <a:r>
-                        <a:rPr lang="en-CA" sz="1100" dirty="0">
+                        <a:rPr lang="en-CA" sz="1600" dirty="0">
                           <a:latin typeface="Arial" panose="020B0604020202020204" pitchFamily="34" charset="0"/>
                           <a:cs typeface="Arial" panose="020B0604020202020204" pitchFamily="34" charset="0"/>
                         </a:rPr>
@@ -7582,7 +7507,7 @@
                     <a:p>
                       <a:pPr algn="l"/>
                       <a:r>
-                        <a:rPr lang="en-CA" sz="1100" dirty="0">
+                        <a:rPr lang="en-CA" sz="1600" dirty="0">
                           <a:latin typeface="Arial" panose="020B0604020202020204" pitchFamily="34" charset="0"/>
                           <a:cs typeface="Arial" panose="020B0604020202020204" pitchFamily="34" charset="0"/>
                         </a:rPr>
@@ -7624,13 +7549,13 @@
           <p:nvPr>
             <p:extLst>
               <p:ext uri="{D42A27DB-BD31-4B8C-83A1-F6EECF244321}">
-                <p14:modId xmlns:p14="http://schemas.microsoft.com/office/powerpoint/2010/main" val="2714284214"/>
+                <p14:modId xmlns:p14="http://schemas.microsoft.com/office/powerpoint/2010/main" val="1275032311"/>
               </p:ext>
             </p:extLst>
           </p:nvPr>
         </p:nvGraphicFramePr>
         <p:xfrm>
-          <a:off x="514023" y="5041424"/>
+          <a:off x="422582" y="6207284"/>
           <a:ext cx="10305288" cy="1539240"/>
         </p:xfrm>
         <a:graphic>
@@ -7696,7 +7621,7 @@
                     <a:p>
                       <a:pPr algn="l"/>
                       <a:r>
-                        <a:rPr lang="en-CA" sz="1100"/>
+                        <a:rPr lang="en-CA" sz="1100" dirty="0"/>
                         <a:t>0% of counties missing 0% of data</a:t>
                       </a:r>
                     </a:p>
@@ -7955,7 +7880,7 @@
                     <a:p>
                       <a:pPr algn="l"/>
                       <a:r>
-                        <a:rPr lang="en-CA" sz="1100"/>
+                        <a:rPr lang="en-CA" sz="1100" dirty="0"/>
                         <a:t>-35.5% (19.2%)</a:t>
                       </a:r>
                     </a:p>

</xml_diff>